<commit_message>
tests + 1 variant of null handling (still to be decided)
</commit_message>
<xml_diff>
--- a/html-to-ppt/createExecReviewPpt.pptx
+++ b/html-to-ppt/createExecReviewPpt.pptx
@@ -10,8 +10,6 @@
     <p:sldId id="258" r:id="rId8"/>
     <p:sldId id="259" r:id="rId9"/>
     <p:sldId id="260" r:id="rId10"/>
-    <p:sldId id="261" r:id="rId11"/>
-    <p:sldId id="262" r:id="rId12"/>
   </p:sldIdLst>
   <p:sldSz cx="16256000" cy="9144000"/>
   <p:notesSz cx="6858000" cy="9144000"/>
@@ -3100,9 +3098,9 @@
             <a:r>
               <a:rPr lang="en-US" sz="1400">
                 <a:latin typeface="Calibri"/>
-                <a:hlinkClick r:id="rId2" tooltip="http://ya.ru"/>
+                <a:hlinkClick r:id="rId2" tooltip=""/>
               </a:rPr>
-              <a:t>Project from Facade</a:t>
+              <a:t/>
             </a:r>
             <a:br>
               <a:rPr lang="en-US" sz="1400">
@@ -3119,7 +3117,7 @@
               <a:rPr lang="en-US" sz="1400">
                 <a:latin typeface="Calibri"/>
               </a:rPr>
-              <a:t>IKSANOV Aleksandr</a:t>
+              <a:t/>
             </a:r>
             <a:br>
               <a:rPr lang="en-US" sz="1400">
@@ -3172,7 +3170,7 @@
               <a:rPr lang="en-US" sz="1400" b="true">
                 <a:latin typeface="Calibri"/>
               </a:rPr>
-              <a:t>Summary title Summary title Summary title Summary title Summary title </a:t>
+              <a:t/>
             </a:r>
             <a:endParaRPr lang="en-US" sz="1100"/>
           </a:p>
@@ -3450,7 +3448,7 @@
                       </a:pPr>
                       <a:r>
                         <a:rPr lang="en-US" sz="1400"/>
-                        <a:t>RED</a:t>
+                        <a:t> </a:t>
                       </a:r>
                       <a:endParaRPr lang="en-US" sz="1100"/>
                     </a:p>
@@ -3493,7 +3491,7 @@
                       <a:tailEnd type="none" w="med" len="med"/>
                     </a:lnB>
                     <a:solidFill>
-                      <a:srgbClr val="FF0000"/>
+                      <a:srgbClr val="C0C0C0"/>
                     </a:solidFill>
                   </a:tcPr>
                 </a:tc>
@@ -3507,7 +3505,7 @@
                       </a:pPr>
                       <a:r>
                         <a:rPr lang="en-US" sz="1400"/>
-                        <a:t>YELLOW</a:t>
+                        <a:t> </a:t>
                       </a:r>
                       <a:endParaRPr lang="en-US" sz="1100"/>
                     </a:p>
@@ -3550,7 +3548,7 @@
                       <a:tailEnd type="none" w="med" len="med"/>
                     </a:lnB>
                     <a:solidFill>
-                      <a:srgbClr val="FFC800"/>
+                      <a:srgbClr val="C0C0C0"/>
                     </a:solidFill>
                   </a:tcPr>
                 </a:tc>
@@ -3564,7 +3562,7 @@
                       </a:pPr>
                       <a:r>
                         <a:rPr lang="en-US" sz="1400"/>
-                        <a:t>RED</a:t>
+                        <a:t> </a:t>
                       </a:r>
                       <a:endParaRPr lang="en-US" sz="1100"/>
                     </a:p>
@@ -3607,7 +3605,7 @@
                       <a:tailEnd type="none" w="med" len="med"/>
                     </a:lnB>
                     <a:solidFill>
-                      <a:srgbClr val="FF0000"/>
+                      <a:srgbClr val="C0C0C0"/>
                     </a:solidFill>
                   </a:tcPr>
                 </a:tc>
@@ -3621,7 +3619,7 @@
                       </a:pPr>
                       <a:r>
                         <a:rPr lang="en-US" sz="1400"/>
-                        <a:t>GREEN</a:t>
+                        <a:t> </a:t>
                       </a:r>
                       <a:endParaRPr lang="en-US" sz="1100"/>
                     </a:p>
@@ -3664,7 +3662,7 @@
                       <a:tailEnd type="none" w="med" len="med"/>
                     </a:lnB>
                     <a:solidFill>
-                      <a:srgbClr val="00FF00"/>
+                      <a:srgbClr val="C0C0C0"/>
                     </a:solidFill>
                   </a:tcPr>
                 </a:tc>
@@ -3752,14 +3750,14 @@
         </p:nvSpPr>
         <p:spPr>
           <a:xfrm>
-            <a:off x="3048000" y="2527300"/>
-            <a:ext cx="25400" cy="228600"/>
+            <a:off x="8890000" y="2438400"/>
+            <a:ext cx="203200" cy="406400"/>
           </a:xfrm>
-          <a:prstGeom prst="rect">
+          <a:prstGeom prst="roundRect">
             <a:avLst/>
           </a:prstGeom>
           <a:solidFill>
-            <a:srgbClr val="000000"/>
+            <a:srgbClr val="C0C0C0"/>
           </a:solidFill>
           <a:ln>
             <a:solidFill>
@@ -3767,1326 +3765,6 @@
             </a:solidFill>
           </a:ln>
         </p:spPr>
-      </p:sp>
-      <p:sp>
-        <p:nvSpPr>
-          <p:cNvPr name="TextBox 9" id="9"/>
-          <p:cNvSpPr txBox="true"/>
-          <p:nvPr/>
-        </p:nvSpPr>
-        <p:spPr>
-          <a:xfrm>
-            <a:off x="2616200" y="2006600"/>
-            <a:ext cx="889000" cy="215900"/>
-          </a:xfrm>
-          <a:prstGeom prst="rect">
-            <a:avLst/>
-          </a:prstGeom>
-        </p:spPr>
-        <p:txBody>
-          <a:bodyPr anchor="t" rtlCol="false"/>
-          <a:lstStyle/>
-          <a:p>
-            <a:pPr algn="ctr">
-              <a:defRPr/>
-            </a:pPr>
-            <a:r>
-              <a:rPr lang="ru-RU"/>
-              <a:t/>
-            </a:r>
-            <a:r>
-              <a:rPr lang="en-US" sz="1400">
-                <a:latin typeface="Calibri"/>
-                <a:hlinkClick r:id="rId3" tooltip="http://www.google.com"/>
-              </a:rPr>
-              <a:t>DR1</a:t>
-            </a:r>
-            <a:endParaRPr lang="en-US" sz="1100"/>
-          </a:p>
-        </p:txBody>
-      </p:sp>
-      <p:pic>
-        <p:nvPicPr>
-          <p:cNvPr name="Picture 10" id="10"/>
-          <p:cNvPicPr>
-            <a:picLocks noChangeAspect="true"/>
-          </p:cNvPicPr>
-          <p:nvPr/>
-        </p:nvPicPr>
-        <p:blipFill>
-          <a:blip r:embed="rId4"/>
-          <a:stretch>
-            <a:fillRect/>
-          </a:stretch>
-        </p:blipFill>
-        <p:spPr>
-          <a:xfrm>
-            <a:off x="2946400" y="1689100"/>
-            <a:ext cx="254000" cy="254000"/>
-          </a:xfrm>
-          <a:prstGeom prst="rect">
-            <a:avLst/>
-          </a:prstGeom>
-        </p:spPr>
-      </p:pic>
-      <p:sp>
-        <p:nvSpPr>
-          <p:cNvPr name="TextBox 11" id="11"/>
-          <p:cNvSpPr txBox="true"/>
-          <p:nvPr/>
-        </p:nvSpPr>
-        <p:spPr>
-          <a:xfrm>
-            <a:off x="2413000" y="2959100"/>
-            <a:ext cx="1270000" cy="444500"/>
-          </a:xfrm>
-          <a:prstGeom prst="rect">
-            <a:avLst/>
-          </a:prstGeom>
-        </p:spPr>
-        <p:txBody>
-          <a:bodyPr anchor="t" rtlCol="false"/>
-          <a:lstStyle/>
-          <a:p>
-            <a:pPr algn="ctr">
-              <a:defRPr/>
-            </a:pPr>
-            <a:r>
-              <a:rPr lang="ru-RU"/>
-              <a:t/>
-            </a:r>
-            <a:r>
-              <a:rPr lang="en-US" sz="1400">
-                <a:latin typeface="Calibri"/>
-              </a:rPr>
-              <a:t>11-Apr-20</a:t>
-            </a:r>
-            <a:br>
-              <a:rPr lang="en-US" sz="1400">
-                <a:latin typeface="Calibri"/>
-              </a:rPr>
-            </a:br>
-            <a:r>
-              <a:rPr lang="en-US" sz="1400">
-                <a:latin typeface="Calibri"/>
-              </a:rPr>
-              <a:t>10-Apr-20</a:t>
-            </a:r>
-            <a:endParaRPr lang="en-US" sz="1100"/>
-          </a:p>
-        </p:txBody>
-      </p:sp>
-      <p:sp>
-        <p:nvSpPr>
-          <p:cNvPr name="AutoShape 12" id="12"/>
-          <p:cNvSpPr/>
-          <p:nvPr/>
-        </p:nvSpPr>
-        <p:spPr>
-          <a:xfrm>
-            <a:off x="4318000" y="2527300"/>
-            <a:ext cx="25400" cy="228600"/>
-          </a:xfrm>
-          <a:prstGeom prst="rect">
-            <a:avLst/>
-          </a:prstGeom>
-          <a:solidFill>
-            <a:srgbClr val="000000"/>
-          </a:solidFill>
-          <a:ln>
-            <a:solidFill>
-              <a:srgbClr val="000000"/>
-            </a:solidFill>
-          </a:ln>
-        </p:spPr>
-      </p:sp>
-      <p:sp>
-        <p:nvSpPr>
-          <p:cNvPr name="TextBox 13" id="13"/>
-          <p:cNvSpPr txBox="true"/>
-          <p:nvPr/>
-        </p:nvSpPr>
-        <p:spPr>
-          <a:xfrm>
-            <a:off x="3886200" y="2006600"/>
-            <a:ext cx="889000" cy="215900"/>
-          </a:xfrm>
-          <a:prstGeom prst="rect">
-            <a:avLst/>
-          </a:prstGeom>
-        </p:spPr>
-        <p:txBody>
-          <a:bodyPr anchor="t" rtlCol="false"/>
-          <a:lstStyle/>
-          <a:p>
-            <a:pPr algn="ctr">
-              <a:defRPr/>
-            </a:pPr>
-            <a:r>
-              <a:rPr lang="ru-RU"/>
-              <a:t/>
-            </a:r>
-            <a:r>
-              <a:rPr lang="en-US" sz="1400">
-                <a:latin typeface="Calibri"/>
-                <a:hlinkClick r:id="rId5" tooltip="http://www.google.com"/>
-              </a:rPr>
-              <a:t>DR2</a:t>
-            </a:r>
-            <a:endParaRPr lang="en-US" sz="1100"/>
-          </a:p>
-        </p:txBody>
-      </p:sp>
-      <p:pic>
-        <p:nvPicPr>
-          <p:cNvPr name="Picture 14" id="14"/>
-          <p:cNvPicPr>
-            <a:picLocks noChangeAspect="true"/>
-          </p:cNvPicPr>
-          <p:nvPr/>
-        </p:nvPicPr>
-        <p:blipFill>
-          <a:blip r:embed="rId6"/>
-          <a:stretch>
-            <a:fillRect/>
-          </a:stretch>
-        </p:blipFill>
-        <p:spPr>
-          <a:xfrm>
-            <a:off x="4216400" y="1689100"/>
-            <a:ext cx="254000" cy="254000"/>
-          </a:xfrm>
-          <a:prstGeom prst="rect">
-            <a:avLst/>
-          </a:prstGeom>
-        </p:spPr>
-      </p:pic>
-      <p:sp>
-        <p:nvSpPr>
-          <p:cNvPr name="TextBox 15" id="15"/>
-          <p:cNvSpPr txBox="true"/>
-          <p:nvPr/>
-        </p:nvSpPr>
-        <p:spPr>
-          <a:xfrm>
-            <a:off x="3683000" y="2959100"/>
-            <a:ext cx="1270000" cy="444500"/>
-          </a:xfrm>
-          <a:prstGeom prst="rect">
-            <a:avLst/>
-          </a:prstGeom>
-        </p:spPr>
-        <p:txBody>
-          <a:bodyPr anchor="t" rtlCol="false"/>
-          <a:lstStyle/>
-          <a:p>
-            <a:pPr algn="ctr">
-              <a:defRPr/>
-            </a:pPr>
-            <a:r>
-              <a:rPr lang="ru-RU"/>
-              <a:t/>
-            </a:r>
-            <a:r>
-              <a:rPr lang="en-US" sz="1400">
-                <a:latin typeface="Calibri"/>
-              </a:rPr>
-              <a:t>15-Apr-20</a:t>
-            </a:r>
-            <a:br>
-              <a:rPr lang="en-US" sz="1400">
-                <a:latin typeface="Calibri"/>
-              </a:rPr>
-            </a:br>
-            <a:r>
-              <a:rPr lang="en-US" sz="1400">
-                <a:latin typeface="Calibri"/>
-              </a:rPr>
-              <a:t>15-Apr-20</a:t>
-            </a:r>
-            <a:endParaRPr lang="en-US" sz="1100"/>
-          </a:p>
-        </p:txBody>
-      </p:sp>
-      <p:sp>
-        <p:nvSpPr>
-          <p:cNvPr name="AutoShape 16" id="16"/>
-          <p:cNvSpPr/>
-          <p:nvPr/>
-        </p:nvSpPr>
-        <p:spPr>
-          <a:xfrm>
-            <a:off x="5588000" y="2527300"/>
-            <a:ext cx="25400" cy="228600"/>
-          </a:xfrm>
-          <a:prstGeom prst="rect">
-            <a:avLst/>
-          </a:prstGeom>
-          <a:solidFill>
-            <a:srgbClr val="000000"/>
-          </a:solidFill>
-          <a:ln>
-            <a:solidFill>
-              <a:srgbClr val="000000"/>
-            </a:solidFill>
-          </a:ln>
-        </p:spPr>
-      </p:sp>
-      <p:sp>
-        <p:nvSpPr>
-          <p:cNvPr name="TextBox 17" id="17"/>
-          <p:cNvSpPr txBox="true"/>
-          <p:nvPr/>
-        </p:nvSpPr>
-        <p:spPr>
-          <a:xfrm>
-            <a:off x="5156200" y="2006600"/>
-            <a:ext cx="889000" cy="215900"/>
-          </a:xfrm>
-          <a:prstGeom prst="rect">
-            <a:avLst/>
-          </a:prstGeom>
-        </p:spPr>
-        <p:txBody>
-          <a:bodyPr anchor="t" rtlCol="false"/>
-          <a:lstStyle/>
-          <a:p>
-            <a:pPr algn="ctr">
-              <a:defRPr/>
-            </a:pPr>
-            <a:r>
-              <a:rPr lang="ru-RU"/>
-              <a:t/>
-            </a:r>
-            <a:r>
-              <a:rPr lang="en-US" sz="1400">
-                <a:latin typeface="Calibri"/>
-                <a:hlinkClick r:id="rId7" tooltip="http://www.google.com"/>
-              </a:rPr>
-              <a:t>DR2</a:t>
-            </a:r>
-            <a:endParaRPr lang="en-US" sz="1100"/>
-          </a:p>
-        </p:txBody>
-      </p:sp>
-      <p:pic>
-        <p:nvPicPr>
-          <p:cNvPr name="Picture 18" id="18"/>
-          <p:cNvPicPr>
-            <a:picLocks noChangeAspect="true"/>
-          </p:cNvPicPr>
-          <p:nvPr/>
-        </p:nvPicPr>
-        <p:blipFill>
-          <a:blip r:embed="rId4"/>
-          <a:stretch>
-            <a:fillRect/>
-          </a:stretch>
-        </p:blipFill>
-        <p:spPr>
-          <a:xfrm>
-            <a:off x="5486400" y="1689100"/>
-            <a:ext cx="254000" cy="254000"/>
-          </a:xfrm>
-          <a:prstGeom prst="rect">
-            <a:avLst/>
-          </a:prstGeom>
-        </p:spPr>
-      </p:pic>
-      <p:sp>
-        <p:nvSpPr>
-          <p:cNvPr name="TextBox 19" id="19"/>
-          <p:cNvSpPr txBox="true"/>
-          <p:nvPr/>
-        </p:nvSpPr>
-        <p:spPr>
-          <a:xfrm>
-            <a:off x="4953000" y="2959100"/>
-            <a:ext cx="1270000" cy="444500"/>
-          </a:xfrm>
-          <a:prstGeom prst="rect">
-            <a:avLst/>
-          </a:prstGeom>
-        </p:spPr>
-        <p:txBody>
-          <a:bodyPr anchor="t" rtlCol="false"/>
-          <a:lstStyle/>
-          <a:p>
-            <a:pPr algn="ctr">
-              <a:defRPr/>
-            </a:pPr>
-            <a:r>
-              <a:rPr lang="ru-RU"/>
-              <a:t/>
-            </a:r>
-            <a:r>
-              <a:rPr lang="en-US" sz="1400">
-                <a:latin typeface="Calibri"/>
-              </a:rPr>
-              <a:t>15-Apr-20</a:t>
-            </a:r>
-            <a:br>
-              <a:rPr lang="en-US" sz="1400">
-                <a:latin typeface="Calibri"/>
-              </a:rPr>
-            </a:br>
-            <a:r>
-              <a:rPr lang="en-US" sz="1400">
-                <a:latin typeface="Calibri"/>
-              </a:rPr>
-              <a:t>15-Apr-20</a:t>
-            </a:r>
-            <a:endParaRPr lang="en-US" sz="1100"/>
-          </a:p>
-        </p:txBody>
-      </p:sp>
-      <p:sp>
-        <p:nvSpPr>
-          <p:cNvPr name="AutoShape 20" id="20"/>
-          <p:cNvSpPr/>
-          <p:nvPr/>
-        </p:nvSpPr>
-        <p:spPr>
-          <a:xfrm>
-            <a:off x="6858000" y="2527300"/>
-            <a:ext cx="25400" cy="228600"/>
-          </a:xfrm>
-          <a:prstGeom prst="rect">
-            <a:avLst/>
-          </a:prstGeom>
-          <a:solidFill>
-            <a:srgbClr val="000000"/>
-          </a:solidFill>
-          <a:ln>
-            <a:solidFill>
-              <a:srgbClr val="000000"/>
-            </a:solidFill>
-          </a:ln>
-        </p:spPr>
-      </p:sp>
-      <p:sp>
-        <p:nvSpPr>
-          <p:cNvPr name="TextBox 21" id="21"/>
-          <p:cNvSpPr txBox="true"/>
-          <p:nvPr/>
-        </p:nvSpPr>
-        <p:spPr>
-          <a:xfrm>
-            <a:off x="6426200" y="2006600"/>
-            <a:ext cx="889000" cy="215900"/>
-          </a:xfrm>
-          <a:prstGeom prst="rect">
-            <a:avLst/>
-          </a:prstGeom>
-        </p:spPr>
-        <p:txBody>
-          <a:bodyPr anchor="t" rtlCol="false"/>
-          <a:lstStyle/>
-          <a:p>
-            <a:pPr algn="ctr">
-              <a:defRPr/>
-            </a:pPr>
-            <a:r>
-              <a:rPr lang="ru-RU"/>
-              <a:t/>
-            </a:r>
-            <a:r>
-              <a:rPr lang="en-US" sz="1400">
-                <a:latin typeface="Calibri"/>
-                <a:hlinkClick r:id="rId8" tooltip="http://www.google.com"/>
-              </a:rPr>
-              <a:t>DR2</a:t>
-            </a:r>
-            <a:endParaRPr lang="en-US" sz="1100"/>
-          </a:p>
-        </p:txBody>
-      </p:sp>
-      <p:pic>
-        <p:nvPicPr>
-          <p:cNvPr name="Picture 22" id="22"/>
-          <p:cNvPicPr>
-            <a:picLocks noChangeAspect="true"/>
-          </p:cNvPicPr>
-          <p:nvPr/>
-        </p:nvPicPr>
-        <p:blipFill>
-          <a:blip r:embed="rId4"/>
-          <a:stretch>
-            <a:fillRect/>
-          </a:stretch>
-        </p:blipFill>
-        <p:spPr>
-          <a:xfrm>
-            <a:off x="6756400" y="1689100"/>
-            <a:ext cx="254000" cy="254000"/>
-          </a:xfrm>
-          <a:prstGeom prst="rect">
-            <a:avLst/>
-          </a:prstGeom>
-        </p:spPr>
-      </p:pic>
-      <p:sp>
-        <p:nvSpPr>
-          <p:cNvPr name="TextBox 23" id="23"/>
-          <p:cNvSpPr txBox="true"/>
-          <p:nvPr/>
-        </p:nvSpPr>
-        <p:spPr>
-          <a:xfrm>
-            <a:off x="6223000" y="2959100"/>
-            <a:ext cx="1270000" cy="444500"/>
-          </a:xfrm>
-          <a:prstGeom prst="rect">
-            <a:avLst/>
-          </a:prstGeom>
-        </p:spPr>
-        <p:txBody>
-          <a:bodyPr anchor="t" rtlCol="false"/>
-          <a:lstStyle/>
-          <a:p>
-            <a:pPr algn="ctr">
-              <a:defRPr/>
-            </a:pPr>
-            <a:r>
-              <a:rPr lang="ru-RU"/>
-              <a:t/>
-            </a:r>
-            <a:r>
-              <a:rPr lang="en-US" sz="1400">
-                <a:latin typeface="Calibri"/>
-              </a:rPr>
-              <a:t>15-Apr-20</a:t>
-            </a:r>
-            <a:br>
-              <a:rPr lang="en-US" sz="1400">
-                <a:latin typeface="Calibri"/>
-              </a:rPr>
-            </a:br>
-            <a:r>
-              <a:rPr lang="en-US" sz="1400">
-                <a:latin typeface="Calibri"/>
-              </a:rPr>
-              <a:t>15-Apr-20</a:t>
-            </a:r>
-            <a:endParaRPr lang="en-US" sz="1100"/>
-          </a:p>
-        </p:txBody>
-      </p:sp>
-      <p:sp>
-        <p:nvSpPr>
-          <p:cNvPr name="AutoShape 24" id="24"/>
-          <p:cNvSpPr/>
-          <p:nvPr/>
-        </p:nvSpPr>
-        <p:spPr>
-          <a:xfrm>
-            <a:off x="8128000" y="2527300"/>
-            <a:ext cx="25400" cy="228600"/>
-          </a:xfrm>
-          <a:prstGeom prst="rect">
-            <a:avLst/>
-          </a:prstGeom>
-          <a:solidFill>
-            <a:srgbClr val="000000"/>
-          </a:solidFill>
-          <a:ln>
-            <a:solidFill>
-              <a:srgbClr val="000000"/>
-            </a:solidFill>
-          </a:ln>
-        </p:spPr>
-      </p:sp>
-      <p:sp>
-        <p:nvSpPr>
-          <p:cNvPr name="TextBox 25" id="25"/>
-          <p:cNvSpPr txBox="true"/>
-          <p:nvPr/>
-        </p:nvSpPr>
-        <p:spPr>
-          <a:xfrm>
-            <a:off x="7696200" y="2006600"/>
-            <a:ext cx="889000" cy="215900"/>
-          </a:xfrm>
-          <a:prstGeom prst="rect">
-            <a:avLst/>
-          </a:prstGeom>
-        </p:spPr>
-        <p:txBody>
-          <a:bodyPr anchor="t" rtlCol="false"/>
-          <a:lstStyle/>
-          <a:p>
-            <a:pPr algn="ctr">
-              <a:defRPr/>
-            </a:pPr>
-            <a:r>
-              <a:rPr lang="ru-RU"/>
-              <a:t/>
-            </a:r>
-            <a:r>
-              <a:rPr lang="en-US" sz="1400">
-                <a:latin typeface="Calibri"/>
-                <a:hlinkClick r:id="rId9" tooltip="http://www.google.com"/>
-              </a:rPr>
-              <a:t>DR2</a:t>
-            </a:r>
-            <a:endParaRPr lang="en-US" sz="1100"/>
-          </a:p>
-        </p:txBody>
-      </p:sp>
-      <p:pic>
-        <p:nvPicPr>
-          <p:cNvPr name="Picture 26" id="26"/>
-          <p:cNvPicPr>
-            <a:picLocks noChangeAspect="true"/>
-          </p:cNvPicPr>
-          <p:nvPr/>
-        </p:nvPicPr>
-        <p:blipFill>
-          <a:blip r:embed="rId4"/>
-          <a:stretch>
-            <a:fillRect/>
-          </a:stretch>
-        </p:blipFill>
-        <p:spPr>
-          <a:xfrm>
-            <a:off x="8026400" y="1689100"/>
-            <a:ext cx="254000" cy="254000"/>
-          </a:xfrm>
-          <a:prstGeom prst="rect">
-            <a:avLst/>
-          </a:prstGeom>
-        </p:spPr>
-      </p:pic>
-      <p:sp>
-        <p:nvSpPr>
-          <p:cNvPr name="TextBox 27" id="27"/>
-          <p:cNvSpPr txBox="true"/>
-          <p:nvPr/>
-        </p:nvSpPr>
-        <p:spPr>
-          <a:xfrm>
-            <a:off x="7493000" y="2959100"/>
-            <a:ext cx="1270000" cy="444500"/>
-          </a:xfrm>
-          <a:prstGeom prst="rect">
-            <a:avLst/>
-          </a:prstGeom>
-        </p:spPr>
-        <p:txBody>
-          <a:bodyPr anchor="t" rtlCol="false"/>
-          <a:lstStyle/>
-          <a:p>
-            <a:pPr algn="ctr">
-              <a:defRPr/>
-            </a:pPr>
-            <a:r>
-              <a:rPr lang="ru-RU"/>
-              <a:t/>
-            </a:r>
-            <a:r>
-              <a:rPr lang="en-US" sz="1400">
-                <a:latin typeface="Calibri"/>
-              </a:rPr>
-              <a:t>15-Apr-20</a:t>
-            </a:r>
-            <a:br>
-              <a:rPr lang="en-US" sz="1400">
-                <a:latin typeface="Calibri"/>
-              </a:rPr>
-            </a:br>
-            <a:r>
-              <a:rPr lang="en-US" sz="1400">
-                <a:latin typeface="Calibri"/>
-              </a:rPr>
-              <a:t>15-Apr-20</a:t>
-            </a:r>
-            <a:endParaRPr lang="en-US" sz="1100"/>
-          </a:p>
-        </p:txBody>
-      </p:sp>
-      <p:sp>
-        <p:nvSpPr>
-          <p:cNvPr name="AutoShape 28" id="28"/>
-          <p:cNvSpPr/>
-          <p:nvPr/>
-        </p:nvSpPr>
-        <p:spPr>
-          <a:xfrm>
-            <a:off x="9398000" y="2527300"/>
-            <a:ext cx="25400" cy="228600"/>
-          </a:xfrm>
-          <a:prstGeom prst="rect">
-            <a:avLst/>
-          </a:prstGeom>
-          <a:solidFill>
-            <a:srgbClr val="000000"/>
-          </a:solidFill>
-          <a:ln>
-            <a:solidFill>
-              <a:srgbClr val="000000"/>
-            </a:solidFill>
-          </a:ln>
-        </p:spPr>
-      </p:sp>
-      <p:sp>
-        <p:nvSpPr>
-          <p:cNvPr name="TextBox 29" id="29"/>
-          <p:cNvSpPr txBox="true"/>
-          <p:nvPr/>
-        </p:nvSpPr>
-        <p:spPr>
-          <a:xfrm>
-            <a:off x="8966200" y="2006600"/>
-            <a:ext cx="889000" cy="215900"/>
-          </a:xfrm>
-          <a:prstGeom prst="rect">
-            <a:avLst/>
-          </a:prstGeom>
-        </p:spPr>
-        <p:txBody>
-          <a:bodyPr anchor="t" rtlCol="false"/>
-          <a:lstStyle/>
-          <a:p>
-            <a:pPr algn="ctr">
-              <a:defRPr/>
-            </a:pPr>
-            <a:r>
-              <a:rPr lang="ru-RU"/>
-              <a:t/>
-            </a:r>
-            <a:r>
-              <a:rPr lang="en-US" sz="1400">
-                <a:latin typeface="Calibri"/>
-                <a:hlinkClick r:id="rId10" tooltip="http://www.google.com"/>
-              </a:rPr>
-              <a:t>DR2</a:t>
-            </a:r>
-            <a:endParaRPr lang="en-US" sz="1100"/>
-          </a:p>
-        </p:txBody>
-      </p:sp>
-      <p:pic>
-        <p:nvPicPr>
-          <p:cNvPr name="Picture 30" id="30"/>
-          <p:cNvPicPr>
-            <a:picLocks noChangeAspect="true"/>
-          </p:cNvPicPr>
-          <p:nvPr/>
-        </p:nvPicPr>
-        <p:blipFill>
-          <a:blip r:embed="rId4"/>
-          <a:stretch>
-            <a:fillRect/>
-          </a:stretch>
-        </p:blipFill>
-        <p:spPr>
-          <a:xfrm>
-            <a:off x="9296400" y="1689100"/>
-            <a:ext cx="254000" cy="254000"/>
-          </a:xfrm>
-          <a:prstGeom prst="rect">
-            <a:avLst/>
-          </a:prstGeom>
-        </p:spPr>
-      </p:pic>
-      <p:sp>
-        <p:nvSpPr>
-          <p:cNvPr name="TextBox 31" id="31"/>
-          <p:cNvSpPr txBox="true"/>
-          <p:nvPr/>
-        </p:nvSpPr>
-        <p:spPr>
-          <a:xfrm>
-            <a:off x="8763000" y="2959100"/>
-            <a:ext cx="1270000" cy="444500"/>
-          </a:xfrm>
-          <a:prstGeom prst="rect">
-            <a:avLst/>
-          </a:prstGeom>
-        </p:spPr>
-        <p:txBody>
-          <a:bodyPr anchor="t" rtlCol="false"/>
-          <a:lstStyle/>
-          <a:p>
-            <a:pPr algn="ctr">
-              <a:defRPr/>
-            </a:pPr>
-            <a:r>
-              <a:rPr lang="ru-RU"/>
-              <a:t/>
-            </a:r>
-            <a:r>
-              <a:rPr lang="en-US" sz="1400">
-                <a:latin typeface="Calibri"/>
-              </a:rPr>
-              <a:t>15-Apr-20</a:t>
-            </a:r>
-            <a:br>
-              <a:rPr lang="en-US" sz="1400">
-                <a:latin typeface="Calibri"/>
-              </a:rPr>
-            </a:br>
-            <a:r>
-              <a:rPr lang="en-US" sz="1400">
-                <a:latin typeface="Calibri"/>
-              </a:rPr>
-              <a:t>15-Apr-20</a:t>
-            </a:r>
-            <a:endParaRPr lang="en-US" sz="1100"/>
-          </a:p>
-        </p:txBody>
-      </p:sp>
-      <p:sp>
-        <p:nvSpPr>
-          <p:cNvPr name="AutoShape 32" id="32"/>
-          <p:cNvSpPr/>
-          <p:nvPr/>
-        </p:nvSpPr>
-        <p:spPr>
-          <a:xfrm>
-            <a:off x="10668000" y="2527300"/>
-            <a:ext cx="25400" cy="228600"/>
-          </a:xfrm>
-          <a:prstGeom prst="rect">
-            <a:avLst/>
-          </a:prstGeom>
-          <a:solidFill>
-            <a:srgbClr val="000000"/>
-          </a:solidFill>
-          <a:ln>
-            <a:solidFill>
-              <a:srgbClr val="000000"/>
-            </a:solidFill>
-          </a:ln>
-        </p:spPr>
-      </p:sp>
-      <p:sp>
-        <p:nvSpPr>
-          <p:cNvPr name="TextBox 33" id="33"/>
-          <p:cNvSpPr txBox="true"/>
-          <p:nvPr/>
-        </p:nvSpPr>
-        <p:spPr>
-          <a:xfrm>
-            <a:off x="10236200" y="2006600"/>
-            <a:ext cx="889000" cy="215900"/>
-          </a:xfrm>
-          <a:prstGeom prst="rect">
-            <a:avLst/>
-          </a:prstGeom>
-        </p:spPr>
-        <p:txBody>
-          <a:bodyPr anchor="t" rtlCol="false"/>
-          <a:lstStyle/>
-          <a:p>
-            <a:pPr algn="ctr">
-              <a:defRPr/>
-            </a:pPr>
-            <a:r>
-              <a:rPr lang="ru-RU"/>
-              <a:t/>
-            </a:r>
-            <a:r>
-              <a:rPr lang="en-US" sz="1400">
-                <a:latin typeface="Calibri"/>
-                <a:hlinkClick r:id="rId11" tooltip="http://www.google.com"/>
-              </a:rPr>
-              <a:t>DR2</a:t>
-            </a:r>
-            <a:endParaRPr lang="en-US" sz="1100"/>
-          </a:p>
-        </p:txBody>
-      </p:sp>
-      <p:pic>
-        <p:nvPicPr>
-          <p:cNvPr name="Picture 34" id="34"/>
-          <p:cNvPicPr>
-            <a:picLocks noChangeAspect="true"/>
-          </p:cNvPicPr>
-          <p:nvPr/>
-        </p:nvPicPr>
-        <p:blipFill>
-          <a:blip r:embed="rId4"/>
-          <a:stretch>
-            <a:fillRect/>
-          </a:stretch>
-        </p:blipFill>
-        <p:spPr>
-          <a:xfrm>
-            <a:off x="10566400" y="1689100"/>
-            <a:ext cx="254000" cy="254000"/>
-          </a:xfrm>
-          <a:prstGeom prst="rect">
-            <a:avLst/>
-          </a:prstGeom>
-        </p:spPr>
-      </p:pic>
-      <p:sp>
-        <p:nvSpPr>
-          <p:cNvPr name="TextBox 35" id="35"/>
-          <p:cNvSpPr txBox="true"/>
-          <p:nvPr/>
-        </p:nvSpPr>
-        <p:spPr>
-          <a:xfrm>
-            <a:off x="10033000" y="2959100"/>
-            <a:ext cx="1270000" cy="444500"/>
-          </a:xfrm>
-          <a:prstGeom prst="rect">
-            <a:avLst/>
-          </a:prstGeom>
-        </p:spPr>
-        <p:txBody>
-          <a:bodyPr anchor="t" rtlCol="false"/>
-          <a:lstStyle/>
-          <a:p>
-            <a:pPr algn="ctr">
-              <a:defRPr/>
-            </a:pPr>
-            <a:r>
-              <a:rPr lang="ru-RU"/>
-              <a:t/>
-            </a:r>
-            <a:r>
-              <a:rPr lang="en-US" sz="1400">
-                <a:latin typeface="Calibri"/>
-              </a:rPr>
-              <a:t>15-Apr-20</a:t>
-            </a:r>
-            <a:br>
-              <a:rPr lang="en-US" sz="1400">
-                <a:latin typeface="Calibri"/>
-              </a:rPr>
-            </a:br>
-            <a:r>
-              <a:rPr lang="en-US" sz="1400">
-                <a:latin typeface="Calibri"/>
-              </a:rPr>
-              <a:t>15-Apr-20</a:t>
-            </a:r>
-            <a:endParaRPr lang="en-US" sz="1100"/>
-          </a:p>
-        </p:txBody>
-      </p:sp>
-      <p:sp>
-        <p:nvSpPr>
-          <p:cNvPr name="AutoShape 36" id="36"/>
-          <p:cNvSpPr/>
-          <p:nvPr/>
-        </p:nvSpPr>
-        <p:spPr>
-          <a:xfrm>
-            <a:off x="11938000" y="2527300"/>
-            <a:ext cx="25400" cy="228600"/>
-          </a:xfrm>
-          <a:prstGeom prst="rect">
-            <a:avLst/>
-          </a:prstGeom>
-          <a:solidFill>
-            <a:srgbClr val="000000"/>
-          </a:solidFill>
-          <a:ln>
-            <a:solidFill>
-              <a:srgbClr val="000000"/>
-            </a:solidFill>
-          </a:ln>
-        </p:spPr>
-      </p:sp>
-      <p:sp>
-        <p:nvSpPr>
-          <p:cNvPr name="TextBox 37" id="37"/>
-          <p:cNvSpPr txBox="true"/>
-          <p:nvPr/>
-        </p:nvSpPr>
-        <p:spPr>
-          <a:xfrm>
-            <a:off x="11506200" y="2006600"/>
-            <a:ext cx="889000" cy="215900"/>
-          </a:xfrm>
-          <a:prstGeom prst="rect">
-            <a:avLst/>
-          </a:prstGeom>
-        </p:spPr>
-        <p:txBody>
-          <a:bodyPr anchor="t" rtlCol="false"/>
-          <a:lstStyle/>
-          <a:p>
-            <a:pPr algn="ctr">
-              <a:defRPr/>
-            </a:pPr>
-            <a:r>
-              <a:rPr lang="ru-RU"/>
-              <a:t/>
-            </a:r>
-            <a:r>
-              <a:rPr lang="en-US" sz="1400">
-                <a:latin typeface="Calibri"/>
-                <a:hlinkClick r:id="rId12" tooltip="http://www.google.com"/>
-              </a:rPr>
-              <a:t>DR3</a:t>
-            </a:r>
-            <a:endParaRPr lang="en-US" sz="1100"/>
-          </a:p>
-        </p:txBody>
-      </p:sp>
-      <p:pic>
-        <p:nvPicPr>
-          <p:cNvPr name="Picture 38" id="38"/>
-          <p:cNvPicPr>
-            <a:picLocks noChangeAspect="true"/>
-          </p:cNvPicPr>
-          <p:nvPr/>
-        </p:nvPicPr>
-        <p:blipFill>
-          <a:blip r:embed="rId6"/>
-          <a:stretch>
-            <a:fillRect/>
-          </a:stretch>
-        </p:blipFill>
-        <p:spPr>
-          <a:xfrm>
-            <a:off x="11836400" y="1689100"/>
-            <a:ext cx="254000" cy="254000"/>
-          </a:xfrm>
-          <a:prstGeom prst="rect">
-            <a:avLst/>
-          </a:prstGeom>
-        </p:spPr>
-      </p:pic>
-      <p:sp>
-        <p:nvSpPr>
-          <p:cNvPr name="TextBox 39" id="39"/>
-          <p:cNvSpPr txBox="true"/>
-          <p:nvPr/>
-        </p:nvSpPr>
-        <p:spPr>
-          <a:xfrm>
-            <a:off x="11303000" y="2959100"/>
-            <a:ext cx="1270000" cy="444500"/>
-          </a:xfrm>
-          <a:prstGeom prst="rect">
-            <a:avLst/>
-          </a:prstGeom>
-        </p:spPr>
-        <p:txBody>
-          <a:bodyPr anchor="t" rtlCol="false"/>
-          <a:lstStyle/>
-          <a:p>
-            <a:pPr algn="ctr">
-              <a:defRPr/>
-            </a:pPr>
-            <a:r>
-              <a:rPr lang="ru-RU"/>
-              <a:t/>
-            </a:r>
-            <a:r>
-              <a:rPr lang="en-US" sz="1400">
-                <a:latin typeface="Calibri"/>
-              </a:rPr>
-              <a:t>19-Apr-20</a:t>
-            </a:r>
-            <a:br>
-              <a:rPr lang="en-US" sz="1400">
-                <a:latin typeface="Calibri"/>
-              </a:rPr>
-            </a:br>
-            <a:r>
-              <a:rPr lang="en-US" sz="1400">
-                <a:latin typeface="Calibri"/>
-              </a:rPr>
-              <a:t>19-Apr-20</a:t>
-            </a:r>
-            <a:endParaRPr lang="en-US" sz="1100"/>
-          </a:p>
-        </p:txBody>
-      </p:sp>
-      <p:sp>
-        <p:nvSpPr>
-          <p:cNvPr name="AutoShape 40" id="40"/>
-          <p:cNvSpPr/>
-          <p:nvPr/>
-        </p:nvSpPr>
-        <p:spPr>
-          <a:xfrm>
-            <a:off x="13208000" y="2527300"/>
-            <a:ext cx="25400" cy="228600"/>
-          </a:xfrm>
-          <a:prstGeom prst="rect">
-            <a:avLst/>
-          </a:prstGeom>
-          <a:solidFill>
-            <a:srgbClr val="000000"/>
-          </a:solidFill>
-          <a:ln>
-            <a:solidFill>
-              <a:srgbClr val="000000"/>
-            </a:solidFill>
-          </a:ln>
-        </p:spPr>
-      </p:sp>
-      <p:sp>
-        <p:nvSpPr>
-          <p:cNvPr name="TextBox 41" id="41"/>
-          <p:cNvSpPr txBox="true"/>
-          <p:nvPr/>
-        </p:nvSpPr>
-        <p:spPr>
-          <a:xfrm>
-            <a:off x="12776200" y="2006600"/>
-            <a:ext cx="889000" cy="215900"/>
-          </a:xfrm>
-          <a:prstGeom prst="rect">
-            <a:avLst/>
-          </a:prstGeom>
-        </p:spPr>
-        <p:txBody>
-          <a:bodyPr anchor="t" rtlCol="false"/>
-          <a:lstStyle/>
-          <a:p>
-            <a:pPr algn="ctr">
-              <a:defRPr/>
-            </a:pPr>
-            <a:r>
-              <a:rPr lang="ru-RU"/>
-              <a:t/>
-            </a:r>
-            <a:r>
-              <a:rPr lang="en-US" sz="1400">
-                <a:latin typeface="Calibri"/>
-                <a:hlinkClick r:id="rId13" tooltip="http://www.google.com"/>
-              </a:rPr>
-              <a:t>DR3</a:t>
-            </a:r>
-            <a:endParaRPr lang="en-US" sz="1100"/>
-          </a:p>
-        </p:txBody>
-      </p:sp>
-      <p:pic>
-        <p:nvPicPr>
-          <p:cNvPr name="Picture 42" id="42"/>
-          <p:cNvPicPr>
-            <a:picLocks noChangeAspect="true"/>
-          </p:cNvPicPr>
-          <p:nvPr/>
-        </p:nvPicPr>
-        <p:blipFill>
-          <a:blip r:embed="rId6"/>
-          <a:stretch>
-            <a:fillRect/>
-          </a:stretch>
-        </p:blipFill>
-        <p:spPr>
-          <a:xfrm>
-            <a:off x="13106400" y="1689100"/>
-            <a:ext cx="254000" cy="254000"/>
-          </a:xfrm>
-          <a:prstGeom prst="rect">
-            <a:avLst/>
-          </a:prstGeom>
-        </p:spPr>
-      </p:pic>
-      <p:sp>
-        <p:nvSpPr>
-          <p:cNvPr name="TextBox 43" id="43"/>
-          <p:cNvSpPr txBox="true"/>
-          <p:nvPr/>
-        </p:nvSpPr>
-        <p:spPr>
-          <a:xfrm>
-            <a:off x="12573000" y="2959100"/>
-            <a:ext cx="1270000" cy="444500"/>
-          </a:xfrm>
-          <a:prstGeom prst="rect">
-            <a:avLst/>
-          </a:prstGeom>
-        </p:spPr>
-        <p:txBody>
-          <a:bodyPr anchor="t" rtlCol="false"/>
-          <a:lstStyle/>
-          <a:p>
-            <a:pPr algn="ctr">
-              <a:defRPr/>
-            </a:pPr>
-            <a:r>
-              <a:rPr lang="ru-RU"/>
-              <a:t/>
-            </a:r>
-            <a:r>
-              <a:rPr lang="en-US" sz="1400">
-                <a:latin typeface="Calibri"/>
-              </a:rPr>
-              <a:t>19-Apr-20</a:t>
-            </a:r>
-            <a:br>
-              <a:rPr lang="en-US" sz="1400">
-                <a:latin typeface="Calibri"/>
-              </a:rPr>
-            </a:br>
-            <a:r>
-              <a:rPr lang="en-US" sz="1400">
-                <a:latin typeface="Calibri"/>
-              </a:rPr>
-              <a:t>19-Apr-20</a:t>
-            </a:r>
-            <a:endParaRPr lang="en-US" sz="1100"/>
-          </a:p>
-        </p:txBody>
-      </p:sp>
-      <p:sp>
-        <p:nvSpPr>
-          <p:cNvPr name="AutoShape 44" id="44"/>
-          <p:cNvSpPr/>
-          <p:nvPr/>
-        </p:nvSpPr>
-        <p:spPr>
-          <a:xfrm>
-            <a:off x="14478000" y="2527300"/>
-            <a:ext cx="25400" cy="228600"/>
-          </a:xfrm>
-          <a:prstGeom prst="rect">
-            <a:avLst/>
-          </a:prstGeom>
-          <a:solidFill>
-            <a:srgbClr val="000000"/>
-          </a:solidFill>
-          <a:ln>
-            <a:solidFill>
-              <a:srgbClr val="000000"/>
-            </a:solidFill>
-          </a:ln>
-        </p:spPr>
-      </p:sp>
-      <p:sp>
-        <p:nvSpPr>
-          <p:cNvPr name="TextBox 45" id="45"/>
-          <p:cNvSpPr txBox="true"/>
-          <p:nvPr/>
-        </p:nvSpPr>
-        <p:spPr>
-          <a:xfrm>
-            <a:off x="14046200" y="2006600"/>
-            <a:ext cx="889000" cy="215900"/>
-          </a:xfrm>
-          <a:prstGeom prst="rect">
-            <a:avLst/>
-          </a:prstGeom>
-        </p:spPr>
-        <p:txBody>
-          <a:bodyPr anchor="t" rtlCol="false"/>
-          <a:lstStyle/>
-          <a:p>
-            <a:pPr algn="ctr">
-              <a:defRPr/>
-            </a:pPr>
-            <a:r>
-              <a:rPr lang="ru-RU"/>
-              <a:t/>
-            </a:r>
-            <a:r>
-              <a:rPr lang="en-US" sz="1400">
-                <a:latin typeface="Calibri"/>
-                <a:hlinkClick r:id="rId14" tooltip="http://www.google.com"/>
-              </a:rPr>
-              <a:t>DR3</a:t>
-            </a:r>
-            <a:endParaRPr lang="en-US" sz="1100"/>
-          </a:p>
-        </p:txBody>
-      </p:sp>
-      <p:pic>
-        <p:nvPicPr>
-          <p:cNvPr name="Picture 46" id="46"/>
-          <p:cNvPicPr>
-            <a:picLocks noChangeAspect="true"/>
-          </p:cNvPicPr>
-          <p:nvPr/>
-        </p:nvPicPr>
-        <p:blipFill>
-          <a:blip r:embed="rId6"/>
-          <a:stretch>
-            <a:fillRect/>
-          </a:stretch>
-        </p:blipFill>
-        <p:spPr>
-          <a:xfrm>
-            <a:off x="14376400" y="1689100"/>
-            <a:ext cx="254000" cy="254000"/>
-          </a:xfrm>
-          <a:prstGeom prst="rect">
-            <a:avLst/>
-          </a:prstGeom>
-        </p:spPr>
-      </p:pic>
-      <p:sp>
-        <p:nvSpPr>
-          <p:cNvPr name="TextBox 47" id="47"/>
-          <p:cNvSpPr txBox="true"/>
-          <p:nvPr/>
-        </p:nvSpPr>
-        <p:spPr>
-          <a:xfrm>
-            <a:off x="13843000" y="2959100"/>
-            <a:ext cx="1270000" cy="444500"/>
-          </a:xfrm>
-          <a:prstGeom prst="rect">
-            <a:avLst/>
-          </a:prstGeom>
-        </p:spPr>
-        <p:txBody>
-          <a:bodyPr anchor="t" rtlCol="false"/>
-          <a:lstStyle/>
-          <a:p>
-            <a:pPr algn="ctr">
-              <a:defRPr/>
-            </a:pPr>
-            <a:r>
-              <a:rPr lang="ru-RU"/>
-              <a:t/>
-            </a:r>
-            <a:r>
-              <a:rPr lang="en-US" sz="1400">
-                <a:latin typeface="Calibri"/>
-              </a:rPr>
-              <a:t>19-Apr-20</a:t>
-            </a:r>
-            <a:br>
-              <a:rPr lang="en-US" sz="1400">
-                <a:latin typeface="Calibri"/>
-              </a:rPr>
-            </a:br>
-            <a:r>
-              <a:rPr lang="en-US" sz="1400">
-                <a:latin typeface="Calibri"/>
-              </a:rPr>
-              <a:t>19-Apr-20</a:t>
-            </a:r>
-            <a:endParaRPr lang="en-US" sz="1100"/>
-          </a:p>
-        </p:txBody>
-      </p:sp>
-      <p:sp>
-        <p:nvSpPr>
-          <p:cNvPr name="AutoShape 48" id="48"/>
-          <p:cNvSpPr/>
-          <p:nvPr/>
-        </p:nvSpPr>
-        <p:spPr>
-          <a:xfrm>
-            <a:off x="8890000" y="2438400"/>
-            <a:ext cx="203200" cy="406400"/>
-          </a:xfrm>
-          <a:prstGeom prst="roundRect">
-            <a:avLst/>
-          </a:prstGeom>
-          <a:solidFill>
-            <a:srgbClr val="00FF00"/>
-          </a:solidFill>
-          <a:ln>
-            <a:solidFill>
-              <a:srgbClr val="000000"/>
-            </a:solidFill>
-          </a:ln>
-        </p:spPr>
         <p:txBody>
           <a:bodyPr anchor="t" rtlCol="false" anchorCtr="true"/>
           <a:lstStyle/>
@@ -5096,7 +3774,7 @@
             </a:pPr>
             <a:r>
               <a:rPr lang="en-US"/>
-              <a:t>G</a:t>
+              <a:t> </a:t>
             </a:r>
             <a:endParaRPr lang="en-US" sz="1100"/>
           </a:p>
@@ -5104,7 +3782,7 @@
       </p:sp>
       <p:sp>
         <p:nvSpPr>
-          <p:cNvPr name="TextBox 49" id="49"/>
+          <p:cNvPr name="TextBox 9" id="9"/>
           <p:cNvSpPr txBox="true"/>
           <p:nvPr/>
         </p:nvSpPr>
@@ -5140,7 +3818,7 @@
       </p:sp>
       <p:sp>
         <p:nvSpPr>
-          <p:cNvPr name="AutoShape 50" id="50"/>
+          <p:cNvPr name="AutoShape 10" id="10"/>
           <p:cNvSpPr/>
           <p:nvPr/>
         </p:nvSpPr>
@@ -5161,7 +3839,7 @@
       </p:sp>
       <p:graphicFrame>
         <p:nvGraphicFramePr>
-          <p:cNvPr name="Table 51" id="51"/>
+          <p:cNvPr name="Table 11" id="11"/>
           <p:cNvGraphicFramePr>
             <a:graphicFrameLocks noGrp="true"/>
           </p:cNvGraphicFramePr>
@@ -5253,7 +3931,7 @@
                         <a:rPr lang="en-US" sz="1400">
                           <a:latin typeface="Calibri"/>
                         </a:rPr>
-                        <a:t>Previous 08-Jan-19</a:t>
+                        <a:t>Previous </a:t>
                       </a:r>
                       <a:endParaRPr lang="en-US" sz="1100"/>
                     </a:p>
@@ -5312,7 +3990,7 @@
                         <a:rPr lang="en-US" sz="1400">
                           <a:latin typeface="Calibri"/>
                         </a:rPr>
-                        <a:t>Current 15-Apr-20</a:t>
+                        <a:t>Current </a:t>
                       </a:r>
                       <a:endParaRPr lang="en-US" sz="1100"/>
                     </a:p>
@@ -5490,11 +4168,11 @@
                       <a:r>
                         <a:rPr lang="en-US" sz="1400" b="true">
                           <a:solidFill>
-                            <a:srgbClr val="FF0000"/>
+                            <a:srgbClr val="C0C0C0"/>
                           </a:solidFill>
                           <a:latin typeface="Calibri"/>
                         </a:rPr>
-                        <a:t>R</a:t>
+                        <a:t> </a:t>
                       </a:r>
                       <a:endParaRPr lang="en-US" sz="1100"/>
                     </a:p>
@@ -5552,11 +4230,11 @@
                       <a:r>
                         <a:rPr lang="en-US" sz="1400" b="true">
                           <a:solidFill>
-                            <a:srgbClr val="00FF00"/>
+                            <a:srgbClr val="C0C0C0"/>
                           </a:solidFill>
                           <a:latin typeface="Calibri"/>
                         </a:rPr>
-                        <a:t>G</a:t>
+                        <a:t> </a:t>
                       </a:r>
                       <a:endParaRPr lang="en-US" sz="1100"/>
                     </a:p>
@@ -5615,7 +4293,7 @@
                         <a:rPr lang="en-US" sz="1400">
                           <a:latin typeface="Calibri"/>
                         </a:rPr>
-                        <a:t>Overall comment</a:t>
+                        <a:t/>
                       </a:r>
                       <a:endParaRPr lang="en-US" sz="1100"/>
                     </a:p>
@@ -5734,11 +4412,11 @@
                       <a:r>
                         <a:rPr lang="en-US" sz="1400" b="true">
                           <a:solidFill>
-                            <a:srgbClr val="FFC800"/>
+                            <a:srgbClr val="C0C0C0"/>
                           </a:solidFill>
                           <a:latin typeface="Calibri"/>
                         </a:rPr>
-                        <a:t>Y</a:t>
+                        <a:t> </a:t>
                       </a:r>
                       <a:endParaRPr lang="en-US" sz="1100"/>
                     </a:p>
@@ -5796,11 +4474,11 @@
                       <a:r>
                         <a:rPr lang="en-US" sz="1400" b="true">
                           <a:solidFill>
-                            <a:srgbClr val="FF0000"/>
+                            <a:srgbClr val="C0C0C0"/>
                           </a:solidFill>
                           <a:latin typeface="Calibri"/>
                         </a:rPr>
-                        <a:t>R</a:t>
+                        <a:t> </a:t>
                       </a:r>
                       <a:endParaRPr lang="en-US" sz="1100"/>
                     </a:p>
@@ -5859,7 +4537,7 @@
                         <a:rPr lang="en-US" sz="1400">
                           <a:latin typeface="Calibri"/>
                         </a:rPr>
-                        <a:t>Schedule comment</a:t>
+                        <a:t/>
                       </a:r>
                       <a:endParaRPr lang="en-US" sz="1100"/>
                     </a:p>
@@ -5978,11 +4656,11 @@
                       <a:r>
                         <a:rPr lang="en-US" sz="1400" b="true">
                           <a:solidFill>
-                            <a:srgbClr val="00FF00"/>
+                            <a:srgbClr val="C0C0C0"/>
                           </a:solidFill>
                           <a:latin typeface="Calibri"/>
                         </a:rPr>
-                        <a:t>G</a:t>
+                        <a:t> </a:t>
                       </a:r>
                       <a:endParaRPr lang="en-US" sz="1100"/>
                     </a:p>
@@ -6040,11 +4718,11 @@
                       <a:r>
                         <a:rPr lang="en-US" sz="1400" b="true">
                           <a:solidFill>
-                            <a:srgbClr val="FFC800"/>
+                            <a:srgbClr val="C0C0C0"/>
                           </a:solidFill>
                           <a:latin typeface="Calibri"/>
                         </a:rPr>
-                        <a:t>Y</a:t>
+                        <a:t> </a:t>
                       </a:r>
                       <a:endParaRPr lang="en-US" sz="1100"/>
                     </a:p>
@@ -6103,7 +4781,7 @@
                         <a:rPr lang="en-US" sz="1400">
                           <a:latin typeface="Calibri"/>
                         </a:rPr>
-                        <a:t>Scope comment</a:t>
+                        <a:t/>
                       </a:r>
                       <a:endParaRPr lang="en-US" sz="1100"/>
                     </a:p>
@@ -6222,11 +4900,11 @@
                       <a:r>
                         <a:rPr lang="en-US" sz="1400" b="true">
                           <a:solidFill>
-                            <a:srgbClr val="00FF00"/>
+                            <a:srgbClr val="C0C0C0"/>
                           </a:solidFill>
                           <a:latin typeface="Calibri"/>
                         </a:rPr>
-                        <a:t>G</a:t>
+                        <a:t> </a:t>
                       </a:r>
                       <a:endParaRPr lang="en-US" sz="1100"/>
                     </a:p>
@@ -6284,11 +4962,11 @@
                       <a:r>
                         <a:rPr lang="en-US" sz="1400" b="true">
                           <a:solidFill>
-                            <a:srgbClr val="FF0000"/>
+                            <a:srgbClr val="C0C0C0"/>
                           </a:solidFill>
                           <a:latin typeface="Calibri"/>
                         </a:rPr>
-                        <a:t>R</a:t>
+                        <a:t> </a:t>
                       </a:r>
                       <a:endParaRPr lang="en-US" sz="1100"/>
                     </a:p>
@@ -6347,7 +5025,7 @@
                         <a:rPr lang="en-US" sz="1400">
                           <a:latin typeface="Calibri"/>
                         </a:rPr>
-                        <a:t>Quality comment</a:t>
+                        <a:t/>
                       </a:r>
                       <a:endParaRPr lang="en-US" sz="1100"/>
                     </a:p>
@@ -6466,11 +5144,11 @@
                       <a:r>
                         <a:rPr lang="en-US" sz="1400" b="true">
                           <a:solidFill>
-                            <a:srgbClr val="FF0000"/>
+                            <a:srgbClr val="C0C0C0"/>
                           </a:solidFill>
                           <a:latin typeface="Calibri"/>
                         </a:rPr>
-                        <a:t>R</a:t>
+                        <a:t> </a:t>
                       </a:r>
                       <a:endParaRPr lang="en-US" sz="1100"/>
                     </a:p>
@@ -6528,11 +5206,11 @@
                       <a:r>
                         <a:rPr lang="en-US" sz="1400" b="true">
                           <a:solidFill>
-                            <a:srgbClr val="00FF00"/>
+                            <a:srgbClr val="C0C0C0"/>
                           </a:solidFill>
                           <a:latin typeface="Calibri"/>
                         </a:rPr>
-                        <a:t>G</a:t>
+                        <a:t> </a:t>
                       </a:r>
                       <a:endParaRPr lang="en-US" sz="1100"/>
                     </a:p>
@@ -6591,7 +5269,7 @@
                         <a:rPr lang="en-US" sz="1400">
                           <a:latin typeface="Calibri"/>
                         </a:rPr>
-                        <a:t>Cost comment</a:t>
+                        <a:t/>
                       </a:r>
                       <a:endParaRPr lang="en-US" sz="1100"/>
                     </a:p>
@@ -6703,9 +5381,9 @@
             <a:r>
               <a:rPr lang="en-US" sz="1400">
                 <a:latin typeface="Calibri"/>
-                <a:hlinkClick r:id="rId2" tooltip="http://ya.ru"/>
+                <a:hlinkClick r:id="rId2" tooltip=""/>
               </a:rPr>
-              <a:t>Project from Facade</a:t>
+              <a:t/>
             </a:r>
             <a:br>
               <a:rPr lang="en-US" sz="1400">
@@ -6722,7 +5400,7 @@
               <a:rPr lang="en-US" sz="1400">
                 <a:latin typeface="Calibri"/>
               </a:rPr>
-              <a:t>IKSANOV Aleksandr</a:t>
+              <a:t/>
             </a:r>
             <a:br>
               <a:rPr lang="en-US" sz="1400">
@@ -6775,7 +5453,7 @@
               <a:rPr lang="en-US" sz="1400" b="true">
                 <a:latin typeface="Calibri"/>
               </a:rPr>
-              <a:t>Summary title Summary title Summary title Summary title Summary title </a:t>
+              <a:t/>
             </a:r>
             <a:endParaRPr lang="en-US" sz="1100"/>
           </a:p>
@@ -6829,59 +5507,6 @@
               <a:t/>
             </a:r>
             <a:endParaRPr lang="en-US" sz="1100"/>
-          </a:p>
-          <a:p/>
-          <a:p>
-            <a:r>
-              <a:rPr lang="en-US" sz="1400" u="sng" b="true">
-                <a:solidFill>
-                  <a:srgbClr val="00FF00"/>
-                </a:solidFill>
-                <a:latin typeface="Calibri"/>
-              </a:rPr>
-              <a:t>That`s all, folks!</a:t>
-            </a:r>
-          </a:p>
-          <a:p>
-            <a:r>
-              <a:rPr lang="en-US" sz="1400" b="true">
-                <a:solidFill>
-                  <a:srgbClr val="FF0000"/>
-                </a:solidFill>
-                <a:latin typeface="Calibri"/>
-              </a:rPr>
-              <a:t>Red Flag</a:t>
-            </a:r>
-          </a:p>
-          <a:p>
-            <a:r>
-              <a:rPr lang="en-US" sz="1400" u="sng" b="true">
-                <a:solidFill>
-                  <a:srgbClr val="00FF00"/>
-                </a:solidFill>
-                <a:latin typeface="Calibri"/>
-              </a:rPr>
-              <a:t>That`s all, folks!</a:t>
-            </a:r>
-          </a:p>
-          <a:p>
-            <a:r>
-              <a:rPr lang="en-US" sz="1400" b="true">
-                <a:solidFill>
-                  <a:srgbClr val="FFA500"/>
-                </a:solidFill>
-                <a:latin typeface="Calibri"/>
-              </a:rPr>
-              <a:t>Yellow Flag</a:t>
-            </a:r>
-          </a:p>
-          <a:p>
-            <a:r>
-              <a:rPr lang="en-US" sz="1400">
-                <a:latin typeface="Calibri"/>
-              </a:rPr>
-              <a:t>\n" + "1PowerPoint documents are made up of a tree of records. A record may contain either other records (in which case it is a Container), or data (in which case it's an Atom). A record can't hold both. PowerPoint documents don't have one overall container record. Instead, there are a number of different container records to be found at the top level. Any numbers or strings stored in the records are always stored in Little Endian format (least important bytes first). This is the case no matter what platform the file was written on - be that a Little Endian or a Big Endian system. PowerPoint may have Escher (DDF) records embedded in it. These are always held as the children of a PPDrawing record (record type 1036). Escher records have the same format as PowerPoint records. Hello mate! Hello mate! Hello mate! Hello mate! Hello mate! Hello mate! Hello mate! Hello mate! Hello mate! This is bold and underscore and both and not true false PowerPoint documents are made up of a tree of records. A record may contain either other records (in which case it is a Container), or data (in which case it's an Atom). A record can't hold both. PowerPoint documents don't have one overall container record. Instead, there are a number of different container records to be found at the top level. Any numbers or strings stored in the records are always stored in Little Endian format (least important bytes first). This is the case no matter what platform the file was written on - be that a Little Endian or a Big Endian system. PowerPoint may have Escher (DDF) records embedded in it. These are always held as the children of a PPDrawing record (record type 1036). Escher records have the same format as PowerPoint records. A record may contain either other records (in which case it is a Container), or data (in which case it's an Atom). A record can't hold both. PowerPoint documents don't have one overall container record PowerPoint documents are made up of a tree of records. A record may contain either other records (in which case it is a Container), or data (in which case it's an Atom). A record can't hold both. PowerPoint documents don't have one overall container record. Instead, there are a number of different container records to be found at the top level. Any numbers or strings stored in the records are always stored in Little Endian format (least important bytes first). This is the case no matter what platform the file was written on - be that a Little Endian or a Big Endian system. PowerPoint may have Escher (DDF) records embedded in it. These are always held as the children of a PPDrawing record (record type 1036). Escher records have the same format as PowerPoint records. Hello mate! Hello mate! Hello mate! Hello mate! Hello mate! Hello mate! Hello mate! Hello mate! Hello mate! This is bold and underscore and both and not true false PowerPoint documents are made up of a tree of records. A record may contain either other records (in which case it is a Container), or data (in which case it's an Atom). A record can't hold both. PowerPoint documents don't have one overall container record. Instead, there are a number of different container records to be found at the top level. Any numbers or strings stored in the records are always stored in Little Endian format (least important bytes first). This is the case no matter what platform the file was written on - be that a Little Endian or a Big Endian system. PowerPoint may have Escher (DDF) records embedded in it. These are always held as the children of a PPDrawing record (record type 1036). Escher records have the same format as PowerPoint records. Hello mate! Hello mate! Hello mate! Hello mate! Hello mate! Hello mate! Hello mate! Hello mate! Hello mate! This is bold and underscore and both and not true false PowerPoint documents are made up of a tree of records. A record may contain either other records (in which case it is a Container), or data (in which case it's an Atom). A record can't hold both. PowerPoint documents don't have one overall container record documents don't have one overall container record. Instead, there are a number of different container records to be found at the top level. Any numbers or strings stored in the records are always stored in Little Endian format (least important bytes first). This is the case no matter what platform the file was written on - be that a Little Endian or a Big Endian system. PowerPoint may have Escher (DDF) records embedded in it. These are always held as the children of a PPDrawing record (record type 1036). " + "</a:t>
-            </a:r>
           </a:p>
         </p:txBody>
       </p:sp>
@@ -6945,9 +5570,9 @@
             <a:r>
               <a:rPr lang="en-US" sz="1400">
                 <a:latin typeface="Calibri"/>
-                <a:hlinkClick r:id="rId2" tooltip="http://ya.ru"/>
+                <a:hlinkClick r:id="rId2" tooltip=""/>
               </a:rPr>
-              <a:t>Project from Facade</a:t>
+              <a:t/>
             </a:r>
             <a:br>
               <a:rPr lang="en-US" sz="1400">
@@ -6964,7 +5589,7 @@
               <a:rPr lang="en-US" sz="1400">
                 <a:latin typeface="Calibri"/>
               </a:rPr>
-              <a:t>IKSANOV Aleksandr</a:t>
+              <a:t/>
             </a:r>
             <a:br>
               <a:rPr lang="en-US" sz="1400">
@@ -7017,7 +5642,7 @@
               <a:rPr lang="en-US" sz="1400" b="true">
                 <a:latin typeface="Calibri"/>
               </a:rPr>
-              <a:t>Summary title Summary title Summary title Summary title Summary title </a:t>
+              <a:t>Risks</a:t>
             </a:r>
             <a:endParaRPr lang="en-US" sz="1100"/>
           </a:p>
@@ -7070,76 +5695,8 @@
               <a:rPr lang="ru-RU"/>
               <a:t/>
             </a:r>
-            <a:r>
-              <a:rPr lang="en-US" sz="1400">
-                <a:solidFill>
-                  <a:srgbClr val="FF0000"/>
-                </a:solidFill>
-                <a:latin typeface="Calibri"/>
-              </a:rPr>
-              <a:t>2Escher records have the same format as PowerPoint records. Hello mate! Hello mate! Hello mate! Hello mate! Hello mate! Hello mate! Hello mate! Hello mate! Hello mate! This is bold and underscore and both and not true false PowerPoint documents are made up of a tree of records. A record may contain either other records (in which case it is a Container), or data (in which case it's an Atom). A record can't hold both. PowerPoint documents don't have one overall container record. Instead, there are a number of different container records to be found at the top level. Any numbers or strings stored in the records are always stored in Little Endian format (least important bytes first). This is the case no matter what platform the file was written on - be that a Little Endian or a Big Endian system. PowerPoint may have Escher (DDF) records embedded in it. These are always held as the children of a PPDrawing record (record type 1036). Escher records have the same format as PowerPoint records. Hello mate! Hello mate! Hello mate! Hello mate! Hello mate! Hello mate! Hello mate! Hello mate! Hello mate! This is bold and underscore and both and not true false PowerPoint documents are made up of a tree of records. A record may contain either other records (in which case it is a Container), or data (in which case it's an Atom). A record can't hold both. PowerPoint documents don't have one overall container record\n</a:t>
-            </a:r>
-            <a:r>
-              <a:rPr lang="en-US" sz="1400">
-                <a:latin typeface="Calibri"/>
-              </a:rPr>
-              <a:t>" + "</a:t>
-            </a:r>
-            <a:r>
-              <a:rPr lang="en-US" sz="1400">
-                <a:solidFill>
-                  <a:srgbClr val="00FF00"/>
-                </a:solidFill>
-                <a:latin typeface="Calibri"/>
-              </a:rPr>
-              <a:t>3Escher records have the same format as PowerPoint records. Hello mate! Hello mate! Hello mate! Hello mate! Hello mate! Hello mate! Hello mate! Hello mate! Hello mate! This is bold and underscore and both and not true false PowerPoint documents are made up of a tree of records. A record may contain either other records (in which case it is a Container), or data (in which case it's an Atom). A record can't hold both. PowerPoint documents don't have one overall container record. Instead, there are a number of different container records to be found at the top level. Any numbers or strings stored in the records are always stored in Little Endian format (least important bytes first). This is the case no matter what platform the file was written on - be that a Little Endian or a Big Endian system. PowerPoint may have Escher (DDF) records embedded in it. These are always held as the children of a PPDrawing record (record type 1036). Escher records have the same format as PowerPoint records. Hello mate! Hello mate! Hello mate! Hello mate! Hello mate! Hello mate! Hello mate! Hello mate! Hello mate! This is bold and underscore and both and not true false PowerPoint documents are made up of a tree of records. A record may contain either other records (in which case it is a Container), or data (in which case it's an Atom). A record can't hold both. PowerPoint documents don't have one overall container record\n</a:t>
-            </a:r>
-            <a:r>
-              <a:rPr lang="en-US" sz="1400">
-                <a:latin typeface="Calibri"/>
-              </a:rPr>
-              <a:t>" + "</a:t>
-            </a:r>
-            <a:r>
-              <a:rPr lang="en-US" sz="1400">
-                <a:solidFill>
-                  <a:srgbClr val="0000FF"/>
-                </a:solidFill>
-                <a:latin typeface="Calibri"/>
-              </a:rPr>
-              <a:t>4Escher records have the same format as PowerPoint records. Hello mate! Hello mate! Hello mate! Hello mate! Hello mate! Hello mate! Hello mate! Hello mate! Hello mate! This is bold and underscore and both and not true false PowerPoint documents are made up of a tree of records. A record may contain either other records (in which case it is a Container), or data (in which case it's an Atom). A record can't hold both. PowerPoint documents don't have one overall container record. Instead, there are a number of different container records to be found at the top level. Any numbers or strings stored in the records are always stored in Little Endian format (least important bytes first). This is the case no matter what platform the file was written on - be that a Little Endian or a Big Endian system. PowerPoint may have Escher (DDF) records embedded in it. These are always held as the children of a PPDrawing record (record type 1036). Escher records have the same format as PowerPoint records. Hello mate! Hello mate! Hello mate! Hello mate! Hello mate! Hello mate! Hello mate! Hello mate! Hello mate! This is bold and underscore and both and not true false PowerPoint documents are made up of a tree of records. A record may contain either other records (in which case it is a Container), or data (in which case it's an Atom). A record can't hold both. PowerPoint documents don't have one overall container record\n</a:t>
-            </a:r>
-            <a:r>
-              <a:rPr lang="en-US" sz="1400">
-                <a:latin typeface="Calibri"/>
-              </a:rPr>
-              <a:t>" + "</a:t>
-            </a:r>
             <a:endParaRPr lang="en-US" sz="1100"/>
           </a:p>
-          <a:p>
-            <a:r>
-              <a:rPr lang="en-US" sz="1400" b="true">
-                <a:solidFill>
-                  <a:srgbClr val="00FF00"/>
-                </a:solidFill>
-                <a:latin typeface="Calibri"/>
-              </a:rPr>
-              <a:t>Green Flag</a:t>
-            </a:r>
-          </a:p>
-          <a:p>
-            <a:r>
-              <a:rPr lang="en-US" sz="1400" u="sng" b="true">
-                <a:solidFill>
-                  <a:srgbClr val="00FF00"/>
-                </a:solidFill>
-                <a:latin typeface="Calibri"/>
-              </a:rPr>
-              <a:t>That`s all, folks!</a:t>
-            </a:r>
-          </a:p>
-          <a:p/>
         </p:txBody>
       </p:sp>
     </p:spTree>
@@ -7202,9 +5759,9 @@
             <a:r>
               <a:rPr lang="en-US" sz="1400">
                 <a:latin typeface="Calibri"/>
-                <a:hlinkClick r:id="rId2" tooltip="http://ya.ru"/>
+                <a:hlinkClick r:id="rId2" tooltip=""/>
               </a:rPr>
-              <a:t>Project from Facade</a:t>
+              <a:t/>
             </a:r>
             <a:br>
               <a:rPr lang="en-US" sz="1400">
@@ -7221,7 +5778,7 @@
               <a:rPr lang="en-US" sz="1400">
                 <a:latin typeface="Calibri"/>
               </a:rPr>
-              <a:t>IKSANOV Aleksandr</a:t>
+              <a:t/>
             </a:r>
             <a:br>
               <a:rPr lang="en-US" sz="1400">
@@ -7274,7 +5831,7 @@
               <a:rPr lang="en-US" sz="1400" b="true">
                 <a:latin typeface="Calibri"/>
               </a:rPr>
-              <a:t>Risks</a:t>
+              <a:t>Scope Definition</a:t>
             </a:r>
             <a:endParaRPr lang="en-US" sz="1100"/>
           </a:p>
@@ -7328,366 +5885,6 @@
               <a:t/>
             </a:r>
             <a:endParaRPr lang="en-US" sz="1100"/>
-          </a:p>
-          <a:p>
-            <a:r>
-              <a:rPr lang="en-US" sz="1400" b="true" u="sng">
-                <a:solidFill>
-                  <a:srgbClr val="FF0000"/>
-                </a:solidFill>
-                <a:latin typeface="Calibri"/>
-              </a:rPr>
-              <a:t>High Risks</a:t>
-            </a:r>
-          </a:p>
-          <a:p>
-            <a:pPr lvl="1">
-              <a:buFont typeface="Arial"/>
-              <a:buChar char="-"/>
-            </a:pPr>
-            <a:r>
-              <a:rPr lang="en-US" sz="1400" b="true">
-                <a:latin typeface="Calibri"/>
-              </a:rPr>
-              <a:t>Risk: </a:t>
-            </a:r>
-            <a:r>
-              <a:rPr lang="en-US" sz="1400">
-                <a:latin typeface="Calibri"/>
-              </a:rPr>
-              <a:t>Description High</a:t>
-            </a:r>
-            <a:br>
-              <a:rPr lang="en-US" sz="1400">
-                <a:latin typeface="Calibri"/>
-              </a:rPr>
-            </a:br>
-            <a:r>
-              <a:rPr lang="en-US" sz="1400" u="sng">
-                <a:latin typeface="Calibri"/>
-              </a:rPr>
-              <a:t>Description: </a:t>
-            </a:r>
-            <a:r>
-              <a:rPr lang="en-US" sz="1400">
-                <a:latin typeface="Calibri"/>
-              </a:rPr>
-              <a:t>Impact High</a:t>
-            </a:r>
-            <a:br>
-              <a:rPr lang="en-US" sz="1400">
-                <a:latin typeface="Calibri"/>
-              </a:rPr>
-            </a:br>
-            <a:r>
-              <a:rPr lang="en-US" sz="1400" u="sng">
-                <a:latin typeface="Calibri"/>
-              </a:rPr>
-              <a:t>Mitigation Plan: </a:t>
-            </a:r>
-            <a:r>
-              <a:rPr lang="en-US" sz="1400">
-                <a:latin typeface="Calibri"/>
-              </a:rPr>
-              <a:t>Mitigation High</a:t>
-            </a:r>
-          </a:p>
-          <a:p>
-            <a:pPr lvl="1">
-              <a:buFont typeface="Arial"/>
-              <a:buChar char="-"/>
-            </a:pPr>
-            <a:r>
-              <a:rPr lang="en-US" sz="1400" b="true">
-                <a:latin typeface="Calibri"/>
-              </a:rPr>
-              <a:t>Risk: </a:t>
-            </a:r>
-            <a:r>
-              <a:rPr lang="en-US" sz="1400">
-                <a:latin typeface="Calibri"/>
-              </a:rPr>
-              <a:t>Description High</a:t>
-            </a:r>
-            <a:br>
-              <a:rPr lang="en-US" sz="1400">
-                <a:latin typeface="Calibri"/>
-              </a:rPr>
-            </a:br>
-            <a:r>
-              <a:rPr lang="en-US" sz="1400" u="sng">
-                <a:latin typeface="Calibri"/>
-              </a:rPr>
-              <a:t>Description: </a:t>
-            </a:r>
-            <a:r>
-              <a:rPr lang="en-US" sz="1400">
-                <a:latin typeface="Calibri"/>
-              </a:rPr>
-              <a:t>Impact High</a:t>
-            </a:r>
-            <a:br>
-              <a:rPr lang="en-US" sz="1400">
-                <a:latin typeface="Calibri"/>
-              </a:rPr>
-            </a:br>
-            <a:r>
-              <a:rPr lang="en-US" sz="1400" u="sng">
-                <a:latin typeface="Calibri"/>
-              </a:rPr>
-              <a:t>Mitigation Plan: </a:t>
-            </a:r>
-            <a:r>
-              <a:rPr lang="en-US" sz="1400">
-                <a:latin typeface="Calibri"/>
-              </a:rPr>
-              <a:t>Mitigation High</a:t>
-            </a:r>
-            <a:br>
-              <a:rPr lang="en-US" sz="1400">
-                <a:latin typeface="Calibri"/>
-              </a:rPr>
-            </a:br>
-          </a:p>
-          <a:p>
-            <a:r>
-              <a:rPr lang="en-US" sz="1400" b="true" u="sng">
-                <a:solidFill>
-                  <a:srgbClr val="FFC800"/>
-                </a:solidFill>
-                <a:latin typeface="Calibri"/>
-              </a:rPr>
-              <a:t>Moderate Risks</a:t>
-            </a:r>
-          </a:p>
-          <a:p>
-            <a:pPr lvl="1">
-              <a:buFont typeface="Arial"/>
-              <a:buChar char="-"/>
-            </a:pPr>
-            <a:r>
-              <a:rPr lang="en-US" sz="1400" b="true">
-                <a:latin typeface="Calibri"/>
-              </a:rPr>
-              <a:t>Risk: </a:t>
-            </a:r>
-            <a:r>
-              <a:rPr lang="en-US" sz="1400">
-                <a:latin typeface="Calibri"/>
-              </a:rPr>
-              <a:t>Description Moderate</a:t>
-            </a:r>
-            <a:br>
-              <a:rPr lang="en-US" sz="1400">
-                <a:latin typeface="Calibri"/>
-              </a:rPr>
-            </a:br>
-            <a:r>
-              <a:rPr lang="en-US" sz="1400" u="sng">
-                <a:latin typeface="Calibri"/>
-              </a:rPr>
-              <a:t>Description: </a:t>
-            </a:r>
-            <a:r>
-              <a:rPr lang="en-US" sz="1400">
-                <a:latin typeface="Calibri"/>
-              </a:rPr>
-              <a:t>Impact Moderate</a:t>
-            </a:r>
-            <a:br>
-              <a:rPr lang="en-US" sz="1400">
-                <a:latin typeface="Calibri"/>
-              </a:rPr>
-            </a:br>
-            <a:r>
-              <a:rPr lang="en-US" sz="1400" u="sng">
-                <a:latin typeface="Calibri"/>
-              </a:rPr>
-              <a:t>Mitigation Plan: </a:t>
-            </a:r>
-            <a:r>
-              <a:rPr lang="en-US" sz="1400">
-                <a:latin typeface="Calibri"/>
-              </a:rPr>
-              <a:t>Mitigation Moderate</a:t>
-            </a:r>
-          </a:p>
-          <a:p>
-            <a:pPr lvl="1">
-              <a:buFont typeface="Arial"/>
-              <a:buChar char="-"/>
-            </a:pPr>
-            <a:r>
-              <a:rPr lang="en-US" sz="1400" b="true">
-                <a:latin typeface="Calibri"/>
-              </a:rPr>
-              <a:t>Risk: </a:t>
-            </a:r>
-            <a:r>
-              <a:rPr lang="en-US" sz="1400">
-                <a:latin typeface="Calibri"/>
-              </a:rPr>
-              <a:t>Description Moderate</a:t>
-            </a:r>
-            <a:br>
-              <a:rPr lang="en-US" sz="1400">
-                <a:latin typeface="Calibri"/>
-              </a:rPr>
-            </a:br>
-            <a:r>
-              <a:rPr lang="en-US" sz="1400" u="sng">
-                <a:latin typeface="Calibri"/>
-              </a:rPr>
-              <a:t>Description: </a:t>
-            </a:r>
-            <a:r>
-              <a:rPr lang="en-US" sz="1400">
-                <a:latin typeface="Calibri"/>
-              </a:rPr>
-              <a:t>Impact Moderate</a:t>
-            </a:r>
-            <a:br>
-              <a:rPr lang="en-US" sz="1400">
-                <a:latin typeface="Calibri"/>
-              </a:rPr>
-            </a:br>
-            <a:r>
-              <a:rPr lang="en-US" sz="1400" u="sng">
-                <a:latin typeface="Calibri"/>
-              </a:rPr>
-              <a:t>Mitigation Plan: </a:t>
-            </a:r>
-            <a:r>
-              <a:rPr lang="en-US" sz="1400">
-                <a:latin typeface="Calibri"/>
-              </a:rPr>
-              <a:t>Mitigation Moderate</a:t>
-            </a:r>
-            <a:br>
-              <a:rPr lang="en-US" sz="1400">
-                <a:latin typeface="Calibri"/>
-              </a:rPr>
-            </a:br>
-          </a:p>
-          <a:p>
-            <a:r>
-              <a:rPr lang="en-US" sz="1400" b="true" u="sng">
-                <a:solidFill>
-                  <a:srgbClr val="00FF00"/>
-                </a:solidFill>
-                <a:latin typeface="Calibri"/>
-              </a:rPr>
-              <a:t>Low Risks</a:t>
-            </a:r>
-          </a:p>
-          <a:p>
-            <a:pPr lvl="1">
-              <a:buFont typeface="Arial"/>
-              <a:buChar char="-"/>
-            </a:pPr>
-            <a:r>
-              <a:rPr lang="en-US" sz="1400" b="true">
-                <a:latin typeface="Calibri"/>
-              </a:rPr>
-              <a:t>Risk: </a:t>
-            </a:r>
-            <a:r>
-              <a:rPr lang="en-US" sz="1400">
-                <a:latin typeface="Calibri"/>
-              </a:rPr>
-              <a:t>Description Low</a:t>
-            </a:r>
-            <a:br>
-              <a:rPr lang="en-US" sz="1400">
-                <a:latin typeface="Calibri"/>
-              </a:rPr>
-            </a:br>
-            <a:r>
-              <a:rPr lang="en-US" sz="1400" u="sng">
-                <a:latin typeface="Calibri"/>
-              </a:rPr>
-              <a:t>Description: </a:t>
-            </a:r>
-            <a:r>
-              <a:rPr lang="en-US" sz="1400">
-                <a:latin typeface="Calibri"/>
-              </a:rPr>
-              <a:t>Impact Low</a:t>
-            </a:r>
-            <a:br>
-              <a:rPr lang="en-US" sz="1400">
-                <a:latin typeface="Calibri"/>
-              </a:rPr>
-            </a:br>
-            <a:r>
-              <a:rPr lang="en-US" sz="1400" u="sng">
-                <a:latin typeface="Calibri"/>
-              </a:rPr>
-              <a:t>Mitigation Plan: </a:t>
-            </a:r>
-            <a:r>
-              <a:rPr lang="en-US" sz="1400">
-                <a:latin typeface="Calibri"/>
-              </a:rPr>
-              <a:t>Mitigation Low</a:t>
-            </a:r>
-          </a:p>
-          <a:p>
-            <a:pPr lvl="1">
-              <a:buFont typeface="Arial"/>
-              <a:buChar char="-"/>
-            </a:pPr>
-            <a:r>
-              <a:rPr lang="en-US" sz="1400" b="true">
-                <a:latin typeface="Calibri"/>
-              </a:rPr>
-              <a:t>Risk: </a:t>
-            </a:r>
-            <a:r>
-              <a:rPr lang="en-US" sz="1400">
-                <a:latin typeface="Calibri"/>
-              </a:rPr>
-              <a:t>Description Low</a:t>
-            </a:r>
-            <a:br>
-              <a:rPr lang="en-US" sz="1400">
-                <a:latin typeface="Calibri"/>
-              </a:rPr>
-            </a:br>
-            <a:r>
-              <a:rPr lang="en-US" sz="1400" u="sng">
-                <a:latin typeface="Calibri"/>
-              </a:rPr>
-              <a:t>Description: </a:t>
-            </a:r>
-            <a:r>
-              <a:rPr lang="en-US" sz="1400">
-                <a:latin typeface="Calibri"/>
-              </a:rPr>
-              <a:t>Impact Low</a:t>
-            </a:r>
-            <a:br>
-              <a:rPr lang="en-US" sz="1400">
-                <a:latin typeface="Calibri"/>
-              </a:rPr>
-            </a:br>
-            <a:r>
-              <a:rPr lang="en-US" sz="1400" u="sng">
-                <a:latin typeface="Calibri"/>
-              </a:rPr>
-              <a:t>Mitigation Plan: </a:t>
-            </a:r>
-            <a:r>
-              <a:rPr lang="en-US" sz="1400">
-                <a:latin typeface="Calibri"/>
-              </a:rPr>
-              <a:t>Mitigation Low</a:t>
-            </a:r>
-            <a:br>
-              <a:rPr lang="en-US" sz="1400">
-                <a:latin typeface="Calibri"/>
-              </a:rPr>
-            </a:br>
           </a:p>
         </p:txBody>
       </p:sp>
@@ -7751,9 +5948,9 @@
             <a:r>
               <a:rPr lang="en-US" sz="1400">
                 <a:latin typeface="Calibri"/>
-                <a:hlinkClick r:id="rId2" tooltip="http://ya.ru"/>
+                <a:hlinkClick r:id="rId2" tooltip=""/>
               </a:rPr>
-              <a:t>Project from Facade</a:t>
+              <a:t/>
             </a:r>
             <a:br>
               <a:rPr lang="en-US" sz="1400">
@@ -7770,7 +5967,7 @@
               <a:rPr lang="en-US" sz="1400">
                 <a:latin typeface="Calibri"/>
               </a:rPr>
-              <a:t>IKSANOV Aleksandr</a:t>
+              <a:t/>
             </a:r>
             <a:br>
               <a:rPr lang="en-US" sz="1400">
@@ -7823,7 +6020,7 @@
               <a:rPr lang="en-US" sz="1400" b="true">
                 <a:latin typeface="Calibri"/>
               </a:rPr>
-              <a:t>Scope Definition</a:t>
+              <a:t>Other Information</a:t>
             </a:r>
             <a:endParaRPr lang="en-US" sz="1100"/>
           </a:p>
@@ -7878,807 +6075,6 @@
             </a:r>
             <a:endParaRPr lang="en-US" sz="1100"/>
           </a:p>
-          <a:p>
-            <a:pPr>
-              <a:buFont typeface="Arial"/>
-              <a:buChar char="-"/>
-            </a:pPr>
-            <a:r>
-              <a:rPr lang="en-US" sz="1400" b="true" u="sng">
-                <a:latin typeface="Calibri"/>
-              </a:rPr>
-              <a:t>SuperId1: </a:t>
-            </a:r>
-            <a:r>
-              <a:rPr lang="en-US" sz="1400">
-                <a:latin typeface="Calibri"/>
-              </a:rPr>
-              <a:t>Hreadline</a:t>
-            </a:r>
-            <a:r>
-              <a:rPr lang="en-US" sz="1400" u="sng">
-                <a:latin typeface="Calibri"/>
-              </a:rPr>
-              <a:t> Status: </a:t>
-            </a:r>
-            <a:r>
-              <a:rPr lang="en-US" sz="1400">
-                <a:latin typeface="Calibri"/>
-              </a:rPr>
-              <a:t>Done</a:t>
-            </a:r>
-          </a:p>
-          <a:p>
-            <a:pPr>
-              <a:buFont typeface="Arial"/>
-              <a:buChar char="-"/>
-            </a:pPr>
-            <a:r>
-              <a:rPr lang="en-US" sz="1400" b="true" u="sng">
-                <a:latin typeface="Calibri"/>
-              </a:rPr>
-              <a:t>SuperId2222: </a:t>
-            </a:r>
-            <a:r>
-              <a:rPr lang="en-US" sz="1400">
-                <a:latin typeface="Calibri"/>
-              </a:rPr>
-              <a:t>Hreadline</a:t>
-            </a:r>
-            <a:r>
-              <a:rPr lang="en-US" sz="1400" u="sng">
-                <a:latin typeface="Calibri"/>
-              </a:rPr>
-              <a:t> Status: </a:t>
-            </a:r>
-            <a:r>
-              <a:rPr lang="en-US" sz="1400">
-                <a:latin typeface="Calibri"/>
-              </a:rPr>
-              <a:t>Done</a:t>
-            </a:r>
-          </a:p>
-          <a:p>
-            <a:pPr>
-              <a:buFont typeface="Arial"/>
-              <a:buChar char="-"/>
-            </a:pPr>
-            <a:r>
-              <a:rPr lang="en-US" sz="1400" b="true" u="sng">
-                <a:latin typeface="Calibri"/>
-              </a:rPr>
-              <a:t>SuperId1: </a:t>
-            </a:r>
-            <a:r>
-              <a:rPr lang="en-US" sz="1400">
-                <a:latin typeface="Calibri"/>
-              </a:rPr>
-              <a:t>Hreadline</a:t>
-            </a:r>
-            <a:r>
-              <a:rPr lang="en-US" sz="1400" u="sng">
-                <a:latin typeface="Calibri"/>
-              </a:rPr>
-              <a:t> Status: </a:t>
-            </a:r>
-            <a:r>
-              <a:rPr lang="en-US" sz="1400">
-                <a:latin typeface="Calibri"/>
-              </a:rPr>
-              <a:t>Done</a:t>
-            </a:r>
-          </a:p>
-          <a:p>
-            <a:pPr>
-              <a:buFont typeface="Arial"/>
-              <a:buChar char="-"/>
-            </a:pPr>
-            <a:r>
-              <a:rPr lang="en-US" sz="1400" b="true" u="sng">
-                <a:latin typeface="Calibri"/>
-              </a:rPr>
-              <a:t>SuperId2222: </a:t>
-            </a:r>
-            <a:r>
-              <a:rPr lang="en-US" sz="1400">
-                <a:latin typeface="Calibri"/>
-              </a:rPr>
-              <a:t>Hreadline</a:t>
-            </a:r>
-            <a:r>
-              <a:rPr lang="en-US" sz="1400" u="sng">
-                <a:latin typeface="Calibri"/>
-              </a:rPr>
-              <a:t> Status: </a:t>
-            </a:r>
-            <a:r>
-              <a:rPr lang="en-US" sz="1400">
-                <a:latin typeface="Calibri"/>
-              </a:rPr>
-              <a:t>Done</a:t>
-            </a:r>
-          </a:p>
-          <a:p>
-            <a:pPr>
-              <a:buFont typeface="Arial"/>
-              <a:buChar char="-"/>
-            </a:pPr>
-            <a:r>
-              <a:rPr lang="en-US" sz="1400" b="true" u="sng">
-                <a:latin typeface="Calibri"/>
-              </a:rPr>
-              <a:t>SuperId1: </a:t>
-            </a:r>
-            <a:r>
-              <a:rPr lang="en-US" sz="1400">
-                <a:latin typeface="Calibri"/>
-              </a:rPr>
-              <a:t>Hreadline</a:t>
-            </a:r>
-            <a:r>
-              <a:rPr lang="en-US" sz="1400" u="sng">
-                <a:latin typeface="Calibri"/>
-              </a:rPr>
-              <a:t> Status: </a:t>
-            </a:r>
-            <a:r>
-              <a:rPr lang="en-US" sz="1400">
-                <a:latin typeface="Calibri"/>
-              </a:rPr>
-              <a:t>Done</a:t>
-            </a:r>
-          </a:p>
-          <a:p>
-            <a:pPr>
-              <a:buFont typeface="Arial"/>
-              <a:buChar char="-"/>
-            </a:pPr>
-            <a:r>
-              <a:rPr lang="en-US" sz="1400" b="true" u="sng">
-                <a:latin typeface="Calibri"/>
-              </a:rPr>
-              <a:t>SuperId2222: </a:t>
-            </a:r>
-            <a:r>
-              <a:rPr lang="en-US" sz="1400">
-                <a:latin typeface="Calibri"/>
-              </a:rPr>
-              <a:t>Hreadline</a:t>
-            </a:r>
-            <a:r>
-              <a:rPr lang="en-US" sz="1400" u="sng">
-                <a:latin typeface="Calibri"/>
-              </a:rPr>
-              <a:t> Status: </a:t>
-            </a:r>
-            <a:r>
-              <a:rPr lang="en-US" sz="1400">
-                <a:latin typeface="Calibri"/>
-              </a:rPr>
-              <a:t>Done</a:t>
-            </a:r>
-          </a:p>
-          <a:p>
-            <a:pPr>
-              <a:buFont typeface="Arial"/>
-              <a:buChar char="-"/>
-            </a:pPr>
-            <a:r>
-              <a:rPr lang="en-US" sz="1400" b="true" u="sng">
-                <a:latin typeface="Calibri"/>
-              </a:rPr>
-              <a:t>SuperId1: </a:t>
-            </a:r>
-            <a:r>
-              <a:rPr lang="en-US" sz="1400">
-                <a:latin typeface="Calibri"/>
-              </a:rPr>
-              <a:t>Hreadline</a:t>
-            </a:r>
-            <a:r>
-              <a:rPr lang="en-US" sz="1400" u="sng">
-                <a:latin typeface="Calibri"/>
-              </a:rPr>
-              <a:t> Status: </a:t>
-            </a:r>
-            <a:r>
-              <a:rPr lang="en-US" sz="1400">
-                <a:latin typeface="Calibri"/>
-              </a:rPr>
-              <a:t>Done</a:t>
-            </a:r>
-          </a:p>
-          <a:p>
-            <a:pPr>
-              <a:buFont typeface="Arial"/>
-              <a:buChar char="-"/>
-            </a:pPr>
-            <a:r>
-              <a:rPr lang="en-US" sz="1400" b="true" u="sng">
-                <a:latin typeface="Calibri"/>
-              </a:rPr>
-              <a:t>SuperId2222: </a:t>
-            </a:r>
-            <a:r>
-              <a:rPr lang="en-US" sz="1400">
-                <a:latin typeface="Calibri"/>
-              </a:rPr>
-              <a:t>Hreadline</a:t>
-            </a:r>
-            <a:r>
-              <a:rPr lang="en-US" sz="1400" u="sng">
-                <a:latin typeface="Calibri"/>
-              </a:rPr>
-              <a:t> Status: </a:t>
-            </a:r>
-            <a:r>
-              <a:rPr lang="en-US" sz="1400">
-                <a:latin typeface="Calibri"/>
-              </a:rPr>
-              <a:t>Done</a:t>
-            </a:r>
-          </a:p>
-          <a:p>
-            <a:pPr>
-              <a:buFont typeface="Arial"/>
-              <a:buChar char="-"/>
-            </a:pPr>
-            <a:r>
-              <a:rPr lang="en-US" sz="1400" b="true" u="sng">
-                <a:latin typeface="Calibri"/>
-              </a:rPr>
-              <a:t>SuperId1: </a:t>
-            </a:r>
-            <a:r>
-              <a:rPr lang="en-US" sz="1400">
-                <a:latin typeface="Calibri"/>
-              </a:rPr>
-              <a:t>Hreadline</a:t>
-            </a:r>
-            <a:r>
-              <a:rPr lang="en-US" sz="1400" u="sng">
-                <a:latin typeface="Calibri"/>
-              </a:rPr>
-              <a:t> Status: </a:t>
-            </a:r>
-            <a:r>
-              <a:rPr lang="en-US" sz="1400">
-                <a:latin typeface="Calibri"/>
-              </a:rPr>
-              <a:t>Done</a:t>
-            </a:r>
-          </a:p>
-          <a:p>
-            <a:pPr>
-              <a:buFont typeface="Arial"/>
-              <a:buChar char="-"/>
-            </a:pPr>
-            <a:r>
-              <a:rPr lang="en-US" sz="1400" b="true" u="sng">
-                <a:latin typeface="Calibri"/>
-              </a:rPr>
-              <a:t>SuperId2222: </a:t>
-            </a:r>
-            <a:r>
-              <a:rPr lang="en-US" sz="1400">
-                <a:latin typeface="Calibri"/>
-              </a:rPr>
-              <a:t>Hreadline</a:t>
-            </a:r>
-            <a:r>
-              <a:rPr lang="en-US" sz="1400" u="sng">
-                <a:latin typeface="Calibri"/>
-              </a:rPr>
-              <a:t> Status: </a:t>
-            </a:r>
-            <a:r>
-              <a:rPr lang="en-US" sz="1400">
-                <a:latin typeface="Calibri"/>
-              </a:rPr>
-              <a:t>Done</a:t>
-            </a:r>
-          </a:p>
-          <a:p>
-            <a:pPr>
-              <a:buFont typeface="Arial"/>
-              <a:buChar char="-"/>
-            </a:pPr>
-            <a:r>
-              <a:rPr lang="en-US" sz="1400" b="true" u="sng">
-                <a:latin typeface="Calibri"/>
-              </a:rPr>
-              <a:t>SuperId1: </a:t>
-            </a:r>
-            <a:r>
-              <a:rPr lang="en-US" sz="1400">
-                <a:latin typeface="Calibri"/>
-              </a:rPr>
-              <a:t>Hreadline</a:t>
-            </a:r>
-            <a:r>
-              <a:rPr lang="en-US" sz="1400" u="sng">
-                <a:latin typeface="Calibri"/>
-              </a:rPr>
-              <a:t> Status: </a:t>
-            </a:r>
-            <a:r>
-              <a:rPr lang="en-US" sz="1400">
-                <a:latin typeface="Calibri"/>
-              </a:rPr>
-              <a:t>Done</a:t>
-            </a:r>
-          </a:p>
-          <a:p>
-            <a:pPr>
-              <a:buFont typeface="Arial"/>
-              <a:buChar char="-"/>
-            </a:pPr>
-            <a:r>
-              <a:rPr lang="en-US" sz="1400" b="true" u="sng">
-                <a:latin typeface="Calibri"/>
-              </a:rPr>
-              <a:t>SuperId2222: </a:t>
-            </a:r>
-            <a:r>
-              <a:rPr lang="en-US" sz="1400">
-                <a:latin typeface="Calibri"/>
-              </a:rPr>
-              <a:t>Hreadline</a:t>
-            </a:r>
-            <a:r>
-              <a:rPr lang="en-US" sz="1400" u="sng">
-                <a:latin typeface="Calibri"/>
-              </a:rPr>
-              <a:t> Status: </a:t>
-            </a:r>
-            <a:r>
-              <a:rPr lang="en-US" sz="1400">
-                <a:latin typeface="Calibri"/>
-              </a:rPr>
-              <a:t>Done</a:t>
-            </a:r>
-          </a:p>
-        </p:txBody>
-      </p:sp>
-    </p:spTree>
-  </p:cSld>
-  <p:clrMapOvr>
-    <a:masterClrMapping/>
-  </p:clrMapOvr>
-</p:sld>
-</file>
-
-<file path=ppt/slides/slide6.xml><?xml version="1.0" encoding="utf-8"?>
-<p:sld xmlns:p="http://schemas.openxmlformats.org/presentationml/2006/main" xmlns:a="http://schemas.openxmlformats.org/drawingml/2006/main" xmlns:r="http://schemas.openxmlformats.org/officeDocument/2006/relationships">
-  <p:cSld>
-    <p:spTree>
-      <p:nvGrpSpPr>
-        <p:cNvPr id="1" name=""/>
-        <p:cNvGrpSpPr/>
-        <p:nvPr/>
-      </p:nvGrpSpPr>
-      <p:grpSpPr>
-        <a:xfrm>
-          <a:off x="0" y="0"/>
-          <a:ext cx="0" cy="0"/>
-          <a:chOff x="0" y="0"/>
-          <a:chExt cx="0" cy="0"/>
-        </a:xfrm>
-      </p:grpSpPr>
-      <p:sp>
-        <p:nvSpPr>
-          <p:cNvPr name="TextBox 2" id="2"/>
-          <p:cNvSpPr txBox="true"/>
-          <p:nvPr/>
-        </p:nvSpPr>
-        <p:spPr>
-          <a:xfrm>
-            <a:off x="254000" y="254000"/>
-            <a:ext cx="6350000" cy="762000"/>
-          </a:xfrm>
-          <a:prstGeom prst="rect">
-            <a:avLst/>
-          </a:prstGeom>
-        </p:spPr>
-        <p:txBody>
-          <a:bodyPr anchor="t" rtlCol="false"/>
-          <a:lstStyle/>
-          <a:p>
-            <a:pPr algn="l">
-              <a:defRPr/>
-            </a:pPr>
-            <a:r>
-              <a:rPr lang="ru-RU"/>
-              <a:t/>
-            </a:r>
-            <a:r>
-              <a:rPr lang="en-US" sz="1400" b="true">
-                <a:latin typeface="Calibri"/>
-              </a:rPr>
-              <a:t>Project name: </a:t>
-            </a:r>
-            <a:r>
-              <a:rPr lang="en-US" sz="1400">
-                <a:latin typeface="Calibri"/>
-                <a:hlinkClick r:id="rId2" tooltip="http://ya.ru"/>
-              </a:rPr>
-              <a:t>Project from Facade</a:t>
-            </a:r>
-            <a:br>
-              <a:rPr lang="en-US" sz="1400">
-                <a:latin typeface="Calibri"/>
-              </a:rPr>
-            </a:br>
-            <a:r>
-              <a:rPr lang="en-US" sz="1400" b="true">
-                <a:latin typeface="Calibri"/>
-              </a:rPr>
-              <a:t>Project manager: </a:t>
-            </a:r>
-            <a:r>
-              <a:rPr lang="en-US" sz="1400">
-                <a:latin typeface="Calibri"/>
-              </a:rPr>
-              <a:t>IKSANOV Aleksandr</a:t>
-            </a:r>
-            <a:br>
-              <a:rPr lang="en-US" sz="1400">
-                <a:latin typeface="Calibri"/>
-              </a:rPr>
-            </a:br>
-            <a:r>
-              <a:rPr lang="en-US" sz="1400" b="true">
-                <a:latin typeface="Calibri"/>
-              </a:rPr>
-              <a:t>Last Updated: </a:t>
-            </a:r>
-            <a:r>
-              <a:rPr lang="en-US" sz="1400">
-                <a:latin typeface="Calibri"/>
-              </a:rPr>
-              <a:t>20-Apr-20</a:t>
-            </a:r>
-            <a:endParaRPr lang="en-US" sz="1100"/>
-          </a:p>
-        </p:txBody>
-      </p:sp>
-      <p:sp>
-        <p:nvSpPr>
-          <p:cNvPr name="TextBox 3" id="3"/>
-          <p:cNvSpPr txBox="true"/>
-          <p:nvPr/>
-        </p:nvSpPr>
-        <p:spPr>
-          <a:xfrm>
-            <a:off x="254000" y="1244600"/>
-            <a:ext cx="15748000" cy="215900"/>
-          </a:xfrm>
-          <a:prstGeom prst="rect">
-            <a:avLst/>
-          </a:prstGeom>
-        </p:spPr>
-        <p:txBody>
-          <a:bodyPr anchor="t" rtlCol="false"/>
-          <a:lstStyle/>
-          <a:p>
-            <a:pPr algn="l">
-              <a:defRPr/>
-            </a:pPr>
-            <a:r>
-              <a:rPr lang="ru-RU"/>
-              <a:t/>
-            </a:r>
-            <a:r>
-              <a:rPr lang="en-US" sz="1400" b="true">
-                <a:latin typeface="Calibri"/>
-              </a:rPr>
-              <a:t>Other Information</a:t>
-            </a:r>
-            <a:endParaRPr lang="en-US" sz="1100"/>
-          </a:p>
-        </p:txBody>
-      </p:sp>
-      <p:sp>
-        <p:nvSpPr>
-          <p:cNvPr name="AutoShape 4" id="4"/>
-          <p:cNvSpPr/>
-          <p:nvPr/>
-        </p:nvSpPr>
-        <p:spPr>
-          <a:xfrm>
-            <a:off x="254000" y="1562100"/>
-            <a:ext cx="15748000" cy="12700"/>
-          </a:xfrm>
-          <a:prstGeom prst="line">
-            <a:avLst/>
-          </a:prstGeom>
-          <a:ln>
-            <a:solidFill>
-              <a:srgbClr val="000000"/>
-            </a:solidFill>
-          </a:ln>
-        </p:spPr>
-      </p:sp>
-      <p:sp>
-        <p:nvSpPr>
-          <p:cNvPr name="TextBox 5" id="5"/>
-          <p:cNvSpPr txBox="true"/>
-          <p:nvPr/>
-        </p:nvSpPr>
-        <p:spPr>
-          <a:xfrm>
-            <a:off x="254000" y="1562100"/>
-            <a:ext cx="15748000" cy="7327900"/>
-          </a:xfrm>
-          <a:prstGeom prst="rect">
-            <a:avLst/>
-          </a:prstGeom>
-        </p:spPr>
-        <p:txBody>
-          <a:bodyPr anchor="t" rtlCol="false"/>
-          <a:lstStyle/>
-          <a:p>
-            <a:pPr algn="l">
-              <a:defRPr/>
-            </a:pPr>
-            <a:r>
-              <a:rPr lang="ru-RU"/>
-              <a:t/>
-            </a:r>
-            <a:endParaRPr lang="en-US" sz="1100"/>
-          </a:p>
-          <a:p/>
-          <a:p>
-            <a:r>
-              <a:rPr lang="en-US" sz="1400" b="true">
-                <a:latin typeface="Calibri"/>
-              </a:rPr>
-              <a:t>Current Project Details</a:t>
-            </a:r>
-          </a:p>
-          <a:p>
-            <a:r>
-              <a:rPr lang="en-US" sz="1400">
-                <a:latin typeface="Calibri"/>
-              </a:rPr>
-              <a:t>\n" + "1PowerPoint documents are made up of a tree of records. A record may contain either other records (in which case it is a Container), or data (in which case it's an Atom). A record can't hold both. PowerPoint documents don't have one overall container record. Instead, there are a number of different container records to be found at the top level. Any numbers or strings stored in the records are always stored in Little Endian format (least important bytes first). This is the case no matter what platform the file was written on - be that a Little Endian or a Big Endian system. PowerPoint may have Escher (DDF) records embedded in it. These are always held as the children of a PPDrawing record (record type 1036). Escher records have the same format as PowerPoint records. Hello mate! Hello mate! Hello mate! Hello mate! Hello mate! Hello mate! Hello mate! Hello mate! Hello mate! This is bold and underscore and both and not true false PowerPoint documents are made up of a tree of records. A record may contain either other records (in which case it is a Container), or data (in which case it's an Atom). A record can't hold both. PowerPoint documents don't have one overall container record. Instead, there are a number of different container records to be found at the top level. Any numbers or strings stored in the records are always stored in Little Endian format (least important bytes first). This is the case no matter what platform the file was written on - be that a Little Endian or a Big Endian system. PowerPoint may have Escher (DDF) records embedded in it. These are always held as the children of a PPDrawing record (record type 1036). Escher records have the same format as PowerPoint records. A record may contain either other records (in which case it is a Container), or data (in which case it's an Atom). A record can't hold both. PowerPoint documents don't have one overall container record PowerPoint documents are made up of a tree of records. A record may contain either other records (in which case it is a Container), or data (in which case it's an Atom). A record can't hold both. PowerPoint documents don't have one overall container record. Instead, there are a number of different container records to be found at the top level. Any numbers or strings stored in the records are always stored in Little Endian format (least important bytes first). This is the case no matter what platform the file was written on - be that a Little Endian or a Big Endian system. PowerPoint may have Escher (DDF) records embedded in it. These are always held as the children of a PPDrawing record (record type 1036). Escher records have the same format as PowerPoint records. Hello mate! Hello mate! Hello mate! Hello mate! Hello mate! Hello mate! Hello mate! Hello mate! Hello mate! This is bold and underscore and both and not true false PowerPoint documents are made up of a tree of records. A record may contain either other records (in which case it is a Container), or data (in which case it's an Atom). A record can't hold both. PowerPoint documents don't have one overall container record. Instead, there are a number of different container records to be found at the top level. Any numbers or strings stored in the records are always stored in Little Endian format (least important bytes first). This is the case no matter what platform the file was written on - be that a Little Endian or a Big Endian system. PowerPoint may have Escher (DDF) records embedded in it. These are always held as the children of a PPDrawing record (record type 1036). Escher records have the same format as PowerPoint records. Hello mate! Hello mate! Hello mate! Hello mate! Hello mate! Hello mate! Hello mate! Hello mate! Hello mate! This is bold and underscore and both and not true false PowerPoint documents are made up of a tree of records. A record may contain either other records (in which case it is a Container), or data (in which case it's an Atom). A record can't hold both. PowerPoint documents don't have one overall container record documents don't have one overall container record. Instead, there are a number of different container records to be found at the top level. Any numbers or strings stored in the records are always stored in Little Endian format (least important bytes first). This is the case no matter what platform the file was written on - be that a Little Endian or a Big Endian system. PowerPoint may have Escher (DDF) records embedded in it. These are always held as the children of a PPDrawing record (record type 1036). " + "</a:t>
-            </a:r>
-            <a:r>
-              <a:rPr lang="en-US" sz="1400">
-                <a:solidFill>
-                  <a:srgbClr val="FF0000"/>
-                </a:solidFill>
-                <a:latin typeface="Calibri"/>
-              </a:rPr>
-              <a:t>2Escher records have the same format as PowerPoint records. Hello mate! Hello mate! Hello mate! Hello mate! Hello mate! Hello mate! Hello mate! Hello mate! Hello mate! This is bold and underscore and both and not true false PowerPoint documents are made up of a tree of records. A record may contain either other records (in which case it is a Container), or data (in which case it's an Atom). A record can't hold both. PowerPoint documents don't have one overall container record. Instead, there are a number of different container records to be found at the top level. Any numbers or strings stored in the records are always stored in Little Endian format (least important bytes first). This is the case no matter what platform the file was written on - be that a Little Endian or a Big Endian system. PowerPoint may have Escher (DDF) records embedded in it. These are always held as the children of a PPDrawing record (record type 1036). Escher records have the same format as PowerPoint records. Hello mate! Hello mate! Hello mate! Hello mate! Hello mate! Hello mate! Hello mate! Hello mate! Hello mate! This is bold and underscore and both and not true false PowerPoint documents are made up of a tree of records. A record may contain either other records (in which case it is a Container), or data (in which case it's an Atom). A record can't hold both. PowerPoint documents don't have one overall container record\n</a:t>
-            </a:r>
-            <a:r>
-              <a:rPr lang="en-US" sz="1400">
-                <a:latin typeface="Calibri"/>
-              </a:rPr>
-              <a:t>" + "</a:t>
-            </a:r>
-          </a:p>
-        </p:txBody>
-      </p:sp>
-    </p:spTree>
-  </p:cSld>
-  <p:clrMapOvr>
-    <a:masterClrMapping/>
-  </p:clrMapOvr>
-</p:sld>
-</file>
-
-<file path=ppt/slides/slide7.xml><?xml version="1.0" encoding="utf-8"?>
-<p:sld xmlns:p="http://schemas.openxmlformats.org/presentationml/2006/main" xmlns:a="http://schemas.openxmlformats.org/drawingml/2006/main" xmlns:r="http://schemas.openxmlformats.org/officeDocument/2006/relationships">
-  <p:cSld>
-    <p:spTree>
-      <p:nvGrpSpPr>
-        <p:cNvPr id="1" name=""/>
-        <p:cNvGrpSpPr/>
-        <p:nvPr/>
-      </p:nvGrpSpPr>
-      <p:grpSpPr>
-        <a:xfrm>
-          <a:off x="0" y="0"/>
-          <a:ext cx="0" cy="0"/>
-          <a:chOff x="0" y="0"/>
-          <a:chExt cx="0" cy="0"/>
-        </a:xfrm>
-      </p:grpSpPr>
-      <p:sp>
-        <p:nvSpPr>
-          <p:cNvPr name="TextBox 2" id="2"/>
-          <p:cNvSpPr txBox="true"/>
-          <p:nvPr/>
-        </p:nvSpPr>
-        <p:spPr>
-          <a:xfrm>
-            <a:off x="254000" y="254000"/>
-            <a:ext cx="6350000" cy="762000"/>
-          </a:xfrm>
-          <a:prstGeom prst="rect">
-            <a:avLst/>
-          </a:prstGeom>
-        </p:spPr>
-        <p:txBody>
-          <a:bodyPr anchor="t" rtlCol="false"/>
-          <a:lstStyle/>
-          <a:p>
-            <a:pPr algn="l">
-              <a:defRPr/>
-            </a:pPr>
-            <a:r>
-              <a:rPr lang="ru-RU"/>
-              <a:t/>
-            </a:r>
-            <a:r>
-              <a:rPr lang="en-US" sz="1400" b="true">
-                <a:latin typeface="Calibri"/>
-              </a:rPr>
-              <a:t>Project name: </a:t>
-            </a:r>
-            <a:r>
-              <a:rPr lang="en-US" sz="1400">
-                <a:latin typeface="Calibri"/>
-                <a:hlinkClick r:id="rId2" tooltip="http://ya.ru"/>
-              </a:rPr>
-              <a:t>Project from Facade</a:t>
-            </a:r>
-            <a:br>
-              <a:rPr lang="en-US" sz="1400">
-                <a:latin typeface="Calibri"/>
-              </a:rPr>
-            </a:br>
-            <a:r>
-              <a:rPr lang="en-US" sz="1400" b="true">
-                <a:latin typeface="Calibri"/>
-              </a:rPr>
-              <a:t>Project manager: </a:t>
-            </a:r>
-            <a:r>
-              <a:rPr lang="en-US" sz="1400">
-                <a:latin typeface="Calibri"/>
-              </a:rPr>
-              <a:t>IKSANOV Aleksandr</a:t>
-            </a:r>
-            <a:br>
-              <a:rPr lang="en-US" sz="1400">
-                <a:latin typeface="Calibri"/>
-              </a:rPr>
-            </a:br>
-            <a:r>
-              <a:rPr lang="en-US" sz="1400" b="true">
-                <a:latin typeface="Calibri"/>
-              </a:rPr>
-              <a:t>Last Updated: </a:t>
-            </a:r>
-            <a:r>
-              <a:rPr lang="en-US" sz="1400">
-                <a:latin typeface="Calibri"/>
-              </a:rPr>
-              <a:t>20-Apr-20</a:t>
-            </a:r>
-            <a:endParaRPr lang="en-US" sz="1100"/>
-          </a:p>
-        </p:txBody>
-      </p:sp>
-      <p:sp>
-        <p:nvSpPr>
-          <p:cNvPr name="TextBox 3" id="3"/>
-          <p:cNvSpPr txBox="true"/>
-          <p:nvPr/>
-        </p:nvSpPr>
-        <p:spPr>
-          <a:xfrm>
-            <a:off x="254000" y="1244600"/>
-            <a:ext cx="15748000" cy="215900"/>
-          </a:xfrm>
-          <a:prstGeom prst="rect">
-            <a:avLst/>
-          </a:prstGeom>
-        </p:spPr>
-        <p:txBody>
-          <a:bodyPr anchor="t" rtlCol="false"/>
-          <a:lstStyle/>
-          <a:p>
-            <a:pPr algn="l">
-              <a:defRPr/>
-            </a:pPr>
-            <a:r>
-              <a:rPr lang="ru-RU"/>
-              <a:t/>
-            </a:r>
-            <a:r>
-              <a:rPr lang="en-US" sz="1400" b="true">
-                <a:latin typeface="Calibri"/>
-              </a:rPr>
-              <a:t>Other Information</a:t>
-            </a:r>
-            <a:endParaRPr lang="en-US" sz="1100"/>
-          </a:p>
-        </p:txBody>
-      </p:sp>
-      <p:sp>
-        <p:nvSpPr>
-          <p:cNvPr name="AutoShape 4" id="4"/>
-          <p:cNvSpPr/>
-          <p:nvPr/>
-        </p:nvSpPr>
-        <p:spPr>
-          <a:xfrm>
-            <a:off x="254000" y="1562100"/>
-            <a:ext cx="15748000" cy="12700"/>
-          </a:xfrm>
-          <a:prstGeom prst="line">
-            <a:avLst/>
-          </a:prstGeom>
-          <a:ln>
-            <a:solidFill>
-              <a:srgbClr val="000000"/>
-            </a:solidFill>
-          </a:ln>
-        </p:spPr>
-      </p:sp>
-      <p:sp>
-        <p:nvSpPr>
-          <p:cNvPr name="TextBox 5" id="5"/>
-          <p:cNvSpPr txBox="true"/>
-          <p:nvPr/>
-        </p:nvSpPr>
-        <p:spPr>
-          <a:xfrm>
-            <a:off x="254000" y="1562100"/>
-            <a:ext cx="15748000" cy="7327900"/>
-          </a:xfrm>
-          <a:prstGeom prst="rect">
-            <a:avLst/>
-          </a:prstGeom>
-        </p:spPr>
-        <p:txBody>
-          <a:bodyPr anchor="t" rtlCol="false"/>
-          <a:lstStyle/>
-          <a:p>
-            <a:pPr algn="l">
-              <a:defRPr/>
-            </a:pPr>
-            <a:r>
-              <a:rPr lang="ru-RU"/>
-              <a:t/>
-            </a:r>
-            <a:r>
-              <a:rPr lang="en-US" sz="1400">
-                <a:solidFill>
-                  <a:srgbClr val="00FF00"/>
-                </a:solidFill>
-                <a:latin typeface="Calibri"/>
-              </a:rPr>
-              <a:t>3Escher records have the same format as PowerPoint records. Hello mate! Hello mate! Hello mate! Hello mate! Hello mate! Hello mate! Hello mate! Hello mate! Hello mate! This is bold and underscore and both and not true false PowerPoint documents are made up of a tree of records. A record may contain either other records (in which case it is a Container), or data (in which case it's an Atom). A record can't hold both. PowerPoint documents don't have one overall container record. Instead, there are a number of different container records to be found at the top level. Any numbers or strings stored in the records are always stored in Little Endian format (least important bytes first). This is the case no matter what platform the file was written on - be that a Little Endian or a Big Endian system. PowerPoint may have Escher (DDF) records embedded in it. These are always held as the children of a PPDrawing record (record type 1036). Escher records have the same format as PowerPoint records. Hello mate! Hello mate! Hello mate! Hello mate! Hello mate! Hello mate! Hello mate! Hello mate! Hello mate! This is bold and underscore and both and not true false PowerPoint documents are made up of a tree of records. A record may contain either other records (in which case it is a Container), or data (in which case it's an Atom). A record can't hold both. PowerPoint documents don't have one overall container record\n</a:t>
-            </a:r>
-            <a:r>
-              <a:rPr lang="en-US" sz="1400">
-                <a:latin typeface="Calibri"/>
-              </a:rPr>
-              <a:t>" + "</a:t>
-            </a:r>
-            <a:r>
-              <a:rPr lang="en-US" sz="1400">
-                <a:solidFill>
-                  <a:srgbClr val="0000FF"/>
-                </a:solidFill>
-                <a:latin typeface="Calibri"/>
-              </a:rPr>
-              <a:t>4Escher records have the same format as PowerPoint records. Hello mate! Hello mate! Hello mate! Hello mate! Hello mate! Hello mate! Hello mate! Hello mate! Hello mate! This is bold and underscore and both and not true false PowerPoint documents are made up of a tree of records. A record may contain either other records (in which case it is a Container), or data (in which case it's an Atom). A record can't hold both. PowerPoint documents don't have one overall container record. Instead, there are a number of different container records to be found at the top level. Any numbers or strings stored in the records are always stored in Little Endian format (least important bytes first). This is the case no matter what platform the file was written on - be that a Little Endian or a Big Endian system. PowerPoint may have Escher (DDF) records embedded in it. These are always held as the children of a PPDrawing record (record type 1036). Escher records have the same format as PowerPoint records. Hello mate! Hello mate! Hello mate! Hello mate! Hello mate! Hello mate! Hello mate! Hello mate! Hello mate! This is bold and underscore and both and not true false PowerPoint documents are made up of a tree of records. A record may contain either other records (in which case it is a Container), or data (in which case it's an Atom). A record can't hold both. PowerPoint documents don't have one overall container record\n</a:t>
-            </a:r>
-            <a:r>
-              <a:rPr lang="en-US" sz="1400">
-                <a:latin typeface="Calibri"/>
-              </a:rPr>
-              <a:t>" + "</a:t>
-            </a:r>
-            <a:endParaRPr lang="en-US" sz="1100"/>
-          </a:p>
-          <a:p/>
         </p:txBody>
       </p:sp>
     </p:spTree>

</xml_diff>

<commit_message>
do not create section / slide if one of the options is null
</commit_message>
<xml_diff>
--- a/html-to-ppt/createExecReviewPpt.pptx
+++ b/html-to-ppt/createExecReviewPpt.pptx
@@ -10,6 +10,8 @@
     <p:sldId id="258" r:id="rId8"/>
     <p:sldId id="259" r:id="rId9"/>
     <p:sldId id="260" r:id="rId10"/>
+    <p:sldId id="261" r:id="rId11"/>
+    <p:sldId id="262" r:id="rId12"/>
   </p:sldIdLst>
   <p:sldSz cx="16256000" cy="9144000"/>
   <p:notesSz cx="6858000" cy="9144000"/>
@@ -3098,9 +3100,9 @@
             <a:r>
               <a:rPr lang="en-US" sz="1400">
                 <a:latin typeface="Calibri"/>
-                <a:hlinkClick r:id="rId2" tooltip=""/>
-              </a:rPr>
-              <a:t/>
+                <a:hlinkClick r:id="rId2" tooltip="http://ya.ru"/>
+              </a:rPr>
+              <a:t>Project from Facade</a:t>
             </a:r>
             <a:br>
               <a:rPr lang="en-US" sz="1400">
@@ -3117,7 +3119,7 @@
               <a:rPr lang="en-US" sz="1400">
                 <a:latin typeface="Calibri"/>
               </a:rPr>
-              <a:t/>
+              <a:t>IKSANOV Aleksandr</a:t>
             </a:r>
             <a:br>
               <a:rPr lang="en-US" sz="1400">
@@ -3170,7 +3172,7 @@
               <a:rPr lang="en-US" sz="1400" b="true">
                 <a:latin typeface="Calibri"/>
               </a:rPr>
-              <a:t/>
+              <a:t>Summary title Summary title Summary title Summary title Summary title </a:t>
             </a:r>
             <a:endParaRPr lang="en-US" sz="1100"/>
           </a:p>
@@ -3448,7 +3450,7 @@
                       </a:pPr>
                       <a:r>
                         <a:rPr lang="en-US" sz="1400"/>
-                        <a:t> </a:t>
+                        <a:t>RED</a:t>
                       </a:r>
                       <a:endParaRPr lang="en-US" sz="1100"/>
                     </a:p>
@@ -3491,7 +3493,7 @@
                       <a:tailEnd type="none" w="med" len="med"/>
                     </a:lnB>
                     <a:solidFill>
-                      <a:srgbClr val="C0C0C0"/>
+                      <a:srgbClr val="FF0000"/>
                     </a:solidFill>
                   </a:tcPr>
                 </a:tc>
@@ -3505,7 +3507,7 @@
                       </a:pPr>
                       <a:r>
                         <a:rPr lang="en-US" sz="1400"/>
-                        <a:t> </a:t>
+                        <a:t>YELLOW</a:t>
                       </a:r>
                       <a:endParaRPr lang="en-US" sz="1100"/>
                     </a:p>
@@ -3548,7 +3550,7 @@
                       <a:tailEnd type="none" w="med" len="med"/>
                     </a:lnB>
                     <a:solidFill>
-                      <a:srgbClr val="C0C0C0"/>
+                      <a:srgbClr val="FFC800"/>
                     </a:solidFill>
                   </a:tcPr>
                 </a:tc>
@@ -3562,7 +3564,7 @@
                       </a:pPr>
                       <a:r>
                         <a:rPr lang="en-US" sz="1400"/>
-                        <a:t> </a:t>
+                        <a:t>RED</a:t>
                       </a:r>
                       <a:endParaRPr lang="en-US" sz="1100"/>
                     </a:p>
@@ -3605,7 +3607,7 @@
                       <a:tailEnd type="none" w="med" len="med"/>
                     </a:lnB>
                     <a:solidFill>
-                      <a:srgbClr val="C0C0C0"/>
+                      <a:srgbClr val="FF0000"/>
                     </a:solidFill>
                   </a:tcPr>
                 </a:tc>
@@ -3619,7 +3621,7 @@
                       </a:pPr>
                       <a:r>
                         <a:rPr lang="en-US" sz="1400"/>
-                        <a:t> </a:t>
+                        <a:t>GREEN</a:t>
                       </a:r>
                       <a:endParaRPr lang="en-US" sz="1100"/>
                     </a:p>
@@ -3662,7 +3664,7 @@
                       <a:tailEnd type="none" w="med" len="med"/>
                     </a:lnB>
                     <a:solidFill>
-                      <a:srgbClr val="C0C0C0"/>
+                      <a:srgbClr val="00FF00"/>
                     </a:solidFill>
                   </a:tcPr>
                 </a:tc>
@@ -3750,14 +3752,14 @@
         </p:nvSpPr>
         <p:spPr>
           <a:xfrm>
-            <a:off x="8890000" y="2438400"/>
-            <a:ext cx="203200" cy="406400"/>
-          </a:xfrm>
-          <a:prstGeom prst="roundRect">
+            <a:off x="3048000" y="2527300"/>
+            <a:ext cx="25400" cy="228600"/>
+          </a:xfrm>
+          <a:prstGeom prst="rect">
             <a:avLst/>
           </a:prstGeom>
           <a:solidFill>
-            <a:srgbClr val="C0C0C0"/>
+            <a:srgbClr val="000000"/>
           </a:solidFill>
           <a:ln>
             <a:solidFill>
@@ -3765,6 +3767,1326 @@
             </a:solidFill>
           </a:ln>
         </p:spPr>
+      </p:sp>
+      <p:sp>
+        <p:nvSpPr>
+          <p:cNvPr name="TextBox 9" id="9"/>
+          <p:cNvSpPr txBox="true"/>
+          <p:nvPr/>
+        </p:nvSpPr>
+        <p:spPr>
+          <a:xfrm>
+            <a:off x="2616200" y="2006600"/>
+            <a:ext cx="889000" cy="215900"/>
+          </a:xfrm>
+          <a:prstGeom prst="rect">
+            <a:avLst/>
+          </a:prstGeom>
+        </p:spPr>
+        <p:txBody>
+          <a:bodyPr anchor="t" rtlCol="false"/>
+          <a:lstStyle/>
+          <a:p>
+            <a:pPr algn="ctr">
+              <a:defRPr/>
+            </a:pPr>
+            <a:r>
+              <a:rPr lang="ru-RU"/>
+              <a:t/>
+            </a:r>
+            <a:r>
+              <a:rPr lang="en-US" sz="1400">
+                <a:latin typeface="Calibri"/>
+                <a:hlinkClick r:id="rId3" tooltip="http://www.google.com"/>
+              </a:rPr>
+              <a:t>DR1</a:t>
+            </a:r>
+            <a:endParaRPr lang="en-US" sz="1100"/>
+          </a:p>
+        </p:txBody>
+      </p:sp>
+      <p:pic>
+        <p:nvPicPr>
+          <p:cNvPr name="Picture 10" id="10"/>
+          <p:cNvPicPr>
+            <a:picLocks noChangeAspect="true"/>
+          </p:cNvPicPr>
+          <p:nvPr/>
+        </p:nvPicPr>
+        <p:blipFill>
+          <a:blip r:embed="rId4"/>
+          <a:stretch>
+            <a:fillRect/>
+          </a:stretch>
+        </p:blipFill>
+        <p:spPr>
+          <a:xfrm>
+            <a:off x="2946400" y="1689100"/>
+            <a:ext cx="254000" cy="254000"/>
+          </a:xfrm>
+          <a:prstGeom prst="rect">
+            <a:avLst/>
+          </a:prstGeom>
+        </p:spPr>
+      </p:pic>
+      <p:sp>
+        <p:nvSpPr>
+          <p:cNvPr name="TextBox 11" id="11"/>
+          <p:cNvSpPr txBox="true"/>
+          <p:nvPr/>
+        </p:nvSpPr>
+        <p:spPr>
+          <a:xfrm>
+            <a:off x="2413000" y="2959100"/>
+            <a:ext cx="1270000" cy="444500"/>
+          </a:xfrm>
+          <a:prstGeom prst="rect">
+            <a:avLst/>
+          </a:prstGeom>
+        </p:spPr>
+        <p:txBody>
+          <a:bodyPr anchor="t" rtlCol="false"/>
+          <a:lstStyle/>
+          <a:p>
+            <a:pPr algn="ctr">
+              <a:defRPr/>
+            </a:pPr>
+            <a:r>
+              <a:rPr lang="ru-RU"/>
+              <a:t/>
+            </a:r>
+            <a:r>
+              <a:rPr lang="en-US" sz="1400">
+                <a:latin typeface="Calibri"/>
+              </a:rPr>
+              <a:t>11-Apr-20</a:t>
+            </a:r>
+            <a:br>
+              <a:rPr lang="en-US" sz="1400">
+                <a:latin typeface="Calibri"/>
+              </a:rPr>
+            </a:br>
+            <a:r>
+              <a:rPr lang="en-US" sz="1400">
+                <a:latin typeface="Calibri"/>
+              </a:rPr>
+              <a:t>10-Apr-20</a:t>
+            </a:r>
+            <a:endParaRPr lang="en-US" sz="1100"/>
+          </a:p>
+        </p:txBody>
+      </p:sp>
+      <p:sp>
+        <p:nvSpPr>
+          <p:cNvPr name="AutoShape 12" id="12"/>
+          <p:cNvSpPr/>
+          <p:nvPr/>
+        </p:nvSpPr>
+        <p:spPr>
+          <a:xfrm>
+            <a:off x="4318000" y="2527300"/>
+            <a:ext cx="25400" cy="228600"/>
+          </a:xfrm>
+          <a:prstGeom prst="rect">
+            <a:avLst/>
+          </a:prstGeom>
+          <a:solidFill>
+            <a:srgbClr val="000000"/>
+          </a:solidFill>
+          <a:ln>
+            <a:solidFill>
+              <a:srgbClr val="000000"/>
+            </a:solidFill>
+          </a:ln>
+        </p:spPr>
+      </p:sp>
+      <p:sp>
+        <p:nvSpPr>
+          <p:cNvPr name="TextBox 13" id="13"/>
+          <p:cNvSpPr txBox="true"/>
+          <p:nvPr/>
+        </p:nvSpPr>
+        <p:spPr>
+          <a:xfrm>
+            <a:off x="3886200" y="2006600"/>
+            <a:ext cx="889000" cy="215900"/>
+          </a:xfrm>
+          <a:prstGeom prst="rect">
+            <a:avLst/>
+          </a:prstGeom>
+        </p:spPr>
+        <p:txBody>
+          <a:bodyPr anchor="t" rtlCol="false"/>
+          <a:lstStyle/>
+          <a:p>
+            <a:pPr algn="ctr">
+              <a:defRPr/>
+            </a:pPr>
+            <a:r>
+              <a:rPr lang="ru-RU"/>
+              <a:t/>
+            </a:r>
+            <a:r>
+              <a:rPr lang="en-US" sz="1400">
+                <a:latin typeface="Calibri"/>
+                <a:hlinkClick r:id="rId5" tooltip="http://www.google.com"/>
+              </a:rPr>
+              <a:t>DR2</a:t>
+            </a:r>
+            <a:endParaRPr lang="en-US" sz="1100"/>
+          </a:p>
+        </p:txBody>
+      </p:sp>
+      <p:pic>
+        <p:nvPicPr>
+          <p:cNvPr name="Picture 14" id="14"/>
+          <p:cNvPicPr>
+            <a:picLocks noChangeAspect="true"/>
+          </p:cNvPicPr>
+          <p:nvPr/>
+        </p:nvPicPr>
+        <p:blipFill>
+          <a:blip r:embed="rId6"/>
+          <a:stretch>
+            <a:fillRect/>
+          </a:stretch>
+        </p:blipFill>
+        <p:spPr>
+          <a:xfrm>
+            <a:off x="4216400" y="1689100"/>
+            <a:ext cx="254000" cy="254000"/>
+          </a:xfrm>
+          <a:prstGeom prst="rect">
+            <a:avLst/>
+          </a:prstGeom>
+        </p:spPr>
+      </p:pic>
+      <p:sp>
+        <p:nvSpPr>
+          <p:cNvPr name="TextBox 15" id="15"/>
+          <p:cNvSpPr txBox="true"/>
+          <p:nvPr/>
+        </p:nvSpPr>
+        <p:spPr>
+          <a:xfrm>
+            <a:off x="3683000" y="2959100"/>
+            <a:ext cx="1270000" cy="444500"/>
+          </a:xfrm>
+          <a:prstGeom prst="rect">
+            <a:avLst/>
+          </a:prstGeom>
+        </p:spPr>
+        <p:txBody>
+          <a:bodyPr anchor="t" rtlCol="false"/>
+          <a:lstStyle/>
+          <a:p>
+            <a:pPr algn="ctr">
+              <a:defRPr/>
+            </a:pPr>
+            <a:r>
+              <a:rPr lang="ru-RU"/>
+              <a:t/>
+            </a:r>
+            <a:r>
+              <a:rPr lang="en-US" sz="1400">
+                <a:latin typeface="Calibri"/>
+              </a:rPr>
+              <a:t>15-Apr-20</a:t>
+            </a:r>
+            <a:br>
+              <a:rPr lang="en-US" sz="1400">
+                <a:latin typeface="Calibri"/>
+              </a:rPr>
+            </a:br>
+            <a:r>
+              <a:rPr lang="en-US" sz="1400">
+                <a:latin typeface="Calibri"/>
+              </a:rPr>
+              <a:t>15-Apr-20</a:t>
+            </a:r>
+            <a:endParaRPr lang="en-US" sz="1100"/>
+          </a:p>
+        </p:txBody>
+      </p:sp>
+      <p:sp>
+        <p:nvSpPr>
+          <p:cNvPr name="AutoShape 16" id="16"/>
+          <p:cNvSpPr/>
+          <p:nvPr/>
+        </p:nvSpPr>
+        <p:spPr>
+          <a:xfrm>
+            <a:off x="5588000" y="2527300"/>
+            <a:ext cx="25400" cy="228600"/>
+          </a:xfrm>
+          <a:prstGeom prst="rect">
+            <a:avLst/>
+          </a:prstGeom>
+          <a:solidFill>
+            <a:srgbClr val="000000"/>
+          </a:solidFill>
+          <a:ln>
+            <a:solidFill>
+              <a:srgbClr val="000000"/>
+            </a:solidFill>
+          </a:ln>
+        </p:spPr>
+      </p:sp>
+      <p:sp>
+        <p:nvSpPr>
+          <p:cNvPr name="TextBox 17" id="17"/>
+          <p:cNvSpPr txBox="true"/>
+          <p:nvPr/>
+        </p:nvSpPr>
+        <p:spPr>
+          <a:xfrm>
+            <a:off x="5156200" y="2006600"/>
+            <a:ext cx="889000" cy="215900"/>
+          </a:xfrm>
+          <a:prstGeom prst="rect">
+            <a:avLst/>
+          </a:prstGeom>
+        </p:spPr>
+        <p:txBody>
+          <a:bodyPr anchor="t" rtlCol="false"/>
+          <a:lstStyle/>
+          <a:p>
+            <a:pPr algn="ctr">
+              <a:defRPr/>
+            </a:pPr>
+            <a:r>
+              <a:rPr lang="ru-RU"/>
+              <a:t/>
+            </a:r>
+            <a:r>
+              <a:rPr lang="en-US" sz="1400">
+                <a:latin typeface="Calibri"/>
+                <a:hlinkClick r:id="rId7" tooltip="http://www.google.com"/>
+              </a:rPr>
+              <a:t>DR2</a:t>
+            </a:r>
+            <a:endParaRPr lang="en-US" sz="1100"/>
+          </a:p>
+        </p:txBody>
+      </p:sp>
+      <p:pic>
+        <p:nvPicPr>
+          <p:cNvPr name="Picture 18" id="18"/>
+          <p:cNvPicPr>
+            <a:picLocks noChangeAspect="true"/>
+          </p:cNvPicPr>
+          <p:nvPr/>
+        </p:nvPicPr>
+        <p:blipFill>
+          <a:blip r:embed="rId4"/>
+          <a:stretch>
+            <a:fillRect/>
+          </a:stretch>
+        </p:blipFill>
+        <p:spPr>
+          <a:xfrm>
+            <a:off x="5486400" y="1689100"/>
+            <a:ext cx="254000" cy="254000"/>
+          </a:xfrm>
+          <a:prstGeom prst="rect">
+            <a:avLst/>
+          </a:prstGeom>
+        </p:spPr>
+      </p:pic>
+      <p:sp>
+        <p:nvSpPr>
+          <p:cNvPr name="TextBox 19" id="19"/>
+          <p:cNvSpPr txBox="true"/>
+          <p:nvPr/>
+        </p:nvSpPr>
+        <p:spPr>
+          <a:xfrm>
+            <a:off x="4953000" y="2959100"/>
+            <a:ext cx="1270000" cy="444500"/>
+          </a:xfrm>
+          <a:prstGeom prst="rect">
+            <a:avLst/>
+          </a:prstGeom>
+        </p:spPr>
+        <p:txBody>
+          <a:bodyPr anchor="t" rtlCol="false"/>
+          <a:lstStyle/>
+          <a:p>
+            <a:pPr algn="ctr">
+              <a:defRPr/>
+            </a:pPr>
+            <a:r>
+              <a:rPr lang="ru-RU"/>
+              <a:t/>
+            </a:r>
+            <a:r>
+              <a:rPr lang="en-US" sz="1400">
+                <a:latin typeface="Calibri"/>
+              </a:rPr>
+              <a:t>15-Apr-20</a:t>
+            </a:r>
+            <a:br>
+              <a:rPr lang="en-US" sz="1400">
+                <a:latin typeface="Calibri"/>
+              </a:rPr>
+            </a:br>
+            <a:r>
+              <a:rPr lang="en-US" sz="1400">
+                <a:latin typeface="Calibri"/>
+              </a:rPr>
+              <a:t>15-Apr-20</a:t>
+            </a:r>
+            <a:endParaRPr lang="en-US" sz="1100"/>
+          </a:p>
+        </p:txBody>
+      </p:sp>
+      <p:sp>
+        <p:nvSpPr>
+          <p:cNvPr name="AutoShape 20" id="20"/>
+          <p:cNvSpPr/>
+          <p:nvPr/>
+        </p:nvSpPr>
+        <p:spPr>
+          <a:xfrm>
+            <a:off x="6858000" y="2527300"/>
+            <a:ext cx="25400" cy="228600"/>
+          </a:xfrm>
+          <a:prstGeom prst="rect">
+            <a:avLst/>
+          </a:prstGeom>
+          <a:solidFill>
+            <a:srgbClr val="000000"/>
+          </a:solidFill>
+          <a:ln>
+            <a:solidFill>
+              <a:srgbClr val="000000"/>
+            </a:solidFill>
+          </a:ln>
+        </p:spPr>
+      </p:sp>
+      <p:sp>
+        <p:nvSpPr>
+          <p:cNvPr name="TextBox 21" id="21"/>
+          <p:cNvSpPr txBox="true"/>
+          <p:nvPr/>
+        </p:nvSpPr>
+        <p:spPr>
+          <a:xfrm>
+            <a:off x="6426200" y="2006600"/>
+            <a:ext cx="889000" cy="215900"/>
+          </a:xfrm>
+          <a:prstGeom prst="rect">
+            <a:avLst/>
+          </a:prstGeom>
+        </p:spPr>
+        <p:txBody>
+          <a:bodyPr anchor="t" rtlCol="false"/>
+          <a:lstStyle/>
+          <a:p>
+            <a:pPr algn="ctr">
+              <a:defRPr/>
+            </a:pPr>
+            <a:r>
+              <a:rPr lang="ru-RU"/>
+              <a:t/>
+            </a:r>
+            <a:r>
+              <a:rPr lang="en-US" sz="1400">
+                <a:latin typeface="Calibri"/>
+                <a:hlinkClick r:id="rId8" tooltip="http://www.google.com"/>
+              </a:rPr>
+              <a:t>DR2</a:t>
+            </a:r>
+            <a:endParaRPr lang="en-US" sz="1100"/>
+          </a:p>
+        </p:txBody>
+      </p:sp>
+      <p:pic>
+        <p:nvPicPr>
+          <p:cNvPr name="Picture 22" id="22"/>
+          <p:cNvPicPr>
+            <a:picLocks noChangeAspect="true"/>
+          </p:cNvPicPr>
+          <p:nvPr/>
+        </p:nvPicPr>
+        <p:blipFill>
+          <a:blip r:embed="rId4"/>
+          <a:stretch>
+            <a:fillRect/>
+          </a:stretch>
+        </p:blipFill>
+        <p:spPr>
+          <a:xfrm>
+            <a:off x="6756400" y="1689100"/>
+            <a:ext cx="254000" cy="254000"/>
+          </a:xfrm>
+          <a:prstGeom prst="rect">
+            <a:avLst/>
+          </a:prstGeom>
+        </p:spPr>
+      </p:pic>
+      <p:sp>
+        <p:nvSpPr>
+          <p:cNvPr name="TextBox 23" id="23"/>
+          <p:cNvSpPr txBox="true"/>
+          <p:nvPr/>
+        </p:nvSpPr>
+        <p:spPr>
+          <a:xfrm>
+            <a:off x="6223000" y="2959100"/>
+            <a:ext cx="1270000" cy="444500"/>
+          </a:xfrm>
+          <a:prstGeom prst="rect">
+            <a:avLst/>
+          </a:prstGeom>
+        </p:spPr>
+        <p:txBody>
+          <a:bodyPr anchor="t" rtlCol="false"/>
+          <a:lstStyle/>
+          <a:p>
+            <a:pPr algn="ctr">
+              <a:defRPr/>
+            </a:pPr>
+            <a:r>
+              <a:rPr lang="ru-RU"/>
+              <a:t/>
+            </a:r>
+            <a:r>
+              <a:rPr lang="en-US" sz="1400">
+                <a:latin typeface="Calibri"/>
+              </a:rPr>
+              <a:t>15-Apr-20</a:t>
+            </a:r>
+            <a:br>
+              <a:rPr lang="en-US" sz="1400">
+                <a:latin typeface="Calibri"/>
+              </a:rPr>
+            </a:br>
+            <a:r>
+              <a:rPr lang="en-US" sz="1400">
+                <a:latin typeface="Calibri"/>
+              </a:rPr>
+              <a:t>15-Apr-20</a:t>
+            </a:r>
+            <a:endParaRPr lang="en-US" sz="1100"/>
+          </a:p>
+        </p:txBody>
+      </p:sp>
+      <p:sp>
+        <p:nvSpPr>
+          <p:cNvPr name="AutoShape 24" id="24"/>
+          <p:cNvSpPr/>
+          <p:nvPr/>
+        </p:nvSpPr>
+        <p:spPr>
+          <a:xfrm>
+            <a:off x="8128000" y="2527300"/>
+            <a:ext cx="25400" cy="228600"/>
+          </a:xfrm>
+          <a:prstGeom prst="rect">
+            <a:avLst/>
+          </a:prstGeom>
+          <a:solidFill>
+            <a:srgbClr val="000000"/>
+          </a:solidFill>
+          <a:ln>
+            <a:solidFill>
+              <a:srgbClr val="000000"/>
+            </a:solidFill>
+          </a:ln>
+        </p:spPr>
+      </p:sp>
+      <p:sp>
+        <p:nvSpPr>
+          <p:cNvPr name="TextBox 25" id="25"/>
+          <p:cNvSpPr txBox="true"/>
+          <p:nvPr/>
+        </p:nvSpPr>
+        <p:spPr>
+          <a:xfrm>
+            <a:off x="7696200" y="2006600"/>
+            <a:ext cx="889000" cy="215900"/>
+          </a:xfrm>
+          <a:prstGeom prst="rect">
+            <a:avLst/>
+          </a:prstGeom>
+        </p:spPr>
+        <p:txBody>
+          <a:bodyPr anchor="t" rtlCol="false"/>
+          <a:lstStyle/>
+          <a:p>
+            <a:pPr algn="ctr">
+              <a:defRPr/>
+            </a:pPr>
+            <a:r>
+              <a:rPr lang="ru-RU"/>
+              <a:t/>
+            </a:r>
+            <a:r>
+              <a:rPr lang="en-US" sz="1400">
+                <a:latin typeface="Calibri"/>
+                <a:hlinkClick r:id="rId9" tooltip="http://www.google.com"/>
+              </a:rPr>
+              <a:t>DR2</a:t>
+            </a:r>
+            <a:endParaRPr lang="en-US" sz="1100"/>
+          </a:p>
+        </p:txBody>
+      </p:sp>
+      <p:pic>
+        <p:nvPicPr>
+          <p:cNvPr name="Picture 26" id="26"/>
+          <p:cNvPicPr>
+            <a:picLocks noChangeAspect="true"/>
+          </p:cNvPicPr>
+          <p:nvPr/>
+        </p:nvPicPr>
+        <p:blipFill>
+          <a:blip r:embed="rId4"/>
+          <a:stretch>
+            <a:fillRect/>
+          </a:stretch>
+        </p:blipFill>
+        <p:spPr>
+          <a:xfrm>
+            <a:off x="8026400" y="1689100"/>
+            <a:ext cx="254000" cy="254000"/>
+          </a:xfrm>
+          <a:prstGeom prst="rect">
+            <a:avLst/>
+          </a:prstGeom>
+        </p:spPr>
+      </p:pic>
+      <p:sp>
+        <p:nvSpPr>
+          <p:cNvPr name="TextBox 27" id="27"/>
+          <p:cNvSpPr txBox="true"/>
+          <p:nvPr/>
+        </p:nvSpPr>
+        <p:spPr>
+          <a:xfrm>
+            <a:off x="7493000" y="2959100"/>
+            <a:ext cx="1270000" cy="444500"/>
+          </a:xfrm>
+          <a:prstGeom prst="rect">
+            <a:avLst/>
+          </a:prstGeom>
+        </p:spPr>
+        <p:txBody>
+          <a:bodyPr anchor="t" rtlCol="false"/>
+          <a:lstStyle/>
+          <a:p>
+            <a:pPr algn="ctr">
+              <a:defRPr/>
+            </a:pPr>
+            <a:r>
+              <a:rPr lang="ru-RU"/>
+              <a:t/>
+            </a:r>
+            <a:r>
+              <a:rPr lang="en-US" sz="1400">
+                <a:latin typeface="Calibri"/>
+              </a:rPr>
+              <a:t>15-Apr-20</a:t>
+            </a:r>
+            <a:br>
+              <a:rPr lang="en-US" sz="1400">
+                <a:latin typeface="Calibri"/>
+              </a:rPr>
+            </a:br>
+            <a:r>
+              <a:rPr lang="en-US" sz="1400">
+                <a:latin typeface="Calibri"/>
+              </a:rPr>
+              <a:t>15-Apr-20</a:t>
+            </a:r>
+            <a:endParaRPr lang="en-US" sz="1100"/>
+          </a:p>
+        </p:txBody>
+      </p:sp>
+      <p:sp>
+        <p:nvSpPr>
+          <p:cNvPr name="AutoShape 28" id="28"/>
+          <p:cNvSpPr/>
+          <p:nvPr/>
+        </p:nvSpPr>
+        <p:spPr>
+          <a:xfrm>
+            <a:off x="9398000" y="2527300"/>
+            <a:ext cx="25400" cy="228600"/>
+          </a:xfrm>
+          <a:prstGeom prst="rect">
+            <a:avLst/>
+          </a:prstGeom>
+          <a:solidFill>
+            <a:srgbClr val="000000"/>
+          </a:solidFill>
+          <a:ln>
+            <a:solidFill>
+              <a:srgbClr val="000000"/>
+            </a:solidFill>
+          </a:ln>
+        </p:spPr>
+      </p:sp>
+      <p:sp>
+        <p:nvSpPr>
+          <p:cNvPr name="TextBox 29" id="29"/>
+          <p:cNvSpPr txBox="true"/>
+          <p:nvPr/>
+        </p:nvSpPr>
+        <p:spPr>
+          <a:xfrm>
+            <a:off x="8966200" y="2006600"/>
+            <a:ext cx="889000" cy="215900"/>
+          </a:xfrm>
+          <a:prstGeom prst="rect">
+            <a:avLst/>
+          </a:prstGeom>
+        </p:spPr>
+        <p:txBody>
+          <a:bodyPr anchor="t" rtlCol="false"/>
+          <a:lstStyle/>
+          <a:p>
+            <a:pPr algn="ctr">
+              <a:defRPr/>
+            </a:pPr>
+            <a:r>
+              <a:rPr lang="ru-RU"/>
+              <a:t/>
+            </a:r>
+            <a:r>
+              <a:rPr lang="en-US" sz="1400">
+                <a:latin typeface="Calibri"/>
+                <a:hlinkClick r:id="rId10" tooltip="http://www.google.com"/>
+              </a:rPr>
+              <a:t>DR2</a:t>
+            </a:r>
+            <a:endParaRPr lang="en-US" sz="1100"/>
+          </a:p>
+        </p:txBody>
+      </p:sp>
+      <p:pic>
+        <p:nvPicPr>
+          <p:cNvPr name="Picture 30" id="30"/>
+          <p:cNvPicPr>
+            <a:picLocks noChangeAspect="true"/>
+          </p:cNvPicPr>
+          <p:nvPr/>
+        </p:nvPicPr>
+        <p:blipFill>
+          <a:blip r:embed="rId4"/>
+          <a:stretch>
+            <a:fillRect/>
+          </a:stretch>
+        </p:blipFill>
+        <p:spPr>
+          <a:xfrm>
+            <a:off x="9296400" y="1689100"/>
+            <a:ext cx="254000" cy="254000"/>
+          </a:xfrm>
+          <a:prstGeom prst="rect">
+            <a:avLst/>
+          </a:prstGeom>
+        </p:spPr>
+      </p:pic>
+      <p:sp>
+        <p:nvSpPr>
+          <p:cNvPr name="TextBox 31" id="31"/>
+          <p:cNvSpPr txBox="true"/>
+          <p:nvPr/>
+        </p:nvSpPr>
+        <p:spPr>
+          <a:xfrm>
+            <a:off x="8763000" y="2959100"/>
+            <a:ext cx="1270000" cy="444500"/>
+          </a:xfrm>
+          <a:prstGeom prst="rect">
+            <a:avLst/>
+          </a:prstGeom>
+        </p:spPr>
+        <p:txBody>
+          <a:bodyPr anchor="t" rtlCol="false"/>
+          <a:lstStyle/>
+          <a:p>
+            <a:pPr algn="ctr">
+              <a:defRPr/>
+            </a:pPr>
+            <a:r>
+              <a:rPr lang="ru-RU"/>
+              <a:t/>
+            </a:r>
+            <a:r>
+              <a:rPr lang="en-US" sz="1400">
+                <a:latin typeface="Calibri"/>
+              </a:rPr>
+              <a:t>15-Apr-20</a:t>
+            </a:r>
+            <a:br>
+              <a:rPr lang="en-US" sz="1400">
+                <a:latin typeface="Calibri"/>
+              </a:rPr>
+            </a:br>
+            <a:r>
+              <a:rPr lang="en-US" sz="1400">
+                <a:latin typeface="Calibri"/>
+              </a:rPr>
+              <a:t>15-Apr-20</a:t>
+            </a:r>
+            <a:endParaRPr lang="en-US" sz="1100"/>
+          </a:p>
+        </p:txBody>
+      </p:sp>
+      <p:sp>
+        <p:nvSpPr>
+          <p:cNvPr name="AutoShape 32" id="32"/>
+          <p:cNvSpPr/>
+          <p:nvPr/>
+        </p:nvSpPr>
+        <p:spPr>
+          <a:xfrm>
+            <a:off x="10668000" y="2527300"/>
+            <a:ext cx="25400" cy="228600"/>
+          </a:xfrm>
+          <a:prstGeom prst="rect">
+            <a:avLst/>
+          </a:prstGeom>
+          <a:solidFill>
+            <a:srgbClr val="000000"/>
+          </a:solidFill>
+          <a:ln>
+            <a:solidFill>
+              <a:srgbClr val="000000"/>
+            </a:solidFill>
+          </a:ln>
+        </p:spPr>
+      </p:sp>
+      <p:sp>
+        <p:nvSpPr>
+          <p:cNvPr name="TextBox 33" id="33"/>
+          <p:cNvSpPr txBox="true"/>
+          <p:nvPr/>
+        </p:nvSpPr>
+        <p:spPr>
+          <a:xfrm>
+            <a:off x="10236200" y="2006600"/>
+            <a:ext cx="889000" cy="215900"/>
+          </a:xfrm>
+          <a:prstGeom prst="rect">
+            <a:avLst/>
+          </a:prstGeom>
+        </p:spPr>
+        <p:txBody>
+          <a:bodyPr anchor="t" rtlCol="false"/>
+          <a:lstStyle/>
+          <a:p>
+            <a:pPr algn="ctr">
+              <a:defRPr/>
+            </a:pPr>
+            <a:r>
+              <a:rPr lang="ru-RU"/>
+              <a:t/>
+            </a:r>
+            <a:r>
+              <a:rPr lang="en-US" sz="1400">
+                <a:latin typeface="Calibri"/>
+                <a:hlinkClick r:id="rId11" tooltip="http://www.google.com"/>
+              </a:rPr>
+              <a:t>DR2</a:t>
+            </a:r>
+            <a:endParaRPr lang="en-US" sz="1100"/>
+          </a:p>
+        </p:txBody>
+      </p:sp>
+      <p:pic>
+        <p:nvPicPr>
+          <p:cNvPr name="Picture 34" id="34"/>
+          <p:cNvPicPr>
+            <a:picLocks noChangeAspect="true"/>
+          </p:cNvPicPr>
+          <p:nvPr/>
+        </p:nvPicPr>
+        <p:blipFill>
+          <a:blip r:embed="rId4"/>
+          <a:stretch>
+            <a:fillRect/>
+          </a:stretch>
+        </p:blipFill>
+        <p:spPr>
+          <a:xfrm>
+            <a:off x="10566400" y="1689100"/>
+            <a:ext cx="254000" cy="254000"/>
+          </a:xfrm>
+          <a:prstGeom prst="rect">
+            <a:avLst/>
+          </a:prstGeom>
+        </p:spPr>
+      </p:pic>
+      <p:sp>
+        <p:nvSpPr>
+          <p:cNvPr name="TextBox 35" id="35"/>
+          <p:cNvSpPr txBox="true"/>
+          <p:nvPr/>
+        </p:nvSpPr>
+        <p:spPr>
+          <a:xfrm>
+            <a:off x="10033000" y="2959100"/>
+            <a:ext cx="1270000" cy="444500"/>
+          </a:xfrm>
+          <a:prstGeom prst="rect">
+            <a:avLst/>
+          </a:prstGeom>
+        </p:spPr>
+        <p:txBody>
+          <a:bodyPr anchor="t" rtlCol="false"/>
+          <a:lstStyle/>
+          <a:p>
+            <a:pPr algn="ctr">
+              <a:defRPr/>
+            </a:pPr>
+            <a:r>
+              <a:rPr lang="ru-RU"/>
+              <a:t/>
+            </a:r>
+            <a:r>
+              <a:rPr lang="en-US" sz="1400">
+                <a:latin typeface="Calibri"/>
+              </a:rPr>
+              <a:t>15-Apr-20</a:t>
+            </a:r>
+            <a:br>
+              <a:rPr lang="en-US" sz="1400">
+                <a:latin typeface="Calibri"/>
+              </a:rPr>
+            </a:br>
+            <a:r>
+              <a:rPr lang="en-US" sz="1400">
+                <a:latin typeface="Calibri"/>
+              </a:rPr>
+              <a:t>15-Apr-20</a:t>
+            </a:r>
+            <a:endParaRPr lang="en-US" sz="1100"/>
+          </a:p>
+        </p:txBody>
+      </p:sp>
+      <p:sp>
+        <p:nvSpPr>
+          <p:cNvPr name="AutoShape 36" id="36"/>
+          <p:cNvSpPr/>
+          <p:nvPr/>
+        </p:nvSpPr>
+        <p:spPr>
+          <a:xfrm>
+            <a:off x="11938000" y="2527300"/>
+            <a:ext cx="25400" cy="228600"/>
+          </a:xfrm>
+          <a:prstGeom prst="rect">
+            <a:avLst/>
+          </a:prstGeom>
+          <a:solidFill>
+            <a:srgbClr val="000000"/>
+          </a:solidFill>
+          <a:ln>
+            <a:solidFill>
+              <a:srgbClr val="000000"/>
+            </a:solidFill>
+          </a:ln>
+        </p:spPr>
+      </p:sp>
+      <p:sp>
+        <p:nvSpPr>
+          <p:cNvPr name="TextBox 37" id="37"/>
+          <p:cNvSpPr txBox="true"/>
+          <p:nvPr/>
+        </p:nvSpPr>
+        <p:spPr>
+          <a:xfrm>
+            <a:off x="11506200" y="2006600"/>
+            <a:ext cx="889000" cy="215900"/>
+          </a:xfrm>
+          <a:prstGeom prst="rect">
+            <a:avLst/>
+          </a:prstGeom>
+        </p:spPr>
+        <p:txBody>
+          <a:bodyPr anchor="t" rtlCol="false"/>
+          <a:lstStyle/>
+          <a:p>
+            <a:pPr algn="ctr">
+              <a:defRPr/>
+            </a:pPr>
+            <a:r>
+              <a:rPr lang="ru-RU"/>
+              <a:t/>
+            </a:r>
+            <a:r>
+              <a:rPr lang="en-US" sz="1400">
+                <a:latin typeface="Calibri"/>
+                <a:hlinkClick r:id="rId12" tooltip="http://www.google.com"/>
+              </a:rPr>
+              <a:t>DR3</a:t>
+            </a:r>
+            <a:endParaRPr lang="en-US" sz="1100"/>
+          </a:p>
+        </p:txBody>
+      </p:sp>
+      <p:pic>
+        <p:nvPicPr>
+          <p:cNvPr name="Picture 38" id="38"/>
+          <p:cNvPicPr>
+            <a:picLocks noChangeAspect="true"/>
+          </p:cNvPicPr>
+          <p:nvPr/>
+        </p:nvPicPr>
+        <p:blipFill>
+          <a:blip r:embed="rId6"/>
+          <a:stretch>
+            <a:fillRect/>
+          </a:stretch>
+        </p:blipFill>
+        <p:spPr>
+          <a:xfrm>
+            <a:off x="11836400" y="1689100"/>
+            <a:ext cx="254000" cy="254000"/>
+          </a:xfrm>
+          <a:prstGeom prst="rect">
+            <a:avLst/>
+          </a:prstGeom>
+        </p:spPr>
+      </p:pic>
+      <p:sp>
+        <p:nvSpPr>
+          <p:cNvPr name="TextBox 39" id="39"/>
+          <p:cNvSpPr txBox="true"/>
+          <p:nvPr/>
+        </p:nvSpPr>
+        <p:spPr>
+          <a:xfrm>
+            <a:off x="11303000" y="2959100"/>
+            <a:ext cx="1270000" cy="444500"/>
+          </a:xfrm>
+          <a:prstGeom prst="rect">
+            <a:avLst/>
+          </a:prstGeom>
+        </p:spPr>
+        <p:txBody>
+          <a:bodyPr anchor="t" rtlCol="false"/>
+          <a:lstStyle/>
+          <a:p>
+            <a:pPr algn="ctr">
+              <a:defRPr/>
+            </a:pPr>
+            <a:r>
+              <a:rPr lang="ru-RU"/>
+              <a:t/>
+            </a:r>
+            <a:r>
+              <a:rPr lang="en-US" sz="1400">
+                <a:latin typeface="Calibri"/>
+              </a:rPr>
+              <a:t>19-Apr-20</a:t>
+            </a:r>
+            <a:br>
+              <a:rPr lang="en-US" sz="1400">
+                <a:latin typeface="Calibri"/>
+              </a:rPr>
+            </a:br>
+            <a:r>
+              <a:rPr lang="en-US" sz="1400">
+                <a:latin typeface="Calibri"/>
+              </a:rPr>
+              <a:t>19-Apr-20</a:t>
+            </a:r>
+            <a:endParaRPr lang="en-US" sz="1100"/>
+          </a:p>
+        </p:txBody>
+      </p:sp>
+      <p:sp>
+        <p:nvSpPr>
+          <p:cNvPr name="AutoShape 40" id="40"/>
+          <p:cNvSpPr/>
+          <p:nvPr/>
+        </p:nvSpPr>
+        <p:spPr>
+          <a:xfrm>
+            <a:off x="13208000" y="2527300"/>
+            <a:ext cx="25400" cy="228600"/>
+          </a:xfrm>
+          <a:prstGeom prst="rect">
+            <a:avLst/>
+          </a:prstGeom>
+          <a:solidFill>
+            <a:srgbClr val="000000"/>
+          </a:solidFill>
+          <a:ln>
+            <a:solidFill>
+              <a:srgbClr val="000000"/>
+            </a:solidFill>
+          </a:ln>
+        </p:spPr>
+      </p:sp>
+      <p:sp>
+        <p:nvSpPr>
+          <p:cNvPr name="TextBox 41" id="41"/>
+          <p:cNvSpPr txBox="true"/>
+          <p:nvPr/>
+        </p:nvSpPr>
+        <p:spPr>
+          <a:xfrm>
+            <a:off x="12776200" y="2006600"/>
+            <a:ext cx="889000" cy="215900"/>
+          </a:xfrm>
+          <a:prstGeom prst="rect">
+            <a:avLst/>
+          </a:prstGeom>
+        </p:spPr>
+        <p:txBody>
+          <a:bodyPr anchor="t" rtlCol="false"/>
+          <a:lstStyle/>
+          <a:p>
+            <a:pPr algn="ctr">
+              <a:defRPr/>
+            </a:pPr>
+            <a:r>
+              <a:rPr lang="ru-RU"/>
+              <a:t/>
+            </a:r>
+            <a:r>
+              <a:rPr lang="en-US" sz="1400">
+                <a:latin typeface="Calibri"/>
+                <a:hlinkClick r:id="rId13" tooltip="http://www.google.com"/>
+              </a:rPr>
+              <a:t>DR3</a:t>
+            </a:r>
+            <a:endParaRPr lang="en-US" sz="1100"/>
+          </a:p>
+        </p:txBody>
+      </p:sp>
+      <p:pic>
+        <p:nvPicPr>
+          <p:cNvPr name="Picture 42" id="42"/>
+          <p:cNvPicPr>
+            <a:picLocks noChangeAspect="true"/>
+          </p:cNvPicPr>
+          <p:nvPr/>
+        </p:nvPicPr>
+        <p:blipFill>
+          <a:blip r:embed="rId6"/>
+          <a:stretch>
+            <a:fillRect/>
+          </a:stretch>
+        </p:blipFill>
+        <p:spPr>
+          <a:xfrm>
+            <a:off x="13106400" y="1689100"/>
+            <a:ext cx="254000" cy="254000"/>
+          </a:xfrm>
+          <a:prstGeom prst="rect">
+            <a:avLst/>
+          </a:prstGeom>
+        </p:spPr>
+      </p:pic>
+      <p:sp>
+        <p:nvSpPr>
+          <p:cNvPr name="TextBox 43" id="43"/>
+          <p:cNvSpPr txBox="true"/>
+          <p:nvPr/>
+        </p:nvSpPr>
+        <p:spPr>
+          <a:xfrm>
+            <a:off x="12573000" y="2959100"/>
+            <a:ext cx="1270000" cy="444500"/>
+          </a:xfrm>
+          <a:prstGeom prst="rect">
+            <a:avLst/>
+          </a:prstGeom>
+        </p:spPr>
+        <p:txBody>
+          <a:bodyPr anchor="t" rtlCol="false"/>
+          <a:lstStyle/>
+          <a:p>
+            <a:pPr algn="ctr">
+              <a:defRPr/>
+            </a:pPr>
+            <a:r>
+              <a:rPr lang="ru-RU"/>
+              <a:t/>
+            </a:r>
+            <a:r>
+              <a:rPr lang="en-US" sz="1400">
+                <a:latin typeface="Calibri"/>
+              </a:rPr>
+              <a:t>19-Apr-20</a:t>
+            </a:r>
+            <a:br>
+              <a:rPr lang="en-US" sz="1400">
+                <a:latin typeface="Calibri"/>
+              </a:rPr>
+            </a:br>
+            <a:r>
+              <a:rPr lang="en-US" sz="1400">
+                <a:latin typeface="Calibri"/>
+              </a:rPr>
+              <a:t>19-Apr-20</a:t>
+            </a:r>
+            <a:endParaRPr lang="en-US" sz="1100"/>
+          </a:p>
+        </p:txBody>
+      </p:sp>
+      <p:sp>
+        <p:nvSpPr>
+          <p:cNvPr name="AutoShape 44" id="44"/>
+          <p:cNvSpPr/>
+          <p:nvPr/>
+        </p:nvSpPr>
+        <p:spPr>
+          <a:xfrm>
+            <a:off x="14478000" y="2527300"/>
+            <a:ext cx="25400" cy="228600"/>
+          </a:xfrm>
+          <a:prstGeom prst="rect">
+            <a:avLst/>
+          </a:prstGeom>
+          <a:solidFill>
+            <a:srgbClr val="000000"/>
+          </a:solidFill>
+          <a:ln>
+            <a:solidFill>
+              <a:srgbClr val="000000"/>
+            </a:solidFill>
+          </a:ln>
+        </p:spPr>
+      </p:sp>
+      <p:sp>
+        <p:nvSpPr>
+          <p:cNvPr name="TextBox 45" id="45"/>
+          <p:cNvSpPr txBox="true"/>
+          <p:nvPr/>
+        </p:nvSpPr>
+        <p:spPr>
+          <a:xfrm>
+            <a:off x="14046200" y="2006600"/>
+            <a:ext cx="889000" cy="215900"/>
+          </a:xfrm>
+          <a:prstGeom prst="rect">
+            <a:avLst/>
+          </a:prstGeom>
+        </p:spPr>
+        <p:txBody>
+          <a:bodyPr anchor="t" rtlCol="false"/>
+          <a:lstStyle/>
+          <a:p>
+            <a:pPr algn="ctr">
+              <a:defRPr/>
+            </a:pPr>
+            <a:r>
+              <a:rPr lang="ru-RU"/>
+              <a:t/>
+            </a:r>
+            <a:r>
+              <a:rPr lang="en-US" sz="1400">
+                <a:latin typeface="Calibri"/>
+                <a:hlinkClick r:id="rId14" tooltip="http://www.google.com"/>
+              </a:rPr>
+              <a:t>DR3</a:t>
+            </a:r>
+            <a:endParaRPr lang="en-US" sz="1100"/>
+          </a:p>
+        </p:txBody>
+      </p:sp>
+      <p:pic>
+        <p:nvPicPr>
+          <p:cNvPr name="Picture 46" id="46"/>
+          <p:cNvPicPr>
+            <a:picLocks noChangeAspect="true"/>
+          </p:cNvPicPr>
+          <p:nvPr/>
+        </p:nvPicPr>
+        <p:blipFill>
+          <a:blip r:embed="rId6"/>
+          <a:stretch>
+            <a:fillRect/>
+          </a:stretch>
+        </p:blipFill>
+        <p:spPr>
+          <a:xfrm>
+            <a:off x="14376400" y="1689100"/>
+            <a:ext cx="254000" cy="254000"/>
+          </a:xfrm>
+          <a:prstGeom prst="rect">
+            <a:avLst/>
+          </a:prstGeom>
+        </p:spPr>
+      </p:pic>
+      <p:sp>
+        <p:nvSpPr>
+          <p:cNvPr name="TextBox 47" id="47"/>
+          <p:cNvSpPr txBox="true"/>
+          <p:nvPr/>
+        </p:nvSpPr>
+        <p:spPr>
+          <a:xfrm>
+            <a:off x="13843000" y="2959100"/>
+            <a:ext cx="1270000" cy="444500"/>
+          </a:xfrm>
+          <a:prstGeom prst="rect">
+            <a:avLst/>
+          </a:prstGeom>
+        </p:spPr>
+        <p:txBody>
+          <a:bodyPr anchor="t" rtlCol="false"/>
+          <a:lstStyle/>
+          <a:p>
+            <a:pPr algn="ctr">
+              <a:defRPr/>
+            </a:pPr>
+            <a:r>
+              <a:rPr lang="ru-RU"/>
+              <a:t/>
+            </a:r>
+            <a:r>
+              <a:rPr lang="en-US" sz="1400">
+                <a:latin typeface="Calibri"/>
+              </a:rPr>
+              <a:t>19-Apr-20</a:t>
+            </a:r>
+            <a:br>
+              <a:rPr lang="en-US" sz="1400">
+                <a:latin typeface="Calibri"/>
+              </a:rPr>
+            </a:br>
+            <a:r>
+              <a:rPr lang="en-US" sz="1400">
+                <a:latin typeface="Calibri"/>
+              </a:rPr>
+              <a:t>19-Apr-20</a:t>
+            </a:r>
+            <a:endParaRPr lang="en-US" sz="1100"/>
+          </a:p>
+        </p:txBody>
+      </p:sp>
+      <p:sp>
+        <p:nvSpPr>
+          <p:cNvPr name="AutoShape 48" id="48"/>
+          <p:cNvSpPr/>
+          <p:nvPr/>
+        </p:nvSpPr>
+        <p:spPr>
+          <a:xfrm>
+            <a:off x="8890000" y="2438400"/>
+            <a:ext cx="203200" cy="406400"/>
+          </a:xfrm>
+          <a:prstGeom prst="roundRect">
+            <a:avLst/>
+          </a:prstGeom>
+          <a:solidFill>
+            <a:srgbClr val="00FF00"/>
+          </a:solidFill>
+          <a:ln>
+            <a:solidFill>
+              <a:srgbClr val="000000"/>
+            </a:solidFill>
+          </a:ln>
+        </p:spPr>
         <p:txBody>
           <a:bodyPr anchor="t" rtlCol="false" anchorCtr="true"/>
           <a:lstStyle/>
@@ -3774,7 +5096,7 @@
             </a:pPr>
             <a:r>
               <a:rPr lang="en-US"/>
-              <a:t> </a:t>
+              <a:t>G</a:t>
             </a:r>
             <a:endParaRPr lang="en-US" sz="1100"/>
           </a:p>
@@ -3782,7 +5104,7 @@
       </p:sp>
       <p:sp>
         <p:nvSpPr>
-          <p:cNvPr name="TextBox 9" id="9"/>
+          <p:cNvPr name="TextBox 49" id="49"/>
           <p:cNvSpPr txBox="true"/>
           <p:nvPr/>
         </p:nvSpPr>
@@ -3814,11 +5136,13 @@
             </a:r>
             <a:endParaRPr lang="en-US" sz="1100"/>
           </a:p>
-        </p:txBody>
-      </p:sp>
-      <p:sp>
-        <p:nvSpPr>
-          <p:cNvPr name="AutoShape 10" id="10"/>
+          <a:p/>
+          <a:p/>
+        </p:txBody>
+      </p:sp>
+      <p:sp>
+        <p:nvSpPr>
+          <p:cNvPr name="AutoShape 50" id="50"/>
           <p:cNvSpPr/>
           <p:nvPr/>
         </p:nvSpPr>
@@ -3839,7 +5163,7 @@
       </p:sp>
       <p:graphicFrame>
         <p:nvGraphicFramePr>
-          <p:cNvPr name="Table 11" id="11"/>
+          <p:cNvPr name="Table 51" id="51"/>
           <p:cNvGraphicFramePr>
             <a:graphicFrameLocks noGrp="true"/>
           </p:cNvGraphicFramePr>
@@ -3931,7 +5255,7 @@
                         <a:rPr lang="en-US" sz="1400">
                           <a:latin typeface="Calibri"/>
                         </a:rPr>
-                        <a:t>Previous </a:t>
+                        <a:t>Previous 08-Jan-19</a:t>
                       </a:r>
                       <a:endParaRPr lang="en-US" sz="1100"/>
                     </a:p>
@@ -3990,7 +5314,7 @@
                         <a:rPr lang="en-US" sz="1400">
                           <a:latin typeface="Calibri"/>
                         </a:rPr>
-                        <a:t>Current </a:t>
+                        <a:t>Current 15-Apr-20</a:t>
                       </a:r>
                       <a:endParaRPr lang="en-US" sz="1100"/>
                     </a:p>
@@ -4168,11 +5492,11 @@
                       <a:r>
                         <a:rPr lang="en-US" sz="1400" b="true">
                           <a:solidFill>
-                            <a:srgbClr val="C0C0C0"/>
+                            <a:srgbClr val="FF0000"/>
                           </a:solidFill>
                           <a:latin typeface="Calibri"/>
                         </a:rPr>
-                        <a:t> </a:t>
+                        <a:t>R</a:t>
                       </a:r>
                       <a:endParaRPr lang="en-US" sz="1100"/>
                     </a:p>
@@ -4230,11 +5554,11 @@
                       <a:r>
                         <a:rPr lang="en-US" sz="1400" b="true">
                           <a:solidFill>
-                            <a:srgbClr val="C0C0C0"/>
+                            <a:srgbClr val="00FF00"/>
                           </a:solidFill>
                           <a:latin typeface="Calibri"/>
                         </a:rPr>
-                        <a:t> </a:t>
+                        <a:t>G</a:t>
                       </a:r>
                       <a:endParaRPr lang="en-US" sz="1100"/>
                     </a:p>
@@ -4293,7 +5617,7 @@
                         <a:rPr lang="en-US" sz="1400">
                           <a:latin typeface="Calibri"/>
                         </a:rPr>
-                        <a:t/>
+                        <a:t>Overall comment</a:t>
                       </a:r>
                       <a:endParaRPr lang="en-US" sz="1100"/>
                     </a:p>
@@ -4412,11 +5736,11 @@
                       <a:r>
                         <a:rPr lang="en-US" sz="1400" b="true">
                           <a:solidFill>
-                            <a:srgbClr val="C0C0C0"/>
+                            <a:srgbClr val="FFC800"/>
                           </a:solidFill>
                           <a:latin typeface="Calibri"/>
                         </a:rPr>
-                        <a:t> </a:t>
+                        <a:t>Y</a:t>
                       </a:r>
                       <a:endParaRPr lang="en-US" sz="1100"/>
                     </a:p>
@@ -4474,11 +5798,11 @@
                       <a:r>
                         <a:rPr lang="en-US" sz="1400" b="true">
                           <a:solidFill>
-                            <a:srgbClr val="C0C0C0"/>
+                            <a:srgbClr val="FF0000"/>
                           </a:solidFill>
                           <a:latin typeface="Calibri"/>
                         </a:rPr>
-                        <a:t> </a:t>
+                        <a:t>R</a:t>
                       </a:r>
                       <a:endParaRPr lang="en-US" sz="1100"/>
                     </a:p>
@@ -4537,7 +5861,7 @@
                         <a:rPr lang="en-US" sz="1400">
                           <a:latin typeface="Calibri"/>
                         </a:rPr>
-                        <a:t/>
+                        <a:t>Schedule comment</a:t>
                       </a:r>
                       <a:endParaRPr lang="en-US" sz="1100"/>
                     </a:p>
@@ -4656,11 +5980,11 @@
                       <a:r>
                         <a:rPr lang="en-US" sz="1400" b="true">
                           <a:solidFill>
-                            <a:srgbClr val="C0C0C0"/>
+                            <a:srgbClr val="00FF00"/>
                           </a:solidFill>
                           <a:latin typeface="Calibri"/>
                         </a:rPr>
-                        <a:t> </a:t>
+                        <a:t>G</a:t>
                       </a:r>
                       <a:endParaRPr lang="en-US" sz="1100"/>
                     </a:p>
@@ -4718,11 +6042,11 @@
                       <a:r>
                         <a:rPr lang="en-US" sz="1400" b="true">
                           <a:solidFill>
-                            <a:srgbClr val="C0C0C0"/>
+                            <a:srgbClr val="FFC800"/>
                           </a:solidFill>
                           <a:latin typeface="Calibri"/>
                         </a:rPr>
-                        <a:t> </a:t>
+                        <a:t>Y</a:t>
                       </a:r>
                       <a:endParaRPr lang="en-US" sz="1100"/>
                     </a:p>
@@ -4781,7 +6105,7 @@
                         <a:rPr lang="en-US" sz="1400">
                           <a:latin typeface="Calibri"/>
                         </a:rPr>
-                        <a:t/>
+                        <a:t>Scope comment</a:t>
                       </a:r>
                       <a:endParaRPr lang="en-US" sz="1100"/>
                     </a:p>
@@ -4900,11 +6224,11 @@
                       <a:r>
                         <a:rPr lang="en-US" sz="1400" b="true">
                           <a:solidFill>
-                            <a:srgbClr val="C0C0C0"/>
+                            <a:srgbClr val="00FF00"/>
                           </a:solidFill>
                           <a:latin typeface="Calibri"/>
                         </a:rPr>
-                        <a:t> </a:t>
+                        <a:t>G</a:t>
                       </a:r>
                       <a:endParaRPr lang="en-US" sz="1100"/>
                     </a:p>
@@ -4962,11 +6286,11 @@
                       <a:r>
                         <a:rPr lang="en-US" sz="1400" b="true">
                           <a:solidFill>
-                            <a:srgbClr val="C0C0C0"/>
+                            <a:srgbClr val="FF0000"/>
                           </a:solidFill>
                           <a:latin typeface="Calibri"/>
                         </a:rPr>
-                        <a:t> </a:t>
+                        <a:t>R</a:t>
                       </a:r>
                       <a:endParaRPr lang="en-US" sz="1100"/>
                     </a:p>
@@ -5025,7 +6349,7 @@
                         <a:rPr lang="en-US" sz="1400">
                           <a:latin typeface="Calibri"/>
                         </a:rPr>
-                        <a:t/>
+                        <a:t>Quality comment</a:t>
                       </a:r>
                       <a:endParaRPr lang="en-US" sz="1100"/>
                     </a:p>
@@ -5144,11 +6468,11 @@
                       <a:r>
                         <a:rPr lang="en-US" sz="1400" b="true">
                           <a:solidFill>
-                            <a:srgbClr val="C0C0C0"/>
+                            <a:srgbClr val="FF0000"/>
                           </a:solidFill>
                           <a:latin typeface="Calibri"/>
                         </a:rPr>
-                        <a:t> </a:t>
+                        <a:t>R</a:t>
                       </a:r>
                       <a:endParaRPr lang="en-US" sz="1100"/>
                     </a:p>
@@ -5206,11 +6530,11 @@
                       <a:r>
                         <a:rPr lang="en-US" sz="1400" b="true">
                           <a:solidFill>
-                            <a:srgbClr val="C0C0C0"/>
+                            <a:srgbClr val="00FF00"/>
                           </a:solidFill>
                           <a:latin typeface="Calibri"/>
                         </a:rPr>
-                        <a:t> </a:t>
+                        <a:t>G</a:t>
                       </a:r>
                       <a:endParaRPr lang="en-US" sz="1100"/>
                     </a:p>
@@ -5269,7 +6593,7 @@
                         <a:rPr lang="en-US" sz="1400">
                           <a:latin typeface="Calibri"/>
                         </a:rPr>
-                        <a:t/>
+                        <a:t>Cost comment</a:t>
                       </a:r>
                       <a:endParaRPr lang="en-US" sz="1100"/>
                     </a:p>
@@ -5381,9 +6705,9 @@
             <a:r>
               <a:rPr lang="en-US" sz="1400">
                 <a:latin typeface="Calibri"/>
-                <a:hlinkClick r:id="rId2" tooltip=""/>
-              </a:rPr>
-              <a:t/>
+                <a:hlinkClick r:id="rId2" tooltip="http://ya.ru"/>
+              </a:rPr>
+              <a:t>Project from Facade</a:t>
             </a:r>
             <a:br>
               <a:rPr lang="en-US" sz="1400">
@@ -5400,7 +6724,7 @@
               <a:rPr lang="en-US" sz="1400">
                 <a:latin typeface="Calibri"/>
               </a:rPr>
-              <a:t/>
+              <a:t>IKSANOV Aleksandr</a:t>
             </a:r>
             <a:br>
               <a:rPr lang="en-US" sz="1400">
@@ -5453,7 +6777,7 @@
               <a:rPr lang="en-US" sz="1400" b="true">
                 <a:latin typeface="Calibri"/>
               </a:rPr>
-              <a:t/>
+              <a:t>Summary title Summary title Summary title Summary title Summary title </a:t>
             </a:r>
             <a:endParaRPr lang="en-US" sz="1100"/>
           </a:p>
@@ -5506,7 +6830,72 @@
               <a:rPr lang="ru-RU"/>
               <a:t/>
             </a:r>
+            <a:r>
+              <a:rPr lang="en-US" sz="1400" u="sng" b="true">
+                <a:solidFill>
+                  <a:srgbClr val="00FF00"/>
+                </a:solidFill>
+                <a:latin typeface="Calibri"/>
+              </a:rPr>
+              <a:t>That`s all, folks!</a:t>
+            </a:r>
             <a:endParaRPr lang="en-US" sz="1100"/>
+          </a:p>
+          <a:p>
+            <a:r>
+              <a:rPr lang="en-US" sz="1400" b="true">
+                <a:solidFill>
+                  <a:srgbClr val="FF0000"/>
+                </a:solidFill>
+                <a:latin typeface="Calibri"/>
+              </a:rPr>
+              <a:t>Red Flag</a:t>
+            </a:r>
+          </a:p>
+          <a:p>
+            <a:r>
+              <a:rPr lang="en-US" sz="1400" u="sng" b="true">
+                <a:solidFill>
+                  <a:srgbClr val="00FF00"/>
+                </a:solidFill>
+                <a:latin typeface="Calibri"/>
+              </a:rPr>
+              <a:t>That`s all, folks!</a:t>
+            </a:r>
+          </a:p>
+          <a:p>
+            <a:r>
+              <a:rPr lang="en-US" sz="1400" b="true">
+                <a:solidFill>
+                  <a:srgbClr val="FFA500"/>
+                </a:solidFill>
+                <a:latin typeface="Calibri"/>
+              </a:rPr>
+              <a:t>Yellow Flag</a:t>
+            </a:r>
+          </a:p>
+          <a:p>
+            <a:r>
+              <a:rPr lang="en-US" sz="1400">
+                <a:latin typeface="Calibri"/>
+              </a:rPr>
+              <a:t>\n" + "1PowerPoint documents are made up of a tree of records. A record may contain either other records (in which case it is a Container), or data (in which case it's an Atom). A record can't hold both. PowerPoint documents don't have one overall container record. Instead, there are a number of different container records to be found at the top level. Any numbers or strings stored in the records are always stored in Little Endian format (least important bytes first). This is the case no matter what platform the file was written on - be that a Little Endian or a Big Endian system. PowerPoint may have Escher (DDF) records embedded in it. These are always held as the children of a PPDrawing record (record type 1036). Escher records have the same format as PowerPoint records. Hello mate! Hello mate! Hello mate! Hello mate! Hello mate! Hello mate! Hello mate! Hello mate! Hello mate! This is bold and underscore and both and not true false PowerPoint documents are made up of a tree of records. A record may contain either other records (in which case it is a Container), or data (in which case it's an Atom). A record can't hold both. PowerPoint documents don't have one overall container record. Instead, there are a number of different container records to be found at the top level. Any numbers or strings stored in the records are always stored in Little Endian format (least important bytes first). This is the case no matter what platform the file was written on - be that a Little Endian or a Big Endian system. PowerPoint may have Escher (DDF) records embedded in it. These are always held as the children of a PPDrawing record (record type 1036). Escher records have the same format as PowerPoint records. A record may contain either other records (in which case it is a Container), or data (in which case it's an Atom). A record can't hold both. PowerPoint documents don't have one overall container record PowerPoint documents are made up of a tree of records. A record may contain either other records (in which case it is a Container), or data (in which case it's an Atom). A record can't hold both. PowerPoint documents don't have one overall container record. Instead, there are a number of different container records to be found at the top level. Any numbers or strings stored in the records are always stored in Little Endian format (least important bytes first). This is the case no matter what platform the file was written on - be that a Little Endian or a Big Endian system. PowerPoint may have Escher (DDF) records embedded in it. These are always held as the children of a PPDrawing record (record type 1036). Escher records have the same format as PowerPoint records. Hello mate! Hello mate! Hello mate! Hello mate! Hello mate! Hello mate! Hello mate! Hello mate! Hello mate! This is bold and underscore and both and not true false PowerPoint documents are made up of a tree of records. A record may contain either other records (in which case it is a Container), or data (in which case it's an Atom). A record can't hold both. PowerPoint documents don't have one overall container record. Instead, there are a number of different container records to be found at the top level. Any numbers or strings stored in the records are always stored in Little Endian format (least important bytes first). This is the case no matter what platform the file was written on - be that a Little Endian or a Big Endian system. PowerPoint may have Escher (DDF) records embedded in it. These are always held as the children of a PPDrawing record (record type 1036). Escher records have the same format as PowerPoint records. Hello mate! Hello mate! Hello mate! Hello mate! Hello mate! Hello mate! Hello mate! Hello mate! Hello mate! This is bold and underscore and both and not true false PowerPoint documents are made up of a tree of records. A record may contain either other records (in which case it is a Container), or data (in which case it's an Atom). A record can't hold both. PowerPoint documents don't have one overall container record documents don't have one overall container record. Instead, there are a number of different container records to be found at the top level. Any numbers or strings stored in the records are always stored in Little Endian format (least important bytes first). This is the case no matter what platform the file was written on - be that a Little Endian or a Big Endian system. PowerPoint may have Escher (DDF) records embedded in it. These are always held as the children of a PPDrawing record (record type 1036). " + "</a:t>
+            </a:r>
+            <a:r>
+              <a:rPr lang="en-US" sz="1400">
+                <a:solidFill>
+                  <a:srgbClr val="FF0000"/>
+                </a:solidFill>
+                <a:latin typeface="Calibri"/>
+              </a:rPr>
+              <a:t>2Escher records have the same format as PowerPoint records. Hello mate! Hello mate! Hello mate! Hello mate! Hello mate! Hello mate! Hello mate! Hello mate! Hello mate! This is bold and underscore and both and not true false PowerPoint documents are made up of a tree of records. A record may contain either other records (in which case it is a Container), or data (in which case it's an Atom). A record can't hold both. PowerPoint documents don't have one overall container record. Instead, there are a number of different container records to be found at the top level. Any numbers or strings stored in the records are always stored in Little Endian format (least important bytes first). This is the case no matter what platform the file was written on - be that a Little Endian or a Big Endian system. PowerPoint may have Escher (DDF) records embedded in it. These are always held as the children of a PPDrawing record (record type 1036). Escher records have the same format as PowerPoint records. Hello mate! Hello mate! Hello mate! Hello mate! Hello mate! Hello mate! Hello mate! Hello mate! Hello mate! This is bold and underscore and both and not true false PowerPoint documents are made up of a tree of records. A record may contain either other records (in which case it is a Container), or data (in which case it's an Atom). A record can't hold both. PowerPoint documents don't have one overall container record\n</a:t>
+            </a:r>
+            <a:r>
+              <a:rPr lang="en-US" sz="1400">
+                <a:latin typeface="Calibri"/>
+              </a:rPr>
+              <a:t>" + "</a:t>
+            </a:r>
           </a:p>
         </p:txBody>
       </p:sp>
@@ -5570,9 +6959,9 @@
             <a:r>
               <a:rPr lang="en-US" sz="1400">
                 <a:latin typeface="Calibri"/>
-                <a:hlinkClick r:id="rId2" tooltip=""/>
-              </a:rPr>
-              <a:t/>
+                <a:hlinkClick r:id="rId2" tooltip="http://ya.ru"/>
+              </a:rPr>
+              <a:t>Project from Facade</a:t>
             </a:r>
             <a:br>
               <a:rPr lang="en-US" sz="1400">
@@ -5589,7 +6978,7 @@
               <a:rPr lang="en-US" sz="1400">
                 <a:latin typeface="Calibri"/>
               </a:rPr>
-              <a:t/>
+              <a:t>IKSANOV Aleksandr</a:t>
             </a:r>
             <a:br>
               <a:rPr lang="en-US" sz="1400">
@@ -5642,7 +7031,7 @@
               <a:rPr lang="en-US" sz="1400" b="true">
                 <a:latin typeface="Calibri"/>
               </a:rPr>
-              <a:t>Risks</a:t>
+              <a:t>Summary title Summary title Summary title Summary title Summary title </a:t>
             </a:r>
             <a:endParaRPr lang="en-US" sz="1100"/>
           </a:p>
@@ -5695,8 +7084,61 @@
               <a:rPr lang="ru-RU"/>
               <a:t/>
             </a:r>
+            <a:r>
+              <a:rPr lang="en-US" sz="1400">
+                <a:solidFill>
+                  <a:srgbClr val="00FF00"/>
+                </a:solidFill>
+                <a:latin typeface="Calibri"/>
+              </a:rPr>
+              <a:t>3Escher records have the same format as PowerPoint records. Hello mate! Hello mate! Hello mate! Hello mate! Hello mate! Hello mate! Hello mate! Hello mate! Hello mate! This is bold and underscore and both and not true false PowerPoint documents are made up of a tree of records. A record may contain either other records (in which case it is a Container), or data (in which case it's an Atom). A record can't hold both. PowerPoint documents don't have one overall container record. Instead, there are a number of different container records to be found at the top level. Any numbers or strings stored in the records are always stored in Little Endian format (least important bytes first). This is the case no matter what platform the file was written on - be that a Little Endian or a Big Endian system. PowerPoint may have Escher (DDF) records embedded in it. These are always held as the children of a PPDrawing record (record type 1036). Escher records have the same format as PowerPoint records. Hello mate! Hello mate! Hello mate! Hello mate! Hello mate! Hello mate! Hello mate! Hello mate! Hello mate! This is bold and underscore and both and not true false PowerPoint documents are made up of a tree of records. A record may contain either other records (in which case it is a Container), or data (in which case it's an Atom). A record can't hold both. PowerPoint documents don't have one overall container record\n</a:t>
+            </a:r>
+            <a:r>
+              <a:rPr lang="en-US" sz="1400">
+                <a:latin typeface="Calibri"/>
+              </a:rPr>
+              <a:t>" + "</a:t>
+            </a:r>
+            <a:r>
+              <a:rPr lang="en-US" sz="1400">
+                <a:solidFill>
+                  <a:srgbClr val="0000FF"/>
+                </a:solidFill>
+                <a:latin typeface="Calibri"/>
+              </a:rPr>
+              <a:t>4Escher records have the same format as PowerPoint records. Hello mate! Hello mate! Hello mate! Hello mate! Hello mate! Hello mate! Hello mate! Hello mate! Hello mate! This is bold and underscore and both and not true false PowerPoint documents are made up of a tree of records. A record may contain either other records (in which case it is a Container), or data (in which case it's an Atom). A record can't hold both. PowerPoint documents don't have one overall container record. Instead, there are a number of different container records to be found at the top level. Any numbers or strings stored in the records are always stored in Little Endian format (least important bytes first). This is the case no matter what platform the file was written on - be that a Little Endian or a Big Endian system. PowerPoint may have Escher (DDF) records embedded in it. These are always held as the children of a PPDrawing record (record type 1036). Escher records have the same format as PowerPoint records. Hello mate! Hello mate! Hello mate! Hello mate! Hello mate! Hello mate! Hello mate! Hello mate! Hello mate! This is bold and underscore and both and not true false PowerPoint documents are made up of a tree of records. A record may contain either other records (in which case it is a Container), or data (in which case it's an Atom). A record can't hold both. PowerPoint documents don't have one overall container record\n</a:t>
+            </a:r>
+            <a:r>
+              <a:rPr lang="en-US" sz="1400">
+                <a:latin typeface="Calibri"/>
+              </a:rPr>
+              <a:t>" + "</a:t>
+            </a:r>
             <a:endParaRPr lang="en-US" sz="1100"/>
           </a:p>
+          <a:p>
+            <a:r>
+              <a:rPr lang="en-US" sz="1400" b="true">
+                <a:solidFill>
+                  <a:srgbClr val="00FF00"/>
+                </a:solidFill>
+                <a:latin typeface="Calibri"/>
+              </a:rPr>
+              <a:t>Green Flag</a:t>
+            </a:r>
+          </a:p>
+          <a:p>
+            <a:r>
+              <a:rPr lang="en-US" sz="1400" u="sng" b="true">
+                <a:solidFill>
+                  <a:srgbClr val="00FF00"/>
+                </a:solidFill>
+                <a:latin typeface="Calibri"/>
+              </a:rPr>
+              <a:t>That`s all, folks!</a:t>
+            </a:r>
+          </a:p>
+          <a:p/>
         </p:txBody>
       </p:sp>
     </p:spTree>
@@ -5759,9 +7201,9 @@
             <a:r>
               <a:rPr lang="en-US" sz="1400">
                 <a:latin typeface="Calibri"/>
-                <a:hlinkClick r:id="rId2" tooltip=""/>
-              </a:rPr>
-              <a:t/>
+                <a:hlinkClick r:id="rId2" tooltip="http://ya.ru"/>
+              </a:rPr>
+              <a:t>Project from Facade</a:t>
             </a:r>
             <a:br>
               <a:rPr lang="en-US" sz="1400">
@@ -5778,7 +7220,7 @@
               <a:rPr lang="en-US" sz="1400">
                 <a:latin typeface="Calibri"/>
               </a:rPr>
-              <a:t/>
+              <a:t>IKSANOV Aleksandr</a:t>
             </a:r>
             <a:br>
               <a:rPr lang="en-US" sz="1400">
@@ -5831,7 +7273,7 @@
               <a:rPr lang="en-US" sz="1400" b="true">
                 <a:latin typeface="Calibri"/>
               </a:rPr>
-              <a:t>Scope Definition</a:t>
+              <a:t>Risks</a:t>
             </a:r>
             <a:endParaRPr lang="en-US" sz="1100"/>
           </a:p>
@@ -5885,6 +7327,366 @@
               <a:t/>
             </a:r>
             <a:endParaRPr lang="en-US" sz="1100"/>
+          </a:p>
+          <a:p>
+            <a:r>
+              <a:rPr lang="en-US" sz="1400" b="true" u="sng">
+                <a:solidFill>
+                  <a:srgbClr val="FF0000"/>
+                </a:solidFill>
+                <a:latin typeface="Calibri"/>
+              </a:rPr>
+              <a:t>High Risks</a:t>
+            </a:r>
+          </a:p>
+          <a:p>
+            <a:pPr lvl="1">
+              <a:buFont typeface="Arial"/>
+              <a:buChar char="-"/>
+            </a:pPr>
+            <a:r>
+              <a:rPr lang="en-US" sz="1400" b="true">
+                <a:latin typeface="Calibri"/>
+              </a:rPr>
+              <a:t>Risk: </a:t>
+            </a:r>
+            <a:r>
+              <a:rPr lang="en-US" sz="1400">
+                <a:latin typeface="Calibri"/>
+              </a:rPr>
+              <a:t>Description High</a:t>
+            </a:r>
+            <a:br>
+              <a:rPr lang="en-US" sz="1400">
+                <a:latin typeface="Calibri"/>
+              </a:rPr>
+            </a:br>
+            <a:r>
+              <a:rPr lang="en-US" sz="1400" u="sng">
+                <a:latin typeface="Calibri"/>
+              </a:rPr>
+              <a:t>Description: </a:t>
+            </a:r>
+            <a:r>
+              <a:rPr lang="en-US" sz="1400">
+                <a:latin typeface="Calibri"/>
+              </a:rPr>
+              <a:t>Impact High</a:t>
+            </a:r>
+            <a:br>
+              <a:rPr lang="en-US" sz="1400">
+                <a:latin typeface="Calibri"/>
+              </a:rPr>
+            </a:br>
+            <a:r>
+              <a:rPr lang="en-US" sz="1400" u="sng">
+                <a:latin typeface="Calibri"/>
+              </a:rPr>
+              <a:t>Mitigation Plan: </a:t>
+            </a:r>
+            <a:r>
+              <a:rPr lang="en-US" sz="1400">
+                <a:latin typeface="Calibri"/>
+              </a:rPr>
+              <a:t>Mitigation High</a:t>
+            </a:r>
+          </a:p>
+          <a:p>
+            <a:pPr lvl="1">
+              <a:buFont typeface="Arial"/>
+              <a:buChar char="-"/>
+            </a:pPr>
+            <a:r>
+              <a:rPr lang="en-US" sz="1400" b="true">
+                <a:latin typeface="Calibri"/>
+              </a:rPr>
+              <a:t>Risk: </a:t>
+            </a:r>
+            <a:r>
+              <a:rPr lang="en-US" sz="1400">
+                <a:latin typeface="Calibri"/>
+              </a:rPr>
+              <a:t>Description High</a:t>
+            </a:r>
+            <a:br>
+              <a:rPr lang="en-US" sz="1400">
+                <a:latin typeface="Calibri"/>
+              </a:rPr>
+            </a:br>
+            <a:r>
+              <a:rPr lang="en-US" sz="1400" u="sng">
+                <a:latin typeface="Calibri"/>
+              </a:rPr>
+              <a:t>Description: </a:t>
+            </a:r>
+            <a:r>
+              <a:rPr lang="en-US" sz="1400">
+                <a:latin typeface="Calibri"/>
+              </a:rPr>
+              <a:t>Impact High</a:t>
+            </a:r>
+            <a:br>
+              <a:rPr lang="en-US" sz="1400">
+                <a:latin typeface="Calibri"/>
+              </a:rPr>
+            </a:br>
+            <a:r>
+              <a:rPr lang="en-US" sz="1400" u="sng">
+                <a:latin typeface="Calibri"/>
+              </a:rPr>
+              <a:t>Mitigation Plan: </a:t>
+            </a:r>
+            <a:r>
+              <a:rPr lang="en-US" sz="1400">
+                <a:latin typeface="Calibri"/>
+              </a:rPr>
+              <a:t>Mitigation High</a:t>
+            </a:r>
+            <a:br>
+              <a:rPr lang="en-US" sz="1400">
+                <a:latin typeface="Calibri"/>
+              </a:rPr>
+            </a:br>
+          </a:p>
+          <a:p>
+            <a:r>
+              <a:rPr lang="en-US" sz="1400" b="true" u="sng">
+                <a:solidFill>
+                  <a:srgbClr val="FFC800"/>
+                </a:solidFill>
+                <a:latin typeface="Calibri"/>
+              </a:rPr>
+              <a:t>Moderate Risks</a:t>
+            </a:r>
+          </a:p>
+          <a:p>
+            <a:pPr lvl="1">
+              <a:buFont typeface="Arial"/>
+              <a:buChar char="-"/>
+            </a:pPr>
+            <a:r>
+              <a:rPr lang="en-US" sz="1400" b="true">
+                <a:latin typeface="Calibri"/>
+              </a:rPr>
+              <a:t>Risk: </a:t>
+            </a:r>
+            <a:r>
+              <a:rPr lang="en-US" sz="1400">
+                <a:latin typeface="Calibri"/>
+              </a:rPr>
+              <a:t>Description Moderate</a:t>
+            </a:r>
+            <a:br>
+              <a:rPr lang="en-US" sz="1400">
+                <a:latin typeface="Calibri"/>
+              </a:rPr>
+            </a:br>
+            <a:r>
+              <a:rPr lang="en-US" sz="1400" u="sng">
+                <a:latin typeface="Calibri"/>
+              </a:rPr>
+              <a:t>Description: </a:t>
+            </a:r>
+            <a:r>
+              <a:rPr lang="en-US" sz="1400">
+                <a:latin typeface="Calibri"/>
+              </a:rPr>
+              <a:t>Impact Moderate</a:t>
+            </a:r>
+            <a:br>
+              <a:rPr lang="en-US" sz="1400">
+                <a:latin typeface="Calibri"/>
+              </a:rPr>
+            </a:br>
+            <a:r>
+              <a:rPr lang="en-US" sz="1400" u="sng">
+                <a:latin typeface="Calibri"/>
+              </a:rPr>
+              <a:t>Mitigation Plan: </a:t>
+            </a:r>
+            <a:r>
+              <a:rPr lang="en-US" sz="1400">
+                <a:latin typeface="Calibri"/>
+              </a:rPr>
+              <a:t>Mitigation Moderate</a:t>
+            </a:r>
+          </a:p>
+          <a:p>
+            <a:pPr lvl="1">
+              <a:buFont typeface="Arial"/>
+              <a:buChar char="-"/>
+            </a:pPr>
+            <a:r>
+              <a:rPr lang="en-US" sz="1400" b="true">
+                <a:latin typeface="Calibri"/>
+              </a:rPr>
+              <a:t>Risk: </a:t>
+            </a:r>
+            <a:r>
+              <a:rPr lang="en-US" sz="1400">
+                <a:latin typeface="Calibri"/>
+              </a:rPr>
+              <a:t>Description Moderate</a:t>
+            </a:r>
+            <a:br>
+              <a:rPr lang="en-US" sz="1400">
+                <a:latin typeface="Calibri"/>
+              </a:rPr>
+            </a:br>
+            <a:r>
+              <a:rPr lang="en-US" sz="1400" u="sng">
+                <a:latin typeface="Calibri"/>
+              </a:rPr>
+              <a:t>Description: </a:t>
+            </a:r>
+            <a:r>
+              <a:rPr lang="en-US" sz="1400">
+                <a:latin typeface="Calibri"/>
+              </a:rPr>
+              <a:t>Impact Moderate</a:t>
+            </a:r>
+            <a:br>
+              <a:rPr lang="en-US" sz="1400">
+                <a:latin typeface="Calibri"/>
+              </a:rPr>
+            </a:br>
+            <a:r>
+              <a:rPr lang="en-US" sz="1400" u="sng">
+                <a:latin typeface="Calibri"/>
+              </a:rPr>
+              <a:t>Mitigation Plan: </a:t>
+            </a:r>
+            <a:r>
+              <a:rPr lang="en-US" sz="1400">
+                <a:latin typeface="Calibri"/>
+              </a:rPr>
+              <a:t>Mitigation Moderate</a:t>
+            </a:r>
+            <a:br>
+              <a:rPr lang="en-US" sz="1400">
+                <a:latin typeface="Calibri"/>
+              </a:rPr>
+            </a:br>
+          </a:p>
+          <a:p>
+            <a:r>
+              <a:rPr lang="en-US" sz="1400" b="true" u="sng">
+                <a:solidFill>
+                  <a:srgbClr val="00FF00"/>
+                </a:solidFill>
+                <a:latin typeface="Calibri"/>
+              </a:rPr>
+              <a:t>Low Risks</a:t>
+            </a:r>
+          </a:p>
+          <a:p>
+            <a:pPr lvl="1">
+              <a:buFont typeface="Arial"/>
+              <a:buChar char="-"/>
+            </a:pPr>
+            <a:r>
+              <a:rPr lang="en-US" sz="1400" b="true">
+                <a:latin typeface="Calibri"/>
+              </a:rPr>
+              <a:t>Risk: </a:t>
+            </a:r>
+            <a:r>
+              <a:rPr lang="en-US" sz="1400">
+                <a:latin typeface="Calibri"/>
+              </a:rPr>
+              <a:t>Description Low</a:t>
+            </a:r>
+            <a:br>
+              <a:rPr lang="en-US" sz="1400">
+                <a:latin typeface="Calibri"/>
+              </a:rPr>
+            </a:br>
+            <a:r>
+              <a:rPr lang="en-US" sz="1400" u="sng">
+                <a:latin typeface="Calibri"/>
+              </a:rPr>
+              <a:t>Description: </a:t>
+            </a:r>
+            <a:r>
+              <a:rPr lang="en-US" sz="1400">
+                <a:latin typeface="Calibri"/>
+              </a:rPr>
+              <a:t>Impact Low</a:t>
+            </a:r>
+            <a:br>
+              <a:rPr lang="en-US" sz="1400">
+                <a:latin typeface="Calibri"/>
+              </a:rPr>
+            </a:br>
+            <a:r>
+              <a:rPr lang="en-US" sz="1400" u="sng">
+                <a:latin typeface="Calibri"/>
+              </a:rPr>
+              <a:t>Mitigation Plan: </a:t>
+            </a:r>
+            <a:r>
+              <a:rPr lang="en-US" sz="1400">
+                <a:latin typeface="Calibri"/>
+              </a:rPr>
+              <a:t>Mitigation Low</a:t>
+            </a:r>
+          </a:p>
+          <a:p>
+            <a:pPr lvl="1">
+              <a:buFont typeface="Arial"/>
+              <a:buChar char="-"/>
+            </a:pPr>
+            <a:r>
+              <a:rPr lang="en-US" sz="1400" b="true">
+                <a:latin typeface="Calibri"/>
+              </a:rPr>
+              <a:t>Risk: </a:t>
+            </a:r>
+            <a:r>
+              <a:rPr lang="en-US" sz="1400">
+                <a:latin typeface="Calibri"/>
+              </a:rPr>
+              <a:t>Description Low</a:t>
+            </a:r>
+            <a:br>
+              <a:rPr lang="en-US" sz="1400">
+                <a:latin typeface="Calibri"/>
+              </a:rPr>
+            </a:br>
+            <a:r>
+              <a:rPr lang="en-US" sz="1400" u="sng">
+                <a:latin typeface="Calibri"/>
+              </a:rPr>
+              <a:t>Description: </a:t>
+            </a:r>
+            <a:r>
+              <a:rPr lang="en-US" sz="1400">
+                <a:latin typeface="Calibri"/>
+              </a:rPr>
+              <a:t>Impact Low</a:t>
+            </a:r>
+            <a:br>
+              <a:rPr lang="en-US" sz="1400">
+                <a:latin typeface="Calibri"/>
+              </a:rPr>
+            </a:br>
+            <a:r>
+              <a:rPr lang="en-US" sz="1400" u="sng">
+                <a:latin typeface="Calibri"/>
+              </a:rPr>
+              <a:t>Mitigation Plan: </a:t>
+            </a:r>
+            <a:r>
+              <a:rPr lang="en-US" sz="1400">
+                <a:latin typeface="Calibri"/>
+              </a:rPr>
+              <a:t>Mitigation Low</a:t>
+            </a:r>
+            <a:br>
+              <a:rPr lang="en-US" sz="1400">
+                <a:latin typeface="Calibri"/>
+              </a:rPr>
+            </a:br>
           </a:p>
         </p:txBody>
       </p:sp>
@@ -5948,9 +7750,9 @@
             <a:r>
               <a:rPr lang="en-US" sz="1400">
                 <a:latin typeface="Calibri"/>
-                <a:hlinkClick r:id="rId2" tooltip=""/>
-              </a:rPr>
-              <a:t/>
+                <a:hlinkClick r:id="rId2" tooltip="http://ya.ru"/>
+              </a:rPr>
+              <a:t>Project from Facade</a:t>
             </a:r>
             <a:br>
               <a:rPr lang="en-US" sz="1400">
@@ -5967,7 +7769,7 @@
               <a:rPr lang="en-US" sz="1400">
                 <a:latin typeface="Calibri"/>
               </a:rPr>
-              <a:t/>
+              <a:t>IKSANOV Aleksandr</a:t>
             </a:r>
             <a:br>
               <a:rPr lang="en-US" sz="1400">
@@ -6020,7 +7822,7 @@
               <a:rPr lang="en-US" sz="1400" b="true">
                 <a:latin typeface="Calibri"/>
               </a:rPr>
-              <a:t>Other Information</a:t>
+              <a:t>Scope Definition</a:t>
             </a:r>
             <a:endParaRPr lang="en-US" sz="1100"/>
           </a:p>
@@ -6075,6 +7877,807 @@
             </a:r>
             <a:endParaRPr lang="en-US" sz="1100"/>
           </a:p>
+          <a:p>
+            <a:pPr>
+              <a:buFont typeface="Arial"/>
+              <a:buChar char="-"/>
+            </a:pPr>
+            <a:r>
+              <a:rPr lang="en-US" sz="1400" b="true" u="sng">
+                <a:latin typeface="Calibri"/>
+              </a:rPr>
+              <a:t>SuperId1: </a:t>
+            </a:r>
+            <a:r>
+              <a:rPr lang="en-US" sz="1400">
+                <a:latin typeface="Calibri"/>
+              </a:rPr>
+              <a:t>Hreadline</a:t>
+            </a:r>
+            <a:r>
+              <a:rPr lang="en-US" sz="1400" u="sng">
+                <a:latin typeface="Calibri"/>
+              </a:rPr>
+              <a:t> Status: </a:t>
+            </a:r>
+            <a:r>
+              <a:rPr lang="en-US" sz="1400">
+                <a:latin typeface="Calibri"/>
+              </a:rPr>
+              <a:t>Done</a:t>
+            </a:r>
+          </a:p>
+          <a:p>
+            <a:pPr>
+              <a:buFont typeface="Arial"/>
+              <a:buChar char="-"/>
+            </a:pPr>
+            <a:r>
+              <a:rPr lang="en-US" sz="1400" b="true" u="sng">
+                <a:latin typeface="Calibri"/>
+              </a:rPr>
+              <a:t>SuperId2222: </a:t>
+            </a:r>
+            <a:r>
+              <a:rPr lang="en-US" sz="1400">
+                <a:latin typeface="Calibri"/>
+              </a:rPr>
+              <a:t>Hreadline</a:t>
+            </a:r>
+            <a:r>
+              <a:rPr lang="en-US" sz="1400" u="sng">
+                <a:latin typeface="Calibri"/>
+              </a:rPr>
+              <a:t> Status: </a:t>
+            </a:r>
+            <a:r>
+              <a:rPr lang="en-US" sz="1400">
+                <a:latin typeface="Calibri"/>
+              </a:rPr>
+              <a:t>Done</a:t>
+            </a:r>
+          </a:p>
+          <a:p>
+            <a:pPr>
+              <a:buFont typeface="Arial"/>
+              <a:buChar char="-"/>
+            </a:pPr>
+            <a:r>
+              <a:rPr lang="en-US" sz="1400" b="true" u="sng">
+                <a:latin typeface="Calibri"/>
+              </a:rPr>
+              <a:t>SuperId1: </a:t>
+            </a:r>
+            <a:r>
+              <a:rPr lang="en-US" sz="1400">
+                <a:latin typeface="Calibri"/>
+              </a:rPr>
+              <a:t>Hreadline</a:t>
+            </a:r>
+            <a:r>
+              <a:rPr lang="en-US" sz="1400" u="sng">
+                <a:latin typeface="Calibri"/>
+              </a:rPr>
+              <a:t> Status: </a:t>
+            </a:r>
+            <a:r>
+              <a:rPr lang="en-US" sz="1400">
+                <a:latin typeface="Calibri"/>
+              </a:rPr>
+              <a:t>Done</a:t>
+            </a:r>
+          </a:p>
+          <a:p>
+            <a:pPr>
+              <a:buFont typeface="Arial"/>
+              <a:buChar char="-"/>
+            </a:pPr>
+            <a:r>
+              <a:rPr lang="en-US" sz="1400" b="true" u="sng">
+                <a:latin typeface="Calibri"/>
+              </a:rPr>
+              <a:t>SuperId2222: </a:t>
+            </a:r>
+            <a:r>
+              <a:rPr lang="en-US" sz="1400">
+                <a:latin typeface="Calibri"/>
+              </a:rPr>
+              <a:t>Hreadline</a:t>
+            </a:r>
+            <a:r>
+              <a:rPr lang="en-US" sz="1400" u="sng">
+                <a:latin typeface="Calibri"/>
+              </a:rPr>
+              <a:t> Status: </a:t>
+            </a:r>
+            <a:r>
+              <a:rPr lang="en-US" sz="1400">
+                <a:latin typeface="Calibri"/>
+              </a:rPr>
+              <a:t>Done</a:t>
+            </a:r>
+          </a:p>
+          <a:p>
+            <a:pPr>
+              <a:buFont typeface="Arial"/>
+              <a:buChar char="-"/>
+            </a:pPr>
+            <a:r>
+              <a:rPr lang="en-US" sz="1400" b="true" u="sng">
+                <a:latin typeface="Calibri"/>
+              </a:rPr>
+              <a:t>SuperId1: </a:t>
+            </a:r>
+            <a:r>
+              <a:rPr lang="en-US" sz="1400">
+                <a:latin typeface="Calibri"/>
+              </a:rPr>
+              <a:t>Hreadline</a:t>
+            </a:r>
+            <a:r>
+              <a:rPr lang="en-US" sz="1400" u="sng">
+                <a:latin typeface="Calibri"/>
+              </a:rPr>
+              <a:t> Status: </a:t>
+            </a:r>
+            <a:r>
+              <a:rPr lang="en-US" sz="1400">
+                <a:latin typeface="Calibri"/>
+              </a:rPr>
+              <a:t>Done</a:t>
+            </a:r>
+          </a:p>
+          <a:p>
+            <a:pPr>
+              <a:buFont typeface="Arial"/>
+              <a:buChar char="-"/>
+            </a:pPr>
+            <a:r>
+              <a:rPr lang="en-US" sz="1400" b="true" u="sng">
+                <a:latin typeface="Calibri"/>
+              </a:rPr>
+              <a:t>SuperId2222: </a:t>
+            </a:r>
+            <a:r>
+              <a:rPr lang="en-US" sz="1400">
+                <a:latin typeface="Calibri"/>
+              </a:rPr>
+              <a:t>Hreadline</a:t>
+            </a:r>
+            <a:r>
+              <a:rPr lang="en-US" sz="1400" u="sng">
+                <a:latin typeface="Calibri"/>
+              </a:rPr>
+              <a:t> Status: </a:t>
+            </a:r>
+            <a:r>
+              <a:rPr lang="en-US" sz="1400">
+                <a:latin typeface="Calibri"/>
+              </a:rPr>
+              <a:t>Done</a:t>
+            </a:r>
+          </a:p>
+          <a:p>
+            <a:pPr>
+              <a:buFont typeface="Arial"/>
+              <a:buChar char="-"/>
+            </a:pPr>
+            <a:r>
+              <a:rPr lang="en-US" sz="1400" b="true" u="sng">
+                <a:latin typeface="Calibri"/>
+              </a:rPr>
+              <a:t>SuperId1: </a:t>
+            </a:r>
+            <a:r>
+              <a:rPr lang="en-US" sz="1400">
+                <a:latin typeface="Calibri"/>
+              </a:rPr>
+              <a:t>Hreadline</a:t>
+            </a:r>
+            <a:r>
+              <a:rPr lang="en-US" sz="1400" u="sng">
+                <a:latin typeface="Calibri"/>
+              </a:rPr>
+              <a:t> Status: </a:t>
+            </a:r>
+            <a:r>
+              <a:rPr lang="en-US" sz="1400">
+                <a:latin typeface="Calibri"/>
+              </a:rPr>
+              <a:t>Done</a:t>
+            </a:r>
+          </a:p>
+          <a:p>
+            <a:pPr>
+              <a:buFont typeface="Arial"/>
+              <a:buChar char="-"/>
+            </a:pPr>
+            <a:r>
+              <a:rPr lang="en-US" sz="1400" b="true" u="sng">
+                <a:latin typeface="Calibri"/>
+              </a:rPr>
+              <a:t>SuperId2222: </a:t>
+            </a:r>
+            <a:r>
+              <a:rPr lang="en-US" sz="1400">
+                <a:latin typeface="Calibri"/>
+              </a:rPr>
+              <a:t>Hreadline</a:t>
+            </a:r>
+            <a:r>
+              <a:rPr lang="en-US" sz="1400" u="sng">
+                <a:latin typeface="Calibri"/>
+              </a:rPr>
+              <a:t> Status: </a:t>
+            </a:r>
+            <a:r>
+              <a:rPr lang="en-US" sz="1400">
+                <a:latin typeface="Calibri"/>
+              </a:rPr>
+              <a:t>Done</a:t>
+            </a:r>
+          </a:p>
+          <a:p>
+            <a:pPr>
+              <a:buFont typeface="Arial"/>
+              <a:buChar char="-"/>
+            </a:pPr>
+            <a:r>
+              <a:rPr lang="en-US" sz="1400" b="true" u="sng">
+                <a:latin typeface="Calibri"/>
+              </a:rPr>
+              <a:t>SuperId1: </a:t>
+            </a:r>
+            <a:r>
+              <a:rPr lang="en-US" sz="1400">
+                <a:latin typeface="Calibri"/>
+              </a:rPr>
+              <a:t>Hreadline</a:t>
+            </a:r>
+            <a:r>
+              <a:rPr lang="en-US" sz="1400" u="sng">
+                <a:latin typeface="Calibri"/>
+              </a:rPr>
+              <a:t> Status: </a:t>
+            </a:r>
+            <a:r>
+              <a:rPr lang="en-US" sz="1400">
+                <a:latin typeface="Calibri"/>
+              </a:rPr>
+              <a:t>Done</a:t>
+            </a:r>
+          </a:p>
+          <a:p>
+            <a:pPr>
+              <a:buFont typeface="Arial"/>
+              <a:buChar char="-"/>
+            </a:pPr>
+            <a:r>
+              <a:rPr lang="en-US" sz="1400" b="true" u="sng">
+                <a:latin typeface="Calibri"/>
+              </a:rPr>
+              <a:t>SuperId2222: </a:t>
+            </a:r>
+            <a:r>
+              <a:rPr lang="en-US" sz="1400">
+                <a:latin typeface="Calibri"/>
+              </a:rPr>
+              <a:t>Hreadline</a:t>
+            </a:r>
+            <a:r>
+              <a:rPr lang="en-US" sz="1400" u="sng">
+                <a:latin typeface="Calibri"/>
+              </a:rPr>
+              <a:t> Status: </a:t>
+            </a:r>
+            <a:r>
+              <a:rPr lang="en-US" sz="1400">
+                <a:latin typeface="Calibri"/>
+              </a:rPr>
+              <a:t>Done</a:t>
+            </a:r>
+          </a:p>
+          <a:p>
+            <a:pPr>
+              <a:buFont typeface="Arial"/>
+              <a:buChar char="-"/>
+            </a:pPr>
+            <a:r>
+              <a:rPr lang="en-US" sz="1400" b="true" u="sng">
+                <a:latin typeface="Calibri"/>
+              </a:rPr>
+              <a:t>SuperId1: </a:t>
+            </a:r>
+            <a:r>
+              <a:rPr lang="en-US" sz="1400">
+                <a:latin typeface="Calibri"/>
+              </a:rPr>
+              <a:t>Hreadline</a:t>
+            </a:r>
+            <a:r>
+              <a:rPr lang="en-US" sz="1400" u="sng">
+                <a:latin typeface="Calibri"/>
+              </a:rPr>
+              <a:t> Status: </a:t>
+            </a:r>
+            <a:r>
+              <a:rPr lang="en-US" sz="1400">
+                <a:latin typeface="Calibri"/>
+              </a:rPr>
+              <a:t>Done</a:t>
+            </a:r>
+          </a:p>
+          <a:p>
+            <a:pPr>
+              <a:buFont typeface="Arial"/>
+              <a:buChar char="-"/>
+            </a:pPr>
+            <a:r>
+              <a:rPr lang="en-US" sz="1400" b="true" u="sng">
+                <a:latin typeface="Calibri"/>
+              </a:rPr>
+              <a:t>SuperId2222: </a:t>
+            </a:r>
+            <a:r>
+              <a:rPr lang="en-US" sz="1400">
+                <a:latin typeface="Calibri"/>
+              </a:rPr>
+              <a:t>Hreadline</a:t>
+            </a:r>
+            <a:r>
+              <a:rPr lang="en-US" sz="1400" u="sng">
+                <a:latin typeface="Calibri"/>
+              </a:rPr>
+              <a:t> Status: </a:t>
+            </a:r>
+            <a:r>
+              <a:rPr lang="en-US" sz="1400">
+                <a:latin typeface="Calibri"/>
+              </a:rPr>
+              <a:t>Done</a:t>
+            </a:r>
+          </a:p>
+        </p:txBody>
+      </p:sp>
+    </p:spTree>
+  </p:cSld>
+  <p:clrMapOvr>
+    <a:masterClrMapping/>
+  </p:clrMapOvr>
+</p:sld>
+</file>
+
+<file path=ppt/slides/slide6.xml><?xml version="1.0" encoding="utf-8"?>
+<p:sld xmlns:p="http://schemas.openxmlformats.org/presentationml/2006/main" xmlns:a="http://schemas.openxmlformats.org/drawingml/2006/main" xmlns:r="http://schemas.openxmlformats.org/officeDocument/2006/relationships">
+  <p:cSld>
+    <p:spTree>
+      <p:nvGrpSpPr>
+        <p:cNvPr id="1" name=""/>
+        <p:cNvGrpSpPr/>
+        <p:nvPr/>
+      </p:nvGrpSpPr>
+      <p:grpSpPr>
+        <a:xfrm>
+          <a:off x="0" y="0"/>
+          <a:ext cx="0" cy="0"/>
+          <a:chOff x="0" y="0"/>
+          <a:chExt cx="0" cy="0"/>
+        </a:xfrm>
+      </p:grpSpPr>
+      <p:sp>
+        <p:nvSpPr>
+          <p:cNvPr name="TextBox 2" id="2"/>
+          <p:cNvSpPr txBox="true"/>
+          <p:nvPr/>
+        </p:nvSpPr>
+        <p:spPr>
+          <a:xfrm>
+            <a:off x="254000" y="254000"/>
+            <a:ext cx="6350000" cy="762000"/>
+          </a:xfrm>
+          <a:prstGeom prst="rect">
+            <a:avLst/>
+          </a:prstGeom>
+        </p:spPr>
+        <p:txBody>
+          <a:bodyPr anchor="t" rtlCol="false"/>
+          <a:lstStyle/>
+          <a:p>
+            <a:pPr algn="l">
+              <a:defRPr/>
+            </a:pPr>
+            <a:r>
+              <a:rPr lang="ru-RU"/>
+              <a:t/>
+            </a:r>
+            <a:r>
+              <a:rPr lang="en-US" sz="1400" b="true">
+                <a:latin typeface="Calibri"/>
+              </a:rPr>
+              <a:t>Project name: </a:t>
+            </a:r>
+            <a:r>
+              <a:rPr lang="en-US" sz="1400">
+                <a:latin typeface="Calibri"/>
+                <a:hlinkClick r:id="rId2" tooltip="http://ya.ru"/>
+              </a:rPr>
+              <a:t>Project from Facade</a:t>
+            </a:r>
+            <a:br>
+              <a:rPr lang="en-US" sz="1400">
+                <a:latin typeface="Calibri"/>
+              </a:rPr>
+            </a:br>
+            <a:r>
+              <a:rPr lang="en-US" sz="1400" b="true">
+                <a:latin typeface="Calibri"/>
+              </a:rPr>
+              <a:t>Project manager: </a:t>
+            </a:r>
+            <a:r>
+              <a:rPr lang="en-US" sz="1400">
+                <a:latin typeface="Calibri"/>
+              </a:rPr>
+              <a:t>IKSANOV Aleksandr</a:t>
+            </a:r>
+            <a:br>
+              <a:rPr lang="en-US" sz="1400">
+                <a:latin typeface="Calibri"/>
+              </a:rPr>
+            </a:br>
+            <a:r>
+              <a:rPr lang="en-US" sz="1400" b="true">
+                <a:latin typeface="Calibri"/>
+              </a:rPr>
+              <a:t>Last Updated: </a:t>
+            </a:r>
+            <a:r>
+              <a:rPr lang="en-US" sz="1400">
+                <a:latin typeface="Calibri"/>
+              </a:rPr>
+              <a:t>20-Apr-20</a:t>
+            </a:r>
+            <a:endParaRPr lang="en-US" sz="1100"/>
+          </a:p>
+        </p:txBody>
+      </p:sp>
+      <p:sp>
+        <p:nvSpPr>
+          <p:cNvPr name="TextBox 3" id="3"/>
+          <p:cNvSpPr txBox="true"/>
+          <p:nvPr/>
+        </p:nvSpPr>
+        <p:spPr>
+          <a:xfrm>
+            <a:off x="254000" y="1244600"/>
+            <a:ext cx="15748000" cy="215900"/>
+          </a:xfrm>
+          <a:prstGeom prst="rect">
+            <a:avLst/>
+          </a:prstGeom>
+        </p:spPr>
+        <p:txBody>
+          <a:bodyPr anchor="t" rtlCol="false"/>
+          <a:lstStyle/>
+          <a:p>
+            <a:pPr algn="l">
+              <a:defRPr/>
+            </a:pPr>
+            <a:r>
+              <a:rPr lang="ru-RU"/>
+              <a:t/>
+            </a:r>
+            <a:r>
+              <a:rPr lang="en-US" sz="1400" b="true">
+                <a:latin typeface="Calibri"/>
+              </a:rPr>
+              <a:t>Other Information</a:t>
+            </a:r>
+            <a:endParaRPr lang="en-US" sz="1100"/>
+          </a:p>
+        </p:txBody>
+      </p:sp>
+      <p:sp>
+        <p:nvSpPr>
+          <p:cNvPr name="AutoShape 4" id="4"/>
+          <p:cNvSpPr/>
+          <p:nvPr/>
+        </p:nvSpPr>
+        <p:spPr>
+          <a:xfrm>
+            <a:off x="254000" y="1562100"/>
+            <a:ext cx="15748000" cy="12700"/>
+          </a:xfrm>
+          <a:prstGeom prst="line">
+            <a:avLst/>
+          </a:prstGeom>
+          <a:ln>
+            <a:solidFill>
+              <a:srgbClr val="000000"/>
+            </a:solidFill>
+          </a:ln>
+        </p:spPr>
+      </p:sp>
+      <p:sp>
+        <p:nvSpPr>
+          <p:cNvPr name="TextBox 5" id="5"/>
+          <p:cNvSpPr txBox="true"/>
+          <p:nvPr/>
+        </p:nvSpPr>
+        <p:spPr>
+          <a:xfrm>
+            <a:off x="254000" y="1562100"/>
+            <a:ext cx="15748000" cy="7327900"/>
+          </a:xfrm>
+          <a:prstGeom prst="rect">
+            <a:avLst/>
+          </a:prstGeom>
+        </p:spPr>
+        <p:txBody>
+          <a:bodyPr anchor="t" rtlCol="false"/>
+          <a:lstStyle/>
+          <a:p>
+            <a:pPr algn="l">
+              <a:defRPr/>
+            </a:pPr>
+            <a:r>
+              <a:rPr lang="ru-RU"/>
+              <a:t/>
+            </a:r>
+            <a:endParaRPr lang="en-US" sz="1100"/>
+          </a:p>
+          <a:p/>
+          <a:p>
+            <a:r>
+              <a:rPr lang="en-US" sz="1400" b="true">
+                <a:latin typeface="Calibri"/>
+              </a:rPr>
+              <a:t>Current Project Details</a:t>
+            </a:r>
+          </a:p>
+          <a:p>
+            <a:r>
+              <a:rPr lang="en-US" sz="1400">
+                <a:latin typeface="Calibri"/>
+              </a:rPr>
+              <a:t>\n" + "1PowerPoint documents are made up of a tree of records. A record may contain either other records (in which case it is a Container), or data (in which case it's an Atom). A record can't hold both. PowerPoint documents don't have one overall container record. Instead, there are a number of different container records to be found at the top level. Any numbers or strings stored in the records are always stored in Little Endian format (least important bytes first). This is the case no matter what platform the file was written on - be that a Little Endian or a Big Endian system. PowerPoint may have Escher (DDF) records embedded in it. These are always held as the children of a PPDrawing record (record type 1036). Escher records have the same format as PowerPoint records. Hello mate! Hello mate! Hello mate! Hello mate! Hello mate! Hello mate! Hello mate! Hello mate! Hello mate! This is bold and underscore and both and not true false PowerPoint documents are made up of a tree of records. A record may contain either other records (in which case it is a Container), or data (in which case it's an Atom). A record can't hold both. PowerPoint documents don't have one overall container record. Instead, there are a number of different container records to be found at the top level. Any numbers or strings stored in the records are always stored in Little Endian format (least important bytes first). This is the case no matter what platform the file was written on - be that a Little Endian or a Big Endian system. PowerPoint may have Escher (DDF) records embedded in it. These are always held as the children of a PPDrawing record (record type 1036). Escher records have the same format as PowerPoint records. A record may contain either other records (in which case it is a Container), or data (in which case it's an Atom). A record can't hold both. PowerPoint documents don't have one overall container record PowerPoint documents are made up of a tree of records. A record may contain either other records (in which case it is a Container), or data (in which case it's an Atom). A record can't hold both. PowerPoint documents don't have one overall container record. Instead, there are a number of different container records to be found at the top level. Any numbers or strings stored in the records are always stored in Little Endian format (least important bytes first). This is the case no matter what platform the file was written on - be that a Little Endian or a Big Endian system. PowerPoint may have Escher (DDF) records embedded in it. These are always held as the children of a PPDrawing record (record type 1036). Escher records have the same format as PowerPoint records. Hello mate! Hello mate! Hello mate! Hello mate! Hello mate! Hello mate! Hello mate! Hello mate! Hello mate! This is bold and underscore and both and not true false PowerPoint documents are made up of a tree of records. A record may contain either other records (in which case it is a Container), or data (in which case it's an Atom). A record can't hold both. PowerPoint documents don't have one overall container record. Instead, there are a number of different container records to be found at the top level. Any numbers or strings stored in the records are always stored in Little Endian format (least important bytes first). This is the case no matter what platform the file was written on - be that a Little Endian or a Big Endian system. PowerPoint may have Escher (DDF) records embedded in it. These are always held as the children of a PPDrawing record (record type 1036). Escher records have the same format as PowerPoint records. Hello mate! Hello mate! Hello mate! Hello mate! Hello mate! Hello mate! Hello mate! Hello mate! Hello mate! This is bold and underscore and both and not true false PowerPoint documents are made up of a tree of records. A record may contain either other records (in which case it is a Container), or data (in which case it's an Atom). A record can't hold both. PowerPoint documents don't have one overall container record documents don't have one overall container record. Instead, there are a number of different container records to be found at the top level. Any numbers or strings stored in the records are always stored in Little Endian format (least important bytes first). This is the case no matter what platform the file was written on - be that a Little Endian or a Big Endian system. PowerPoint may have Escher (DDF) records embedded in it. These are always held as the children of a PPDrawing record (record type 1036). " + "</a:t>
+            </a:r>
+            <a:r>
+              <a:rPr lang="en-US" sz="1400">
+                <a:solidFill>
+                  <a:srgbClr val="FF0000"/>
+                </a:solidFill>
+                <a:latin typeface="Calibri"/>
+              </a:rPr>
+              <a:t>2Escher records have the same format as PowerPoint records. Hello mate! Hello mate! Hello mate! Hello mate! Hello mate! Hello mate! Hello mate! Hello mate! Hello mate! This is bold and underscore and both and not true false PowerPoint documents are made up of a tree of records. A record may contain either other records (in which case it is a Container), or data (in which case it's an Atom). A record can't hold both. PowerPoint documents don't have one overall container record. Instead, there are a number of different container records to be found at the top level. Any numbers or strings stored in the records are always stored in Little Endian format (least important bytes first). This is the case no matter what platform the file was written on - be that a Little Endian or a Big Endian system. PowerPoint may have Escher (DDF) records embedded in it. These are always held as the children of a PPDrawing record (record type 1036). Escher records have the same format as PowerPoint records. Hello mate! Hello mate! Hello mate! Hello mate! Hello mate! Hello mate! Hello mate! Hello mate! Hello mate! This is bold and underscore and both and not true false PowerPoint documents are made up of a tree of records. A record may contain either other records (in which case it is a Container), or data (in which case it's an Atom). A record can't hold both. PowerPoint documents don't have one overall container record\n</a:t>
+            </a:r>
+            <a:r>
+              <a:rPr lang="en-US" sz="1400">
+                <a:latin typeface="Calibri"/>
+              </a:rPr>
+              <a:t>" + "</a:t>
+            </a:r>
+          </a:p>
+        </p:txBody>
+      </p:sp>
+    </p:spTree>
+  </p:cSld>
+  <p:clrMapOvr>
+    <a:masterClrMapping/>
+  </p:clrMapOvr>
+</p:sld>
+</file>
+
+<file path=ppt/slides/slide7.xml><?xml version="1.0" encoding="utf-8"?>
+<p:sld xmlns:p="http://schemas.openxmlformats.org/presentationml/2006/main" xmlns:a="http://schemas.openxmlformats.org/drawingml/2006/main" xmlns:r="http://schemas.openxmlformats.org/officeDocument/2006/relationships">
+  <p:cSld>
+    <p:spTree>
+      <p:nvGrpSpPr>
+        <p:cNvPr id="1" name=""/>
+        <p:cNvGrpSpPr/>
+        <p:nvPr/>
+      </p:nvGrpSpPr>
+      <p:grpSpPr>
+        <a:xfrm>
+          <a:off x="0" y="0"/>
+          <a:ext cx="0" cy="0"/>
+          <a:chOff x="0" y="0"/>
+          <a:chExt cx="0" cy="0"/>
+        </a:xfrm>
+      </p:grpSpPr>
+      <p:sp>
+        <p:nvSpPr>
+          <p:cNvPr name="TextBox 2" id="2"/>
+          <p:cNvSpPr txBox="true"/>
+          <p:nvPr/>
+        </p:nvSpPr>
+        <p:spPr>
+          <a:xfrm>
+            <a:off x="254000" y="254000"/>
+            <a:ext cx="6350000" cy="762000"/>
+          </a:xfrm>
+          <a:prstGeom prst="rect">
+            <a:avLst/>
+          </a:prstGeom>
+        </p:spPr>
+        <p:txBody>
+          <a:bodyPr anchor="t" rtlCol="false"/>
+          <a:lstStyle/>
+          <a:p>
+            <a:pPr algn="l">
+              <a:defRPr/>
+            </a:pPr>
+            <a:r>
+              <a:rPr lang="ru-RU"/>
+              <a:t/>
+            </a:r>
+            <a:r>
+              <a:rPr lang="en-US" sz="1400" b="true">
+                <a:latin typeface="Calibri"/>
+              </a:rPr>
+              <a:t>Project name: </a:t>
+            </a:r>
+            <a:r>
+              <a:rPr lang="en-US" sz="1400">
+                <a:latin typeface="Calibri"/>
+                <a:hlinkClick r:id="rId2" tooltip="http://ya.ru"/>
+              </a:rPr>
+              <a:t>Project from Facade</a:t>
+            </a:r>
+            <a:br>
+              <a:rPr lang="en-US" sz="1400">
+                <a:latin typeface="Calibri"/>
+              </a:rPr>
+            </a:br>
+            <a:r>
+              <a:rPr lang="en-US" sz="1400" b="true">
+                <a:latin typeface="Calibri"/>
+              </a:rPr>
+              <a:t>Project manager: </a:t>
+            </a:r>
+            <a:r>
+              <a:rPr lang="en-US" sz="1400">
+                <a:latin typeface="Calibri"/>
+              </a:rPr>
+              <a:t>IKSANOV Aleksandr</a:t>
+            </a:r>
+            <a:br>
+              <a:rPr lang="en-US" sz="1400">
+                <a:latin typeface="Calibri"/>
+              </a:rPr>
+            </a:br>
+            <a:r>
+              <a:rPr lang="en-US" sz="1400" b="true">
+                <a:latin typeface="Calibri"/>
+              </a:rPr>
+              <a:t>Last Updated: </a:t>
+            </a:r>
+            <a:r>
+              <a:rPr lang="en-US" sz="1400">
+                <a:latin typeface="Calibri"/>
+              </a:rPr>
+              <a:t>20-Apr-20</a:t>
+            </a:r>
+            <a:endParaRPr lang="en-US" sz="1100"/>
+          </a:p>
+        </p:txBody>
+      </p:sp>
+      <p:sp>
+        <p:nvSpPr>
+          <p:cNvPr name="TextBox 3" id="3"/>
+          <p:cNvSpPr txBox="true"/>
+          <p:nvPr/>
+        </p:nvSpPr>
+        <p:spPr>
+          <a:xfrm>
+            <a:off x="254000" y="1244600"/>
+            <a:ext cx="15748000" cy="215900"/>
+          </a:xfrm>
+          <a:prstGeom prst="rect">
+            <a:avLst/>
+          </a:prstGeom>
+        </p:spPr>
+        <p:txBody>
+          <a:bodyPr anchor="t" rtlCol="false"/>
+          <a:lstStyle/>
+          <a:p>
+            <a:pPr algn="l">
+              <a:defRPr/>
+            </a:pPr>
+            <a:r>
+              <a:rPr lang="ru-RU"/>
+              <a:t/>
+            </a:r>
+            <a:r>
+              <a:rPr lang="en-US" sz="1400" b="true">
+                <a:latin typeface="Calibri"/>
+              </a:rPr>
+              <a:t>Other Information</a:t>
+            </a:r>
+            <a:endParaRPr lang="en-US" sz="1100"/>
+          </a:p>
+        </p:txBody>
+      </p:sp>
+      <p:sp>
+        <p:nvSpPr>
+          <p:cNvPr name="AutoShape 4" id="4"/>
+          <p:cNvSpPr/>
+          <p:nvPr/>
+        </p:nvSpPr>
+        <p:spPr>
+          <a:xfrm>
+            <a:off x="254000" y="1562100"/>
+            <a:ext cx="15748000" cy="12700"/>
+          </a:xfrm>
+          <a:prstGeom prst="line">
+            <a:avLst/>
+          </a:prstGeom>
+          <a:ln>
+            <a:solidFill>
+              <a:srgbClr val="000000"/>
+            </a:solidFill>
+          </a:ln>
+        </p:spPr>
+      </p:sp>
+      <p:sp>
+        <p:nvSpPr>
+          <p:cNvPr name="TextBox 5" id="5"/>
+          <p:cNvSpPr txBox="true"/>
+          <p:nvPr/>
+        </p:nvSpPr>
+        <p:spPr>
+          <a:xfrm>
+            <a:off x="254000" y="1562100"/>
+            <a:ext cx="15748000" cy="7327900"/>
+          </a:xfrm>
+          <a:prstGeom prst="rect">
+            <a:avLst/>
+          </a:prstGeom>
+        </p:spPr>
+        <p:txBody>
+          <a:bodyPr anchor="t" rtlCol="false"/>
+          <a:lstStyle/>
+          <a:p>
+            <a:pPr algn="l">
+              <a:defRPr/>
+            </a:pPr>
+            <a:r>
+              <a:rPr lang="ru-RU"/>
+              <a:t/>
+            </a:r>
+            <a:r>
+              <a:rPr lang="en-US" sz="1400">
+                <a:solidFill>
+                  <a:srgbClr val="00FF00"/>
+                </a:solidFill>
+                <a:latin typeface="Calibri"/>
+              </a:rPr>
+              <a:t>3Escher records have the same format as PowerPoint records. Hello mate! Hello mate! Hello mate! Hello mate! Hello mate! Hello mate! Hello mate! Hello mate! Hello mate! This is bold and underscore and both and not true false PowerPoint documents are made up of a tree of records. A record may contain either other records (in which case it is a Container), or data (in which case it's an Atom). A record can't hold both. PowerPoint documents don't have one overall container record. Instead, there are a number of different container records to be found at the top level. Any numbers or strings stored in the records are always stored in Little Endian format (least important bytes first). This is the case no matter what platform the file was written on - be that a Little Endian or a Big Endian system. PowerPoint may have Escher (DDF) records embedded in it. These are always held as the children of a PPDrawing record (record type 1036). Escher records have the same format as PowerPoint records. Hello mate! Hello mate! Hello mate! Hello mate! Hello mate! Hello mate! Hello mate! Hello mate! Hello mate! This is bold and underscore and both and not true false PowerPoint documents are made up of a tree of records. A record may contain either other records (in which case it is a Container), or data (in which case it's an Atom). A record can't hold both. PowerPoint documents don't have one overall container record\n</a:t>
+            </a:r>
+            <a:r>
+              <a:rPr lang="en-US" sz="1400">
+                <a:latin typeface="Calibri"/>
+              </a:rPr>
+              <a:t>" + "</a:t>
+            </a:r>
+            <a:r>
+              <a:rPr lang="en-US" sz="1400">
+                <a:solidFill>
+                  <a:srgbClr val="0000FF"/>
+                </a:solidFill>
+                <a:latin typeface="Calibri"/>
+              </a:rPr>
+              <a:t>4Escher records have the same format as PowerPoint records. Hello mate! Hello mate! Hello mate! Hello mate! Hello mate! Hello mate! Hello mate! Hello mate! Hello mate! This is bold and underscore and both and not true false PowerPoint documents are made up of a tree of records. A record may contain either other records (in which case it is a Container), or data (in which case it's an Atom). A record can't hold both. PowerPoint documents don't have one overall container record. Instead, there are a number of different container records to be found at the top level. Any numbers or strings stored in the records are always stored in Little Endian format (least important bytes first). This is the case no matter what platform the file was written on - be that a Little Endian or a Big Endian system. PowerPoint may have Escher (DDF) records embedded in it. These are always held as the children of a PPDrawing record (record type 1036). Escher records have the same format as PowerPoint records. Hello mate! Hello mate! Hello mate! Hello mate! Hello mate! Hello mate! Hello mate! Hello mate! Hello mate! This is bold and underscore and both and not true false PowerPoint documents are made up of a tree of records. A record may contain either other records (in which case it is a Container), or data (in which case it's an Atom). A record can't hold both. PowerPoint documents don't have one overall container record\n</a:t>
+            </a:r>
+            <a:r>
+              <a:rPr lang="en-US" sz="1400">
+                <a:latin typeface="Calibri"/>
+              </a:rPr>
+              <a:t>" + "</a:t>
+            </a:r>
+            <a:endParaRPr lang="en-US" sz="1100"/>
+          </a:p>
+          <a:p/>
         </p:txBody>
       </p:sp>
     </p:spTree>

</xml_diff>

<commit_message>
tests added + refactor
</commit_message>
<xml_diff>
--- a/html-to-ppt/createExecReviewPpt.pptx
+++ b/html-to-ppt/createExecReviewPpt.pptx
@@ -3136,7 +3136,7 @@
               <a:rPr lang="en-US" sz="1400">
                 <a:latin typeface="Calibri"/>
               </a:rPr>
-              <a:t>20-Apr-20</a:t>
+              <a:t>21-Apr-20</a:t>
             </a:r>
             <a:endParaRPr lang="en-US" sz="1100"/>
           </a:p>
@@ -6741,7 +6741,7 @@
               <a:rPr lang="en-US" sz="1400">
                 <a:latin typeface="Calibri"/>
               </a:rPr>
-              <a:t>20-Apr-20</a:t>
+              <a:t>21-Apr-20</a:t>
             </a:r>
             <a:endParaRPr lang="en-US" sz="1100"/>
           </a:p>
@@ -6995,7 +6995,7 @@
               <a:rPr lang="en-US" sz="1400">
                 <a:latin typeface="Calibri"/>
               </a:rPr>
-              <a:t>20-Apr-20</a:t>
+              <a:t>21-Apr-20</a:t>
             </a:r>
             <a:endParaRPr lang="en-US" sz="1100"/>
           </a:p>
@@ -7237,7 +7237,7 @@
               <a:rPr lang="en-US" sz="1400">
                 <a:latin typeface="Calibri"/>
               </a:rPr>
-              <a:t>20-Apr-20</a:t>
+              <a:t>21-Apr-20</a:t>
             </a:r>
             <a:endParaRPr lang="en-US" sz="1100"/>
           </a:p>
@@ -7786,7 +7786,7 @@
               <a:rPr lang="en-US" sz="1400">
                 <a:latin typeface="Calibri"/>
               </a:rPr>
-              <a:t>20-Apr-20</a:t>
+              <a:t>21-Apr-20</a:t>
             </a:r>
             <a:endParaRPr lang="en-US" sz="1100"/>
           </a:p>
@@ -8335,7 +8335,7 @@
               <a:rPr lang="en-US" sz="1400">
                 <a:latin typeface="Calibri"/>
               </a:rPr>
-              <a:t>20-Apr-20</a:t>
+              <a:t>21-Apr-20</a:t>
             </a:r>
             <a:endParaRPr lang="en-US" sz="1100"/>
           </a:p>
@@ -8556,7 +8556,7 @@
               <a:rPr lang="en-US" sz="1400">
                 <a:latin typeface="Calibri"/>
               </a:rPr>
-              <a:t>20-Apr-20</a:t>
+              <a:t>21-Apr-20</a:t>
             </a:r>
             <a:endParaRPr lang="en-US" sz="1100"/>
           </a:p>

</xml_diff>

<commit_message>
refactor + new function + new test
</commit_message>
<xml_diff>
--- a/html-to-ppt/createExecReviewPpt.pptx
+++ b/html-to-ppt/createExecReviewPpt.pptx
@@ -3136,7 +3136,7 @@
               <a:rPr lang="en-US" sz="1400">
                 <a:latin typeface="Calibri"/>
               </a:rPr>
-              <a:t>21-Apr-20</a:t>
+              <a:t>23-Apr-20</a:t>
             </a:r>
             <a:endParaRPr lang="en-US" sz="1100"/>
           </a:p>
@@ -6741,7 +6741,7 @@
               <a:rPr lang="en-US" sz="1400">
                 <a:latin typeface="Calibri"/>
               </a:rPr>
-              <a:t>21-Apr-20</a:t>
+              <a:t>23-Apr-20</a:t>
             </a:r>
             <a:endParaRPr lang="en-US" sz="1100"/>
           </a:p>
@@ -6995,7 +6995,7 @@
               <a:rPr lang="en-US" sz="1400">
                 <a:latin typeface="Calibri"/>
               </a:rPr>
-              <a:t>21-Apr-20</a:t>
+              <a:t>23-Apr-20</a:t>
             </a:r>
             <a:endParaRPr lang="en-US" sz="1100"/>
           </a:p>
@@ -7237,7 +7237,7 @@
               <a:rPr lang="en-US" sz="1400">
                 <a:latin typeface="Calibri"/>
               </a:rPr>
-              <a:t>21-Apr-20</a:t>
+              <a:t>23-Apr-20</a:t>
             </a:r>
             <a:endParaRPr lang="en-US" sz="1100"/>
           </a:p>
@@ -7786,7 +7786,7 @@
               <a:rPr lang="en-US" sz="1400">
                 <a:latin typeface="Calibri"/>
               </a:rPr>
-              <a:t>21-Apr-20</a:t>
+              <a:t>23-Apr-20</a:t>
             </a:r>
             <a:endParaRPr lang="en-US" sz="1100"/>
           </a:p>
@@ -8335,7 +8335,7 @@
               <a:rPr lang="en-US" sz="1400">
                 <a:latin typeface="Calibri"/>
               </a:rPr>
-              <a:t>21-Apr-20</a:t>
+              <a:t>23-Apr-20</a:t>
             </a:r>
             <a:endParaRPr lang="en-US" sz="1100"/>
           </a:p>
@@ -8556,7 +8556,7 @@
               <a:rPr lang="en-US" sz="1400">
                 <a:latin typeface="Calibri"/>
               </a:rPr>
-              <a:t>21-Apr-20</a:t>
+              <a:t>23-Apr-20</a:t>
             </a:r>
             <a:endParaRPr lang="en-US" sz="1100"/>
           </a:p>

</xml_diff>

<commit_message>
bugfix: timeline indicator`s position wrong if all dates passed
</commit_message>
<xml_diff>
--- a/html-to-ppt/createExecReviewPpt.pptx
+++ b/html-to-ppt/createExecReviewPpt.pptx
@@ -3136,7 +3136,7 @@
               <a:rPr lang="en-US" sz="1400">
                 <a:latin typeface="Calibri"/>
               </a:rPr>
-              <a:t>23-Apr-20</a:t>
+              <a:t>27-Apr-20</a:t>
             </a:r>
             <a:endParaRPr lang="en-US" sz="1100"/>
           </a:p>
@@ -5072,7 +5072,7 @@
         </p:nvSpPr>
         <p:spPr>
           <a:xfrm>
-            <a:off x="8890000" y="2438400"/>
+            <a:off x="15011400" y="2438400"/>
             <a:ext cx="203200" cy="406400"/>
           </a:xfrm>
           <a:prstGeom prst="roundRect">
@@ -6741,7 +6741,7 @@
               <a:rPr lang="en-US" sz="1400">
                 <a:latin typeface="Calibri"/>
               </a:rPr>
-              <a:t>23-Apr-20</a:t>
+              <a:t>27-Apr-20</a:t>
             </a:r>
             <a:endParaRPr lang="en-US" sz="1100"/>
           </a:p>
@@ -6995,7 +6995,7 @@
               <a:rPr lang="en-US" sz="1400">
                 <a:latin typeface="Calibri"/>
               </a:rPr>
-              <a:t>23-Apr-20</a:t>
+              <a:t>27-Apr-20</a:t>
             </a:r>
             <a:endParaRPr lang="en-US" sz="1100"/>
           </a:p>
@@ -7237,7 +7237,7 @@
               <a:rPr lang="en-US" sz="1400">
                 <a:latin typeface="Calibri"/>
               </a:rPr>
-              <a:t>23-Apr-20</a:t>
+              <a:t>27-Apr-20</a:t>
             </a:r>
             <a:endParaRPr lang="en-US" sz="1100"/>
           </a:p>
@@ -7786,7 +7786,7 @@
               <a:rPr lang="en-US" sz="1400">
                 <a:latin typeface="Calibri"/>
               </a:rPr>
-              <a:t>23-Apr-20</a:t>
+              <a:t>27-Apr-20</a:t>
             </a:r>
             <a:endParaRPr lang="en-US" sz="1100"/>
           </a:p>
@@ -8335,7 +8335,7 @@
               <a:rPr lang="en-US" sz="1400">
                 <a:latin typeface="Calibri"/>
               </a:rPr>
-              <a:t>23-Apr-20</a:t>
+              <a:t>27-Apr-20</a:t>
             </a:r>
             <a:endParaRPr lang="en-US" sz="1100"/>
           </a:p>
@@ -8556,7 +8556,7 @@
               <a:rPr lang="en-US" sz="1400">
                 <a:latin typeface="Calibri"/>
               </a:rPr>
-              <a:t>23-Apr-20</a:t>
+              <a:t>27-Apr-20</a:t>
             </a:r>
             <a:endParaRPr lang="en-US" sz="1100"/>
           </a:p>

</xml_diff>

<commit_message>
capability to render images in ppt
</commit_message>
<xml_diff>
--- a/html-to-ppt/createExecReviewPpt.pptx
+++ b/html-to-ppt/createExecReviewPpt.pptx
@@ -12,6 +12,11 @@
     <p:sldId id="260" r:id="rId10"/>
     <p:sldId id="261" r:id="rId11"/>
     <p:sldId id="262" r:id="rId12"/>
+    <p:sldId id="263" r:id="rId13"/>
+    <p:sldId id="264" r:id="rId14"/>
+    <p:sldId id="265" r:id="rId15"/>
+    <p:sldId id="266" r:id="rId16"/>
+    <p:sldId id="267" r:id="rId17"/>
   </p:sldIdLst>
   <p:sldSz cx="16256000" cy="9144000"/>
   <p:notesSz cx="6858000" cy="9144000"/>
@@ -3136,7 +3141,7 @@
               <a:rPr lang="en-US" sz="1400">
                 <a:latin typeface="Calibri"/>
               </a:rPr>
-              <a:t>27-Apr-20</a:t>
+              <a:t>01-Jun-20</a:t>
             </a:r>
             <a:endParaRPr lang="en-US" sz="1100"/>
           </a:p>
@@ -6653,6 +6658,384 @@
 </p:sld>
 </file>
 
+<file path=ppt/slides/slide10.xml><?xml version="1.0" encoding="utf-8"?>
+<p:sld xmlns:p="http://schemas.openxmlformats.org/presentationml/2006/main" xmlns:a="http://schemas.openxmlformats.org/drawingml/2006/main" xmlns:r="http://schemas.openxmlformats.org/officeDocument/2006/relationships">
+  <p:cSld>
+    <p:spTree>
+      <p:nvGrpSpPr>
+        <p:cNvPr id="1" name=""/>
+        <p:cNvGrpSpPr/>
+        <p:nvPr/>
+      </p:nvGrpSpPr>
+      <p:grpSpPr>
+        <a:xfrm>
+          <a:off x="0" y="0"/>
+          <a:ext cx="0" cy="0"/>
+          <a:chOff x="0" y="0"/>
+          <a:chExt cx="0" cy="0"/>
+        </a:xfrm>
+      </p:grpSpPr>
+      <p:sp>
+        <p:nvSpPr>
+          <p:cNvPr name="TextBox 2" id="2"/>
+          <p:cNvSpPr txBox="true"/>
+          <p:nvPr/>
+        </p:nvSpPr>
+        <p:spPr>
+          <a:xfrm>
+            <a:off x="254000" y="254000"/>
+            <a:ext cx="6350000" cy="762000"/>
+          </a:xfrm>
+          <a:prstGeom prst="rect">
+            <a:avLst/>
+          </a:prstGeom>
+        </p:spPr>
+        <p:txBody>
+          <a:bodyPr anchor="t" rtlCol="false"/>
+          <a:lstStyle/>
+          <a:p>
+            <a:pPr algn="l">
+              <a:defRPr/>
+            </a:pPr>
+            <a:r>
+              <a:rPr lang="ru-RU"/>
+              <a:t/>
+            </a:r>
+            <a:r>
+              <a:rPr lang="en-US" sz="1400" b="true">
+                <a:latin typeface="Calibri"/>
+              </a:rPr>
+              <a:t>Project name: </a:t>
+            </a:r>
+            <a:r>
+              <a:rPr lang="en-US" sz="1400">
+                <a:latin typeface="Calibri"/>
+                <a:hlinkClick r:id="rId2" tooltip="http://ya.ru"/>
+              </a:rPr>
+              <a:t>Project from Facade</a:t>
+            </a:r>
+            <a:br>
+              <a:rPr lang="en-US" sz="1400">
+                <a:latin typeface="Calibri"/>
+              </a:rPr>
+            </a:br>
+            <a:r>
+              <a:rPr lang="en-US" sz="1400" b="true">
+                <a:latin typeface="Calibri"/>
+              </a:rPr>
+              <a:t>Project manager: </a:t>
+            </a:r>
+            <a:r>
+              <a:rPr lang="en-US" sz="1400">
+                <a:latin typeface="Calibri"/>
+              </a:rPr>
+              <a:t>IKSANOV Aleksandr</a:t>
+            </a:r>
+            <a:br>
+              <a:rPr lang="en-US" sz="1400">
+                <a:latin typeface="Calibri"/>
+              </a:rPr>
+            </a:br>
+            <a:r>
+              <a:rPr lang="en-US" sz="1400" b="true">
+                <a:latin typeface="Calibri"/>
+              </a:rPr>
+              <a:t>Last Updated: </a:t>
+            </a:r>
+            <a:r>
+              <a:rPr lang="en-US" sz="1400">
+                <a:latin typeface="Calibri"/>
+              </a:rPr>
+              <a:t>01-Jun-20</a:t>
+            </a:r>
+            <a:endParaRPr lang="en-US" sz="1100"/>
+          </a:p>
+        </p:txBody>
+      </p:sp>
+      <p:pic>
+        <p:nvPicPr>
+          <p:cNvPr name="Picture 3" id="3"/>
+          <p:cNvPicPr>
+            <a:picLocks noChangeAspect="true"/>
+          </p:cNvPicPr>
+          <p:nvPr/>
+        </p:nvPicPr>
+        <p:blipFill>
+          <a:blip r:embed="rId3"/>
+          <a:stretch>
+            <a:fillRect/>
+          </a:stretch>
+        </p:blipFill>
+        <p:spPr>
+          <a:xfrm>
+            <a:off x="254000" y="1498600"/>
+            <a:ext cx="15748000" cy="7391400"/>
+          </a:xfrm>
+          <a:prstGeom prst="rect">
+            <a:avLst/>
+          </a:prstGeom>
+        </p:spPr>
+      </p:pic>
+    </p:spTree>
+  </p:cSld>
+  <p:clrMapOvr>
+    <a:masterClrMapping/>
+  </p:clrMapOvr>
+</p:sld>
+</file>
+
+<file path=ppt/slides/slide11.xml><?xml version="1.0" encoding="utf-8"?>
+<p:sld xmlns:p="http://schemas.openxmlformats.org/presentationml/2006/main" xmlns:a="http://schemas.openxmlformats.org/drawingml/2006/main" xmlns:r="http://schemas.openxmlformats.org/officeDocument/2006/relationships">
+  <p:cSld>
+    <p:spTree>
+      <p:nvGrpSpPr>
+        <p:cNvPr id="1" name=""/>
+        <p:cNvGrpSpPr/>
+        <p:nvPr/>
+      </p:nvGrpSpPr>
+      <p:grpSpPr>
+        <a:xfrm>
+          <a:off x="0" y="0"/>
+          <a:ext cx="0" cy="0"/>
+          <a:chOff x="0" y="0"/>
+          <a:chExt cx="0" cy="0"/>
+        </a:xfrm>
+      </p:grpSpPr>
+      <p:sp>
+        <p:nvSpPr>
+          <p:cNvPr name="TextBox 2" id="2"/>
+          <p:cNvSpPr txBox="true"/>
+          <p:nvPr/>
+        </p:nvSpPr>
+        <p:spPr>
+          <a:xfrm>
+            <a:off x="254000" y="254000"/>
+            <a:ext cx="6350000" cy="762000"/>
+          </a:xfrm>
+          <a:prstGeom prst="rect">
+            <a:avLst/>
+          </a:prstGeom>
+        </p:spPr>
+        <p:txBody>
+          <a:bodyPr anchor="t" rtlCol="false"/>
+          <a:lstStyle/>
+          <a:p>
+            <a:pPr algn="l">
+              <a:defRPr/>
+            </a:pPr>
+            <a:r>
+              <a:rPr lang="ru-RU"/>
+              <a:t/>
+            </a:r>
+            <a:r>
+              <a:rPr lang="en-US" sz="1400" b="true">
+                <a:latin typeface="Calibri"/>
+              </a:rPr>
+              <a:t>Project name: </a:t>
+            </a:r>
+            <a:r>
+              <a:rPr lang="en-US" sz="1400">
+                <a:latin typeface="Calibri"/>
+                <a:hlinkClick r:id="rId2" tooltip="http://ya.ru"/>
+              </a:rPr>
+              <a:t>Project from Facade</a:t>
+            </a:r>
+            <a:br>
+              <a:rPr lang="en-US" sz="1400">
+                <a:latin typeface="Calibri"/>
+              </a:rPr>
+            </a:br>
+            <a:r>
+              <a:rPr lang="en-US" sz="1400" b="true">
+                <a:latin typeface="Calibri"/>
+              </a:rPr>
+              <a:t>Project manager: </a:t>
+            </a:r>
+            <a:r>
+              <a:rPr lang="en-US" sz="1400">
+                <a:latin typeface="Calibri"/>
+              </a:rPr>
+              <a:t>IKSANOV Aleksandr</a:t>
+            </a:r>
+            <a:br>
+              <a:rPr lang="en-US" sz="1400">
+                <a:latin typeface="Calibri"/>
+              </a:rPr>
+            </a:br>
+            <a:r>
+              <a:rPr lang="en-US" sz="1400" b="true">
+                <a:latin typeface="Calibri"/>
+              </a:rPr>
+              <a:t>Last Updated: </a:t>
+            </a:r>
+            <a:r>
+              <a:rPr lang="en-US" sz="1400">
+                <a:latin typeface="Calibri"/>
+              </a:rPr>
+              <a:t>01-Jun-20</a:t>
+            </a:r>
+            <a:endParaRPr lang="en-US" sz="1100"/>
+          </a:p>
+        </p:txBody>
+      </p:sp>
+      <p:pic>
+        <p:nvPicPr>
+          <p:cNvPr name="Picture 3" id="3"/>
+          <p:cNvPicPr>
+            <a:picLocks noChangeAspect="true"/>
+          </p:cNvPicPr>
+          <p:nvPr/>
+        </p:nvPicPr>
+        <p:blipFill>
+          <a:blip r:embed="rId3"/>
+          <a:stretch>
+            <a:fillRect/>
+          </a:stretch>
+        </p:blipFill>
+        <p:spPr>
+          <a:xfrm>
+            <a:off x="254000" y="1498600"/>
+            <a:ext cx="15748000" cy="7391400"/>
+          </a:xfrm>
+          <a:prstGeom prst="rect">
+            <a:avLst/>
+          </a:prstGeom>
+        </p:spPr>
+      </p:pic>
+    </p:spTree>
+  </p:cSld>
+  <p:clrMapOvr>
+    <a:masterClrMapping/>
+  </p:clrMapOvr>
+</p:sld>
+</file>
+
+<file path=ppt/slides/slide12.xml><?xml version="1.0" encoding="utf-8"?>
+<p:sld xmlns:p="http://schemas.openxmlformats.org/presentationml/2006/main" xmlns:a="http://schemas.openxmlformats.org/drawingml/2006/main" xmlns:r="http://schemas.openxmlformats.org/officeDocument/2006/relationships">
+  <p:cSld>
+    <p:spTree>
+      <p:nvGrpSpPr>
+        <p:cNvPr id="1" name=""/>
+        <p:cNvGrpSpPr/>
+        <p:nvPr/>
+      </p:nvGrpSpPr>
+      <p:grpSpPr>
+        <a:xfrm>
+          <a:off x="0" y="0"/>
+          <a:ext cx="0" cy="0"/>
+          <a:chOff x="0" y="0"/>
+          <a:chExt cx="0" cy="0"/>
+        </a:xfrm>
+      </p:grpSpPr>
+      <p:sp>
+        <p:nvSpPr>
+          <p:cNvPr name="TextBox 2" id="2"/>
+          <p:cNvSpPr txBox="true"/>
+          <p:nvPr/>
+        </p:nvSpPr>
+        <p:spPr>
+          <a:xfrm>
+            <a:off x="254000" y="254000"/>
+            <a:ext cx="6350000" cy="762000"/>
+          </a:xfrm>
+          <a:prstGeom prst="rect">
+            <a:avLst/>
+          </a:prstGeom>
+        </p:spPr>
+        <p:txBody>
+          <a:bodyPr anchor="t" rtlCol="false"/>
+          <a:lstStyle/>
+          <a:p>
+            <a:pPr algn="l">
+              <a:defRPr/>
+            </a:pPr>
+            <a:r>
+              <a:rPr lang="ru-RU"/>
+              <a:t/>
+            </a:r>
+            <a:r>
+              <a:rPr lang="en-US" sz="1400" b="true">
+                <a:latin typeface="Calibri"/>
+              </a:rPr>
+              <a:t>Project name: </a:t>
+            </a:r>
+            <a:r>
+              <a:rPr lang="en-US" sz="1400">
+                <a:latin typeface="Calibri"/>
+                <a:hlinkClick r:id="rId2" tooltip="http://ya.ru"/>
+              </a:rPr>
+              <a:t>Project from Facade</a:t>
+            </a:r>
+            <a:br>
+              <a:rPr lang="en-US" sz="1400">
+                <a:latin typeface="Calibri"/>
+              </a:rPr>
+            </a:br>
+            <a:r>
+              <a:rPr lang="en-US" sz="1400" b="true">
+                <a:latin typeface="Calibri"/>
+              </a:rPr>
+              <a:t>Project manager: </a:t>
+            </a:r>
+            <a:r>
+              <a:rPr lang="en-US" sz="1400">
+                <a:latin typeface="Calibri"/>
+              </a:rPr>
+              <a:t>IKSANOV Aleksandr</a:t>
+            </a:r>
+            <a:br>
+              <a:rPr lang="en-US" sz="1400">
+                <a:latin typeface="Calibri"/>
+              </a:rPr>
+            </a:br>
+            <a:r>
+              <a:rPr lang="en-US" sz="1400" b="true">
+                <a:latin typeface="Calibri"/>
+              </a:rPr>
+              <a:t>Last Updated: </a:t>
+            </a:r>
+            <a:r>
+              <a:rPr lang="en-US" sz="1400">
+                <a:latin typeface="Calibri"/>
+              </a:rPr>
+              <a:t>01-Jun-20</a:t>
+            </a:r>
+            <a:endParaRPr lang="en-US" sz="1100"/>
+          </a:p>
+        </p:txBody>
+      </p:sp>
+      <p:pic>
+        <p:nvPicPr>
+          <p:cNvPr name="Picture 3" id="3"/>
+          <p:cNvPicPr>
+            <a:picLocks noChangeAspect="true"/>
+          </p:cNvPicPr>
+          <p:nvPr/>
+        </p:nvPicPr>
+        <p:blipFill>
+          <a:blip r:embed="rId3"/>
+          <a:stretch>
+            <a:fillRect/>
+          </a:stretch>
+        </p:blipFill>
+        <p:spPr>
+          <a:xfrm>
+            <a:off x="254000" y="1498600"/>
+            <a:ext cx="15748000" cy="7391400"/>
+          </a:xfrm>
+          <a:prstGeom prst="rect">
+            <a:avLst/>
+          </a:prstGeom>
+        </p:spPr>
+      </p:pic>
+    </p:spTree>
+  </p:cSld>
+  <p:clrMapOvr>
+    <a:masterClrMapping/>
+  </p:clrMapOvr>
+</p:sld>
+</file>
+
 <file path=ppt/slides/slide2.xml><?xml version="1.0" encoding="utf-8"?>
 <p:sld xmlns:p="http://schemas.openxmlformats.org/presentationml/2006/main" xmlns:a="http://schemas.openxmlformats.org/drawingml/2006/main" xmlns:r="http://schemas.openxmlformats.org/officeDocument/2006/relationships">
   <p:cSld>
@@ -6741,7 +7124,7 @@
               <a:rPr lang="en-US" sz="1400">
                 <a:latin typeface="Calibri"/>
               </a:rPr>
-              <a:t>27-Apr-20</a:t>
+              <a:t>01-Jun-20</a:t>
             </a:r>
             <a:endParaRPr lang="en-US" sz="1100"/>
           </a:p>
@@ -6995,7 +7378,7 @@
               <a:rPr lang="en-US" sz="1400">
                 <a:latin typeface="Calibri"/>
               </a:rPr>
-              <a:t>27-Apr-20</a:t>
+              <a:t>01-Jun-20</a:t>
             </a:r>
             <a:endParaRPr lang="en-US" sz="1100"/>
           </a:p>
@@ -7237,7 +7620,7 @@
               <a:rPr lang="en-US" sz="1400">
                 <a:latin typeface="Calibri"/>
               </a:rPr>
-              <a:t>27-Apr-20</a:t>
+              <a:t>01-Jun-20</a:t>
             </a:r>
             <a:endParaRPr lang="en-US" sz="1100"/>
           </a:p>
@@ -7786,7 +8169,7 @@
               <a:rPr lang="en-US" sz="1400">
                 <a:latin typeface="Calibri"/>
               </a:rPr>
-              <a:t>27-Apr-20</a:t>
+              <a:t>01-Jun-20</a:t>
             </a:r>
             <a:endParaRPr lang="en-US" sz="1100"/>
           </a:p>
@@ -8335,7 +8718,7 @@
               <a:rPr lang="en-US" sz="1400">
                 <a:latin typeface="Calibri"/>
               </a:rPr>
-              <a:t>27-Apr-20</a:t>
+              <a:t>01-Jun-20</a:t>
             </a:r>
             <a:endParaRPr lang="en-US" sz="1100"/>
           </a:p>
@@ -8556,7 +8939,7 @@
               <a:rPr lang="en-US" sz="1400">
                 <a:latin typeface="Calibri"/>
               </a:rPr>
-              <a:t>27-Apr-20</a:t>
+              <a:t>01-Jun-20</a:t>
             </a:r>
             <a:endParaRPr lang="en-US" sz="1100"/>
           </a:p>
@@ -8680,6 +9063,258 @@
           <a:p/>
         </p:txBody>
       </p:sp>
+    </p:spTree>
+  </p:cSld>
+  <p:clrMapOvr>
+    <a:masterClrMapping/>
+  </p:clrMapOvr>
+</p:sld>
+</file>
+
+<file path=ppt/slides/slide8.xml><?xml version="1.0" encoding="utf-8"?>
+<p:sld xmlns:p="http://schemas.openxmlformats.org/presentationml/2006/main" xmlns:a="http://schemas.openxmlformats.org/drawingml/2006/main" xmlns:r="http://schemas.openxmlformats.org/officeDocument/2006/relationships">
+  <p:cSld>
+    <p:spTree>
+      <p:nvGrpSpPr>
+        <p:cNvPr id="1" name=""/>
+        <p:cNvGrpSpPr/>
+        <p:nvPr/>
+      </p:nvGrpSpPr>
+      <p:grpSpPr>
+        <a:xfrm>
+          <a:off x="0" y="0"/>
+          <a:ext cx="0" cy="0"/>
+          <a:chOff x="0" y="0"/>
+          <a:chExt cx="0" cy="0"/>
+        </a:xfrm>
+      </p:grpSpPr>
+      <p:sp>
+        <p:nvSpPr>
+          <p:cNvPr name="TextBox 2" id="2"/>
+          <p:cNvSpPr txBox="true"/>
+          <p:nvPr/>
+        </p:nvSpPr>
+        <p:spPr>
+          <a:xfrm>
+            <a:off x="254000" y="254000"/>
+            <a:ext cx="6350000" cy="762000"/>
+          </a:xfrm>
+          <a:prstGeom prst="rect">
+            <a:avLst/>
+          </a:prstGeom>
+        </p:spPr>
+        <p:txBody>
+          <a:bodyPr anchor="t" rtlCol="false"/>
+          <a:lstStyle/>
+          <a:p>
+            <a:pPr algn="l">
+              <a:defRPr/>
+            </a:pPr>
+            <a:r>
+              <a:rPr lang="ru-RU"/>
+              <a:t/>
+            </a:r>
+            <a:r>
+              <a:rPr lang="en-US" sz="1400" b="true">
+                <a:latin typeface="Calibri"/>
+              </a:rPr>
+              <a:t>Project name: </a:t>
+            </a:r>
+            <a:r>
+              <a:rPr lang="en-US" sz="1400">
+                <a:latin typeface="Calibri"/>
+                <a:hlinkClick r:id="rId2" tooltip="http://ya.ru"/>
+              </a:rPr>
+              <a:t>Project from Facade</a:t>
+            </a:r>
+            <a:br>
+              <a:rPr lang="en-US" sz="1400">
+                <a:latin typeface="Calibri"/>
+              </a:rPr>
+            </a:br>
+            <a:r>
+              <a:rPr lang="en-US" sz="1400" b="true">
+                <a:latin typeface="Calibri"/>
+              </a:rPr>
+              <a:t>Project manager: </a:t>
+            </a:r>
+            <a:r>
+              <a:rPr lang="en-US" sz="1400">
+                <a:latin typeface="Calibri"/>
+              </a:rPr>
+              <a:t>IKSANOV Aleksandr</a:t>
+            </a:r>
+            <a:br>
+              <a:rPr lang="en-US" sz="1400">
+                <a:latin typeface="Calibri"/>
+              </a:rPr>
+            </a:br>
+            <a:r>
+              <a:rPr lang="en-US" sz="1400" b="true">
+                <a:latin typeface="Calibri"/>
+              </a:rPr>
+              <a:t>Last Updated: </a:t>
+            </a:r>
+            <a:r>
+              <a:rPr lang="en-US" sz="1400">
+                <a:latin typeface="Calibri"/>
+              </a:rPr>
+              <a:t>01-Jun-20</a:t>
+            </a:r>
+            <a:endParaRPr lang="en-US" sz="1100"/>
+          </a:p>
+        </p:txBody>
+      </p:sp>
+      <p:pic>
+        <p:nvPicPr>
+          <p:cNvPr name="Picture 3" id="3"/>
+          <p:cNvPicPr>
+            <a:picLocks noChangeAspect="true"/>
+          </p:cNvPicPr>
+          <p:nvPr/>
+        </p:nvPicPr>
+        <p:blipFill>
+          <a:blip r:embed="rId3"/>
+          <a:stretch>
+            <a:fillRect/>
+          </a:stretch>
+        </p:blipFill>
+        <p:spPr>
+          <a:xfrm>
+            <a:off x="254000" y="1498600"/>
+            <a:ext cx="15748000" cy="7391400"/>
+          </a:xfrm>
+          <a:prstGeom prst="rect">
+            <a:avLst/>
+          </a:prstGeom>
+        </p:spPr>
+      </p:pic>
+    </p:spTree>
+  </p:cSld>
+  <p:clrMapOvr>
+    <a:masterClrMapping/>
+  </p:clrMapOvr>
+</p:sld>
+</file>
+
+<file path=ppt/slides/slide9.xml><?xml version="1.0" encoding="utf-8"?>
+<p:sld xmlns:p="http://schemas.openxmlformats.org/presentationml/2006/main" xmlns:a="http://schemas.openxmlformats.org/drawingml/2006/main" xmlns:r="http://schemas.openxmlformats.org/officeDocument/2006/relationships">
+  <p:cSld>
+    <p:spTree>
+      <p:nvGrpSpPr>
+        <p:cNvPr id="1" name=""/>
+        <p:cNvGrpSpPr/>
+        <p:nvPr/>
+      </p:nvGrpSpPr>
+      <p:grpSpPr>
+        <a:xfrm>
+          <a:off x="0" y="0"/>
+          <a:ext cx="0" cy="0"/>
+          <a:chOff x="0" y="0"/>
+          <a:chExt cx="0" cy="0"/>
+        </a:xfrm>
+      </p:grpSpPr>
+      <p:sp>
+        <p:nvSpPr>
+          <p:cNvPr name="TextBox 2" id="2"/>
+          <p:cNvSpPr txBox="true"/>
+          <p:nvPr/>
+        </p:nvSpPr>
+        <p:spPr>
+          <a:xfrm>
+            <a:off x="254000" y="254000"/>
+            <a:ext cx="6350000" cy="762000"/>
+          </a:xfrm>
+          <a:prstGeom prst="rect">
+            <a:avLst/>
+          </a:prstGeom>
+        </p:spPr>
+        <p:txBody>
+          <a:bodyPr anchor="t" rtlCol="false"/>
+          <a:lstStyle/>
+          <a:p>
+            <a:pPr algn="l">
+              <a:defRPr/>
+            </a:pPr>
+            <a:r>
+              <a:rPr lang="ru-RU"/>
+              <a:t/>
+            </a:r>
+            <a:r>
+              <a:rPr lang="en-US" sz="1400" b="true">
+                <a:latin typeface="Calibri"/>
+              </a:rPr>
+              <a:t>Project name: </a:t>
+            </a:r>
+            <a:r>
+              <a:rPr lang="en-US" sz="1400">
+                <a:latin typeface="Calibri"/>
+                <a:hlinkClick r:id="rId2" tooltip="http://ya.ru"/>
+              </a:rPr>
+              <a:t>Project from Facade</a:t>
+            </a:r>
+            <a:br>
+              <a:rPr lang="en-US" sz="1400">
+                <a:latin typeface="Calibri"/>
+              </a:rPr>
+            </a:br>
+            <a:r>
+              <a:rPr lang="en-US" sz="1400" b="true">
+                <a:latin typeface="Calibri"/>
+              </a:rPr>
+              <a:t>Project manager: </a:t>
+            </a:r>
+            <a:r>
+              <a:rPr lang="en-US" sz="1400">
+                <a:latin typeface="Calibri"/>
+              </a:rPr>
+              <a:t>IKSANOV Aleksandr</a:t>
+            </a:r>
+            <a:br>
+              <a:rPr lang="en-US" sz="1400">
+                <a:latin typeface="Calibri"/>
+              </a:rPr>
+            </a:br>
+            <a:r>
+              <a:rPr lang="en-US" sz="1400" b="true">
+                <a:latin typeface="Calibri"/>
+              </a:rPr>
+              <a:t>Last Updated: </a:t>
+            </a:r>
+            <a:r>
+              <a:rPr lang="en-US" sz="1400">
+                <a:latin typeface="Calibri"/>
+              </a:rPr>
+              <a:t>01-Jun-20</a:t>
+            </a:r>
+            <a:endParaRPr lang="en-US" sz="1100"/>
+          </a:p>
+        </p:txBody>
+      </p:sp>
+      <p:pic>
+        <p:nvPicPr>
+          <p:cNvPr name="Picture 3" id="3"/>
+          <p:cNvPicPr>
+            <a:picLocks noChangeAspect="true"/>
+          </p:cNvPicPr>
+          <p:nvPr/>
+        </p:nvPicPr>
+        <p:blipFill>
+          <a:blip r:embed="rId3"/>
+          <a:stretch>
+            <a:fillRect/>
+          </a:stretch>
+        </p:blipFill>
+        <p:spPr>
+          <a:xfrm>
+            <a:off x="254000" y="1498600"/>
+            <a:ext cx="15748000" cy="7391400"/>
+          </a:xfrm>
+          <a:prstGeom prst="rect">
+            <a:avLst/>
+          </a:prstGeom>
+        </p:spPr>
+      </p:pic>
     </p:spTree>
   </p:cSld>
   <p:clrMapOvr>

</xml_diff>